<commit_message>
Adds an image to the 'demo' slide
</commit_message>
<xml_diff>
--- a/reports/presentation.pptx
+++ b/reports/presentation.pptx
@@ -1,23 +1,23 @@
 
 <file path=ppt/presentation.xml><?xml version="1.0" encoding="utf-8"?>
-<p:presentation xmlns:a="http://schemas.openxmlformats.org/drawingml/2006/main" xmlns:r="http://schemas.openxmlformats.org/officeDocument/2006/relationships" xmlns:p="http://schemas.openxmlformats.org/presentationml/2006/main">
+<p:presentation xmlns:a="http://schemas.openxmlformats.org/drawingml/2006/main" xmlns:r="http://schemas.openxmlformats.org/officeDocument/2006/relationships" xmlns:p="http://schemas.openxmlformats.org/presentationml/2006/main" xmlns:m="http://schemas.openxmlformats.org/officeDocument/2006/math" xmlns:a14="http://schemas.microsoft.com/office/drawing/2010/main">
   <p:sldMasterIdLst>
-    <p:sldMasterId id="2147483648" r:id="rId1"/>
+    <p:sldMasterId id="2147483648" r:id="rId5"/>
   </p:sldMasterIdLst>
   <p:notesMasterIdLst>
-    <p:notesMasterId r:id="rId12"/>
+    <p:notesMasterId r:id="rId7"/>
   </p:notesMasterIdLst>
   <p:sldIdLst>
-    <p:sldId id="256" r:id="rId2"/>
-    <p:sldId id="257" r:id="rId3"/>
-    <p:sldId id="258" r:id="rId4"/>
-    <p:sldId id="268" r:id="rId5"/>
-    <p:sldId id="260" r:id="rId6"/>
-    <p:sldId id="267" r:id="rId7"/>
-    <p:sldId id="261" r:id="rId8"/>
-    <p:sldId id="262" r:id="rId9"/>
-    <p:sldId id="263" r:id="rId10"/>
-    <p:sldId id="265" r:id="rId11"/>
+    <p:sldId id="256" r:id="rId8"/>
+    <p:sldId id="257" r:id="rId9"/>
+    <p:sldId id="258" r:id="rId10"/>
+    <p:sldId id="259" r:id="rId11"/>
+    <p:sldId id="260" r:id="rId12"/>
+    <p:sldId id="261" r:id="rId13"/>
+    <p:sldId id="262" r:id="rId14"/>
+    <p:sldId id="263" r:id="rId15"/>
+    <p:sldId id="264" r:id="rId16"/>
+    <p:sldId id="265" r:id="rId17"/>
   </p:sldIdLst>
   <p:sldSz cx="13004800" cy="9753600"/>
   <p:notesSz cx="6858000" cy="9144000"/>
@@ -37,7 +37,7 @@
       <a:buFontTx/>
       <a:buNone/>
       <a:tabLst/>
-      <a:defRPr kumimoji="0" sz="1800" b="0" i="0" u="none" strike="noStrike" cap="none" spc="0" normalizeH="0" baseline="0">
+      <a:defRPr b="0" baseline="0" cap="none" i="0" spc="0" strike="noStrike" sz="1800" u="none" kumimoji="0" normalizeH="0">
         <a:ln>
           <a:noFill/>
         </a:ln>
@@ -63,7 +63,7 @@
       <a:buFontTx/>
       <a:buNone/>
       <a:tabLst/>
-      <a:defRPr kumimoji="0" sz="2400" b="1" i="0" u="none" strike="noStrike" cap="none" spc="0" normalizeH="0" baseline="0">
+      <a:defRPr b="0" baseline="0" cap="none" i="0" spc="0" strike="noStrike" sz="2400" u="none" kumimoji="0" normalizeH="0">
         <a:ln>
           <a:noFill/>
         </a:ln>
@@ -72,13 +72,13 @@
         </a:solidFill>
         <a:effectLst/>
         <a:uFillTx/>
-        <a:latin typeface="Helvetica Neue"/>
-        <a:ea typeface="Helvetica Neue"/>
-        <a:cs typeface="Helvetica Neue"/>
-        <a:sym typeface="Helvetica Neue"/>
+        <a:latin typeface="Helvetica Neue Medium"/>
+        <a:ea typeface="Helvetica Neue Medium"/>
+        <a:cs typeface="Helvetica Neue Medium"/>
+        <a:sym typeface="Helvetica Neue Medium"/>
       </a:defRPr>
     </a:lvl1pPr>
-    <a:lvl2pPr marL="0" marR="0" indent="228600" algn="ctr" defTabSz="584200" rtl="0" fontAlgn="auto" latinLnBrk="0" hangingPunct="0">
+    <a:lvl2pPr marL="0" marR="0" indent="0" algn="ctr" defTabSz="584200" rtl="0" fontAlgn="auto" latinLnBrk="0" hangingPunct="0">
       <a:lnSpc>
         <a:spcPct val="100000"/>
       </a:lnSpc>
@@ -93,7 +93,7 @@
       <a:buFontTx/>
       <a:buNone/>
       <a:tabLst/>
-      <a:defRPr kumimoji="0" sz="2400" b="1" i="0" u="none" strike="noStrike" cap="none" spc="0" normalizeH="0" baseline="0">
+      <a:defRPr b="0" baseline="0" cap="none" i="0" spc="0" strike="noStrike" sz="2400" u="none" kumimoji="0" normalizeH="0">
         <a:ln>
           <a:noFill/>
         </a:ln>
@@ -102,13 +102,13 @@
         </a:solidFill>
         <a:effectLst/>
         <a:uFillTx/>
-        <a:latin typeface="Helvetica Neue"/>
-        <a:ea typeface="Helvetica Neue"/>
-        <a:cs typeface="Helvetica Neue"/>
-        <a:sym typeface="Helvetica Neue"/>
+        <a:latin typeface="Helvetica Neue Medium"/>
+        <a:ea typeface="Helvetica Neue Medium"/>
+        <a:cs typeface="Helvetica Neue Medium"/>
+        <a:sym typeface="Helvetica Neue Medium"/>
       </a:defRPr>
     </a:lvl2pPr>
-    <a:lvl3pPr marL="0" marR="0" indent="457200" algn="ctr" defTabSz="584200" rtl="0" fontAlgn="auto" latinLnBrk="0" hangingPunct="0">
+    <a:lvl3pPr marL="0" marR="0" indent="0" algn="ctr" defTabSz="584200" rtl="0" fontAlgn="auto" latinLnBrk="0" hangingPunct="0">
       <a:lnSpc>
         <a:spcPct val="100000"/>
       </a:lnSpc>
@@ -123,7 +123,7 @@
       <a:buFontTx/>
       <a:buNone/>
       <a:tabLst/>
-      <a:defRPr kumimoji="0" sz="2400" b="1" i="0" u="none" strike="noStrike" cap="none" spc="0" normalizeH="0" baseline="0">
+      <a:defRPr b="0" baseline="0" cap="none" i="0" spc="0" strike="noStrike" sz="2400" u="none" kumimoji="0" normalizeH="0">
         <a:ln>
           <a:noFill/>
         </a:ln>
@@ -132,13 +132,13 @@
         </a:solidFill>
         <a:effectLst/>
         <a:uFillTx/>
-        <a:latin typeface="Helvetica Neue"/>
-        <a:ea typeface="Helvetica Neue"/>
-        <a:cs typeface="Helvetica Neue"/>
-        <a:sym typeface="Helvetica Neue"/>
+        <a:latin typeface="Helvetica Neue Medium"/>
+        <a:ea typeface="Helvetica Neue Medium"/>
+        <a:cs typeface="Helvetica Neue Medium"/>
+        <a:sym typeface="Helvetica Neue Medium"/>
       </a:defRPr>
     </a:lvl3pPr>
-    <a:lvl4pPr marL="0" marR="0" indent="685800" algn="ctr" defTabSz="584200" rtl="0" fontAlgn="auto" latinLnBrk="0" hangingPunct="0">
+    <a:lvl4pPr marL="0" marR="0" indent="0" algn="ctr" defTabSz="584200" rtl="0" fontAlgn="auto" latinLnBrk="0" hangingPunct="0">
       <a:lnSpc>
         <a:spcPct val="100000"/>
       </a:lnSpc>
@@ -153,7 +153,7 @@
       <a:buFontTx/>
       <a:buNone/>
       <a:tabLst/>
-      <a:defRPr kumimoji="0" sz="2400" b="1" i="0" u="none" strike="noStrike" cap="none" spc="0" normalizeH="0" baseline="0">
+      <a:defRPr b="0" baseline="0" cap="none" i="0" spc="0" strike="noStrike" sz="2400" u="none" kumimoji="0" normalizeH="0">
         <a:ln>
           <a:noFill/>
         </a:ln>
@@ -162,13 +162,13 @@
         </a:solidFill>
         <a:effectLst/>
         <a:uFillTx/>
-        <a:latin typeface="Helvetica Neue"/>
-        <a:ea typeface="Helvetica Neue"/>
-        <a:cs typeface="Helvetica Neue"/>
-        <a:sym typeface="Helvetica Neue"/>
+        <a:latin typeface="Helvetica Neue Medium"/>
+        <a:ea typeface="Helvetica Neue Medium"/>
+        <a:cs typeface="Helvetica Neue Medium"/>
+        <a:sym typeface="Helvetica Neue Medium"/>
       </a:defRPr>
     </a:lvl4pPr>
-    <a:lvl5pPr marL="0" marR="0" indent="914400" algn="ctr" defTabSz="584200" rtl="0" fontAlgn="auto" latinLnBrk="0" hangingPunct="0">
+    <a:lvl5pPr marL="0" marR="0" indent="0" algn="ctr" defTabSz="584200" rtl="0" fontAlgn="auto" latinLnBrk="0" hangingPunct="0">
       <a:lnSpc>
         <a:spcPct val="100000"/>
       </a:lnSpc>
@@ -183,7 +183,7 @@
       <a:buFontTx/>
       <a:buNone/>
       <a:tabLst/>
-      <a:defRPr kumimoji="0" sz="2400" b="1" i="0" u="none" strike="noStrike" cap="none" spc="0" normalizeH="0" baseline="0">
+      <a:defRPr b="0" baseline="0" cap="none" i="0" spc="0" strike="noStrike" sz="2400" u="none" kumimoji="0" normalizeH="0">
         <a:ln>
           <a:noFill/>
         </a:ln>
@@ -192,13 +192,13 @@
         </a:solidFill>
         <a:effectLst/>
         <a:uFillTx/>
-        <a:latin typeface="Helvetica Neue"/>
-        <a:ea typeface="Helvetica Neue"/>
-        <a:cs typeface="Helvetica Neue"/>
-        <a:sym typeface="Helvetica Neue"/>
+        <a:latin typeface="Helvetica Neue Medium"/>
+        <a:ea typeface="Helvetica Neue Medium"/>
+        <a:cs typeface="Helvetica Neue Medium"/>
+        <a:sym typeface="Helvetica Neue Medium"/>
       </a:defRPr>
     </a:lvl5pPr>
-    <a:lvl6pPr marL="0" marR="0" indent="1143000" algn="ctr" defTabSz="584200" rtl="0" fontAlgn="auto" latinLnBrk="0" hangingPunct="0">
+    <a:lvl6pPr marL="0" marR="0" indent="0" algn="ctr" defTabSz="584200" rtl="0" fontAlgn="auto" latinLnBrk="0" hangingPunct="0">
       <a:lnSpc>
         <a:spcPct val="100000"/>
       </a:lnSpc>
@@ -213,7 +213,7 @@
       <a:buFontTx/>
       <a:buNone/>
       <a:tabLst/>
-      <a:defRPr kumimoji="0" sz="2400" b="1" i="0" u="none" strike="noStrike" cap="none" spc="0" normalizeH="0" baseline="0">
+      <a:defRPr b="0" baseline="0" cap="none" i="0" spc="0" strike="noStrike" sz="2400" u="none" kumimoji="0" normalizeH="0">
         <a:ln>
           <a:noFill/>
         </a:ln>
@@ -222,13 +222,13 @@
         </a:solidFill>
         <a:effectLst/>
         <a:uFillTx/>
-        <a:latin typeface="Helvetica Neue"/>
-        <a:ea typeface="Helvetica Neue"/>
-        <a:cs typeface="Helvetica Neue"/>
-        <a:sym typeface="Helvetica Neue"/>
+        <a:latin typeface="Helvetica Neue Medium"/>
+        <a:ea typeface="Helvetica Neue Medium"/>
+        <a:cs typeface="Helvetica Neue Medium"/>
+        <a:sym typeface="Helvetica Neue Medium"/>
       </a:defRPr>
     </a:lvl6pPr>
-    <a:lvl7pPr marL="0" marR="0" indent="1371600" algn="ctr" defTabSz="584200" rtl="0" fontAlgn="auto" latinLnBrk="0" hangingPunct="0">
+    <a:lvl7pPr marL="0" marR="0" indent="0" algn="ctr" defTabSz="584200" rtl="0" fontAlgn="auto" latinLnBrk="0" hangingPunct="0">
       <a:lnSpc>
         <a:spcPct val="100000"/>
       </a:lnSpc>
@@ -243,7 +243,7 @@
       <a:buFontTx/>
       <a:buNone/>
       <a:tabLst/>
-      <a:defRPr kumimoji="0" sz="2400" b="1" i="0" u="none" strike="noStrike" cap="none" spc="0" normalizeH="0" baseline="0">
+      <a:defRPr b="0" baseline="0" cap="none" i="0" spc="0" strike="noStrike" sz="2400" u="none" kumimoji="0" normalizeH="0">
         <a:ln>
           <a:noFill/>
         </a:ln>
@@ -252,13 +252,13 @@
         </a:solidFill>
         <a:effectLst/>
         <a:uFillTx/>
-        <a:latin typeface="Helvetica Neue"/>
-        <a:ea typeface="Helvetica Neue"/>
-        <a:cs typeface="Helvetica Neue"/>
-        <a:sym typeface="Helvetica Neue"/>
+        <a:latin typeface="Helvetica Neue Medium"/>
+        <a:ea typeface="Helvetica Neue Medium"/>
+        <a:cs typeface="Helvetica Neue Medium"/>
+        <a:sym typeface="Helvetica Neue Medium"/>
       </a:defRPr>
     </a:lvl7pPr>
-    <a:lvl8pPr marL="0" marR="0" indent="1600200" algn="ctr" defTabSz="584200" rtl="0" fontAlgn="auto" latinLnBrk="0" hangingPunct="0">
+    <a:lvl8pPr marL="0" marR="0" indent="0" algn="ctr" defTabSz="584200" rtl="0" fontAlgn="auto" latinLnBrk="0" hangingPunct="0">
       <a:lnSpc>
         <a:spcPct val="100000"/>
       </a:lnSpc>
@@ -273,7 +273,7 @@
       <a:buFontTx/>
       <a:buNone/>
       <a:tabLst/>
-      <a:defRPr kumimoji="0" sz="2400" b="1" i="0" u="none" strike="noStrike" cap="none" spc="0" normalizeH="0" baseline="0">
+      <a:defRPr b="0" baseline="0" cap="none" i="0" spc="0" strike="noStrike" sz="2400" u="none" kumimoji="0" normalizeH="0">
         <a:ln>
           <a:noFill/>
         </a:ln>
@@ -282,13 +282,13 @@
         </a:solidFill>
         <a:effectLst/>
         <a:uFillTx/>
-        <a:latin typeface="Helvetica Neue"/>
-        <a:ea typeface="Helvetica Neue"/>
-        <a:cs typeface="Helvetica Neue"/>
-        <a:sym typeface="Helvetica Neue"/>
+        <a:latin typeface="Helvetica Neue Medium"/>
+        <a:ea typeface="Helvetica Neue Medium"/>
+        <a:cs typeface="Helvetica Neue Medium"/>
+        <a:sym typeface="Helvetica Neue Medium"/>
       </a:defRPr>
     </a:lvl8pPr>
-    <a:lvl9pPr marL="0" marR="0" indent="1828800" algn="ctr" defTabSz="584200" rtl="0" fontAlgn="auto" latinLnBrk="0" hangingPunct="0">
+    <a:lvl9pPr marL="0" marR="0" indent="0" algn="ctr" defTabSz="584200" rtl="0" fontAlgn="auto" latinLnBrk="0" hangingPunct="0">
       <a:lnSpc>
         <a:spcPct val="100000"/>
       </a:lnSpc>
@@ -303,7 +303,7 @@
       <a:buFontTx/>
       <a:buNone/>
       <a:tabLst/>
-      <a:defRPr kumimoji="0" sz="2400" b="1" i="0" u="none" strike="noStrike" cap="none" spc="0" normalizeH="0" baseline="0">
+      <a:defRPr b="0" baseline="0" cap="none" i="0" spc="0" strike="noStrike" sz="2400" u="none" kumimoji="0" normalizeH="0">
         <a:ln>
           <a:noFill/>
         </a:ln>
@@ -312,40 +312,23 @@
         </a:solidFill>
         <a:effectLst/>
         <a:uFillTx/>
-        <a:latin typeface="Helvetica Neue"/>
-        <a:ea typeface="Helvetica Neue"/>
-        <a:cs typeface="Helvetica Neue"/>
-        <a:sym typeface="Helvetica Neue"/>
+        <a:latin typeface="Helvetica Neue Medium"/>
+        <a:ea typeface="Helvetica Neue Medium"/>
+        <a:cs typeface="Helvetica Neue Medium"/>
+        <a:sym typeface="Helvetica Neue Medium"/>
       </a:defRPr>
     </a:lvl9pPr>
   </p:defaultTextStyle>
-  <p:extLst>
-    <p:ext uri="{EFAFB233-063F-42B5-8137-9DF3F51BA10A}">
-      <p15:sldGuideLst xmlns:p15="http://schemas.microsoft.com/office/powerpoint/2012/main">
-        <p15:guide id="1" orient="horz" pos="3072">
-          <p15:clr>
-            <a:srgbClr val="A4A3A4"/>
-          </p15:clr>
-        </p15:guide>
-        <p15:guide id="2" pos="4096">
-          <p15:clr>
-            <a:srgbClr val="A4A3A4"/>
-          </p15:clr>
-        </p15:guide>
-      </p15:sldGuideLst>
-    </p:ext>
-  </p:extLst>
 </p:presentation>
 </file>
 
+<file path=ppt/commentAuthors.xml><?xml version="1.0" encoding="utf-8"?>
+<p:cmAuthorLst xmlns:a="http://schemas.openxmlformats.org/drawingml/2006/main" xmlns:r="http://schemas.openxmlformats.org/officeDocument/2006/relationships" xmlns:p="http://schemas.openxmlformats.org/presentationml/2006/main" xmlns:m="http://schemas.openxmlformats.org/officeDocument/2006/math" xmlns:a14="http://schemas.microsoft.com/office/drawing/2010/main"/>
+</file>
+
 <file path=ppt/notesMasters/notesMaster1.xml><?xml version="1.0" encoding="utf-8"?>
-<p:notesMaster xmlns:a="http://schemas.openxmlformats.org/drawingml/2006/main" xmlns:r="http://schemas.openxmlformats.org/officeDocument/2006/relationships" xmlns:p="http://schemas.openxmlformats.org/presentationml/2006/main">
+<p:notesMaster xmlns:a="http://schemas.openxmlformats.org/drawingml/2006/main" xmlns:r="http://schemas.openxmlformats.org/officeDocument/2006/relationships" xmlns:p="http://schemas.openxmlformats.org/presentationml/2006/main" xmlns:m="http://schemas.openxmlformats.org/officeDocument/2006/math" xmlns:a14="http://schemas.microsoft.com/office/drawing/2010/main">
   <p:cSld>
-    <p:bg>
-      <p:bgRef idx="1001">
-        <a:schemeClr val="bg1"/>
-      </p:bgRef>
-    </p:bg>
     <p:spTree>
       <p:nvGrpSpPr>
         <p:cNvPr id="1" name=""/>
@@ -363,9 +346,7 @@
       <p:sp>
         <p:nvSpPr>
           <p:cNvPr id="116" name="Shape 116"/>
-          <p:cNvSpPr>
-            <a:spLocks noGrp="1" noRot="1" noChangeAspect="1"/>
-          </p:cNvSpPr>
+          <p:cNvSpPr/>
           <p:nvPr>
             <p:ph type="sldImg"/>
           </p:nvPr>
@@ -383,16 +364,14 @@
           <a:bodyPr/>
           <a:lstStyle/>
           <a:p>
-            <a:endParaRPr/>
+            <a:pPr/>
           </a:p>
         </p:txBody>
       </p:sp>
       <p:sp>
         <p:nvSpPr>
           <p:cNvPr id="117" name="Shape 117"/>
-          <p:cNvSpPr>
-            <a:spLocks noGrp="1"/>
-          </p:cNvSpPr>
+          <p:cNvSpPr/>
           <p:nvPr>
             <p:ph type="body" sz="quarter" idx="1"/>
           </p:nvPr>
@@ -410,16 +389,11 @@
           <a:bodyPr/>
           <a:lstStyle/>
           <a:p>
-            <a:endParaRPr/>
+            <a:pPr/>
           </a:p>
         </p:txBody>
       </p:sp>
     </p:spTree>
-    <p:extLst>
-      <p:ext uri="{BB962C8B-B14F-4D97-AF65-F5344CB8AC3E}">
-        <p14:creationId xmlns:p14="http://schemas.microsoft.com/office/powerpoint/2010/main" val="1571410703"/>
-      </p:ext>
-    </p:extLst>
   </p:cSld>
   <p:clrMap bg1="lt1" tx1="dk1" bg2="lt2" tx2="dk2" accent1="accent1" accent2="accent2" accent3="accent3" accent4="accent4" accent5="accent5" accent6="accent6" hlink="hlink" folHlink="folHlink"/>
   <p:notesStyle>
@@ -428,9 +402,9 @@
         <a:spcPct val="117999"/>
       </a:lnSpc>
       <a:defRPr sz="2200">
-        <a:latin typeface="Helvetica Neue"/>
-        <a:ea typeface="Helvetica Neue"/>
-        <a:cs typeface="Helvetica Neue"/>
+        <a:latin typeface="+mn-lt"/>
+        <a:ea typeface="+mn-ea"/>
+        <a:cs typeface="+mn-cs"/>
         <a:sym typeface="Helvetica Neue"/>
       </a:defRPr>
     </a:lvl1pPr>
@@ -439,9 +413,9 @@
         <a:spcPct val="117999"/>
       </a:lnSpc>
       <a:defRPr sz="2200">
-        <a:latin typeface="Helvetica Neue"/>
-        <a:ea typeface="Helvetica Neue"/>
-        <a:cs typeface="Helvetica Neue"/>
+        <a:latin typeface="+mn-lt"/>
+        <a:ea typeface="+mn-ea"/>
+        <a:cs typeface="+mn-cs"/>
         <a:sym typeface="Helvetica Neue"/>
       </a:defRPr>
     </a:lvl2pPr>
@@ -450,9 +424,9 @@
         <a:spcPct val="117999"/>
       </a:lnSpc>
       <a:defRPr sz="2200">
-        <a:latin typeface="Helvetica Neue"/>
-        <a:ea typeface="Helvetica Neue"/>
-        <a:cs typeface="Helvetica Neue"/>
+        <a:latin typeface="+mn-lt"/>
+        <a:ea typeface="+mn-ea"/>
+        <a:cs typeface="+mn-cs"/>
         <a:sym typeface="Helvetica Neue"/>
       </a:defRPr>
     </a:lvl3pPr>
@@ -461,9 +435,9 @@
         <a:spcPct val="117999"/>
       </a:lnSpc>
       <a:defRPr sz="2200">
-        <a:latin typeface="Helvetica Neue"/>
-        <a:ea typeface="Helvetica Neue"/>
-        <a:cs typeface="Helvetica Neue"/>
+        <a:latin typeface="+mn-lt"/>
+        <a:ea typeface="+mn-ea"/>
+        <a:cs typeface="+mn-cs"/>
         <a:sym typeface="Helvetica Neue"/>
       </a:defRPr>
     </a:lvl4pPr>
@@ -472,9 +446,9 @@
         <a:spcPct val="117999"/>
       </a:lnSpc>
       <a:defRPr sz="2200">
-        <a:latin typeface="Helvetica Neue"/>
-        <a:ea typeface="Helvetica Neue"/>
-        <a:cs typeface="Helvetica Neue"/>
+        <a:latin typeface="+mn-lt"/>
+        <a:ea typeface="+mn-ea"/>
+        <a:cs typeface="+mn-cs"/>
         <a:sym typeface="Helvetica Neue"/>
       </a:defRPr>
     </a:lvl5pPr>
@@ -483,9 +457,9 @@
         <a:spcPct val="117999"/>
       </a:lnSpc>
       <a:defRPr sz="2200">
-        <a:latin typeface="Helvetica Neue"/>
-        <a:ea typeface="Helvetica Neue"/>
-        <a:cs typeface="Helvetica Neue"/>
+        <a:latin typeface="+mn-lt"/>
+        <a:ea typeface="+mn-ea"/>
+        <a:cs typeface="+mn-cs"/>
         <a:sym typeface="Helvetica Neue"/>
       </a:defRPr>
     </a:lvl6pPr>
@@ -494,9 +468,9 @@
         <a:spcPct val="117999"/>
       </a:lnSpc>
       <a:defRPr sz="2200">
-        <a:latin typeface="Helvetica Neue"/>
-        <a:ea typeface="Helvetica Neue"/>
-        <a:cs typeface="Helvetica Neue"/>
+        <a:latin typeface="+mn-lt"/>
+        <a:ea typeface="+mn-ea"/>
+        <a:cs typeface="+mn-cs"/>
         <a:sym typeface="Helvetica Neue"/>
       </a:defRPr>
     </a:lvl7pPr>
@@ -505,9 +479,9 @@
         <a:spcPct val="117999"/>
       </a:lnSpc>
       <a:defRPr sz="2200">
-        <a:latin typeface="Helvetica Neue"/>
-        <a:ea typeface="Helvetica Neue"/>
-        <a:cs typeface="Helvetica Neue"/>
+        <a:latin typeface="+mn-lt"/>
+        <a:ea typeface="+mn-ea"/>
+        <a:cs typeface="+mn-cs"/>
         <a:sym typeface="Helvetica Neue"/>
       </a:defRPr>
     </a:lvl8pPr>
@@ -516,9 +490,9 @@
         <a:spcPct val="117999"/>
       </a:lnSpc>
       <a:defRPr sz="2200">
-        <a:latin typeface="Helvetica Neue"/>
-        <a:ea typeface="Helvetica Neue"/>
-        <a:cs typeface="Helvetica Neue"/>
+        <a:latin typeface="+mn-lt"/>
+        <a:ea typeface="+mn-ea"/>
+        <a:cs typeface="+mn-cs"/>
         <a:sym typeface="Helvetica Neue"/>
       </a:defRPr>
     </a:lvl9pPr>
@@ -527,7 +501,7 @@
 </file>
 
 <file path=ppt/slideLayouts/slideLayout1.xml><?xml version="1.0" encoding="utf-8"?>
-<p:sldLayout xmlns:a="http://schemas.openxmlformats.org/drawingml/2006/main" xmlns:r="http://schemas.openxmlformats.org/officeDocument/2006/relationships" xmlns:p="http://schemas.openxmlformats.org/presentationml/2006/main" type="title">
+<p:sldLayout xmlns:a="http://schemas.openxmlformats.org/drawingml/2006/main" xmlns:r="http://schemas.openxmlformats.org/officeDocument/2006/relationships" xmlns:p="http://schemas.openxmlformats.org/presentationml/2006/main" xmlns:m="http://schemas.openxmlformats.org/officeDocument/2006/math" xmlns:a14="http://schemas.microsoft.com/office/drawing/2010/main" type="title" showMasterSp="1" showMasterPhAnim="1">
   <p:cSld name="Title &amp; Subtitle">
     <p:spTree>
       <p:nvGrpSpPr>
@@ -546,9 +520,7 @@
       <p:sp>
         <p:nvSpPr>
           <p:cNvPr id="11" name="Title Text"/>
-          <p:cNvSpPr txBox="1">
-            <a:spLocks noGrp="1"/>
-          </p:cNvSpPr>
+          <p:cNvSpPr txBox="1"/>
           <p:nvPr>
             <p:ph type="title"/>
           </p:nvPr>
@@ -566,6 +538,7 @@
           <a:bodyPr anchor="b"/>
           <a:lstStyle/>
           <a:p>
+            <a:pPr/>
             <a:r>
               <a:t>Title Text</a:t>
             </a:r>
@@ -575,9 +548,7 @@
       <p:sp>
         <p:nvSpPr>
           <p:cNvPr id="12" name="Body Level One…"/>
-          <p:cNvSpPr txBox="1">
-            <a:spLocks noGrp="1"/>
-          </p:cNvSpPr>
+          <p:cNvSpPr txBox="1"/>
           <p:nvPr>
             <p:ph type="body" sz="quarter" idx="1"/>
           </p:nvPr>
@@ -636,6 +607,7 @@
             </a:lvl5pPr>
           </a:lstStyle>
           <a:p>
+            <a:pPr/>
             <a:r>
               <a:t>Body Level One</a:t>
             </a:r>
@@ -669,9 +641,7 @@
       <p:sp>
         <p:nvSpPr>
           <p:cNvPr id="13" name="Slide Number"/>
-          <p:cNvSpPr txBox="1">
-            <a:spLocks noGrp="1"/>
-          </p:cNvSpPr>
+          <p:cNvSpPr txBox="1"/>
           <p:nvPr>
             <p:ph type="sldNum" sz="quarter" idx="2"/>
           </p:nvPr>
@@ -694,10 +664,8 @@
             </a:lvl1pPr>
           </a:lstStyle>
           <a:p>
-            <a:fld id="{86CB4B4D-7CA3-9044-876B-883B54F8677D}" type="slidenum">
-              <a:t>‹#›</a:t>
-            </a:fld>
-            <a:endParaRPr/>
+            <a:pPr/>
+            <a:fld id="{86CB4B4D-7CA3-9044-876B-883B54F8677D}" type="slidenum"/>
           </a:p>
         </p:txBody>
       </p:sp>
@@ -706,12 +674,12 @@
   <p:clrMapOvr>
     <a:masterClrMapping/>
   </p:clrMapOvr>
-  <p:transition spd="med"/>
+  <p:transition xmlns:p14="http://schemas.microsoft.com/office/powerpoint/2010/main" spd="med" advClick="1"/>
 </p:sldLayout>
 </file>
 
 <file path=ppt/slideLayouts/slideLayout10.xml><?xml version="1.0" encoding="utf-8"?>
-<p:sldLayout xmlns:a="http://schemas.openxmlformats.org/drawingml/2006/main" xmlns:r="http://schemas.openxmlformats.org/officeDocument/2006/relationships" xmlns:p="http://schemas.openxmlformats.org/presentationml/2006/main" type="tx">
+<p:sldLayout xmlns:a="http://schemas.openxmlformats.org/drawingml/2006/main" xmlns:r="http://schemas.openxmlformats.org/officeDocument/2006/relationships" xmlns:p="http://schemas.openxmlformats.org/presentationml/2006/main" xmlns:m="http://schemas.openxmlformats.org/officeDocument/2006/math" xmlns:a14="http://schemas.microsoft.com/office/drawing/2010/main" type="tx" showMasterSp="1" showMasterPhAnim="1">
   <p:cSld name="Quote">
     <p:spTree>
       <p:nvGrpSpPr>
@@ -729,12 +697,10 @@
       </p:grpSpPr>
       <p:sp>
         <p:nvSpPr>
-          <p:cNvPr id="93" name="–Johnny Appleseed"/>
-          <p:cNvSpPr txBox="1">
-            <a:spLocks noGrp="1"/>
-          </p:cNvSpPr>
+          <p:cNvPr id="93" name="Body Level One…"/>
+          <p:cNvSpPr txBox="1"/>
           <p:nvPr>
-            <p:ph type="body" sz="quarter" idx="13"/>
+            <p:ph type="body" sz="quarter" idx="1"/>
           </p:nvPr>
         </p:nvSpPr>
         <p:spPr>
@@ -747,9 +713,7 @@
           </a:prstGeom>
         </p:spPr>
         <p:txBody>
-          <a:bodyPr anchor="t">
-            <a:spAutoFit/>
-          </a:bodyPr>
+          <a:bodyPr anchor="t"/>
           <a:lstStyle>
             <a:lvl1pPr marL="0" indent="0" algn="ctr">
               <a:spcBef>
@@ -757,12 +721,61 @@
               </a:spcBef>
               <a:buSzTx/>
               <a:buNone/>
-              <a:defRPr sz="2400" i="1"/>
+              <a:defRPr i="1" sz="2400"/>
             </a:lvl1pPr>
+            <a:lvl2pPr marL="777875" indent="-333375" algn="ctr">
+              <a:spcBef>
+                <a:spcPts val="0"/>
+              </a:spcBef>
+              <a:defRPr i="1" sz="2400"/>
+            </a:lvl2pPr>
+            <a:lvl3pPr marL="1222375" indent="-333375" algn="ctr">
+              <a:spcBef>
+                <a:spcPts val="0"/>
+              </a:spcBef>
+              <a:defRPr i="1" sz="2400"/>
+            </a:lvl3pPr>
+            <a:lvl4pPr marL="1666875" indent="-333375" algn="ctr">
+              <a:spcBef>
+                <a:spcPts val="0"/>
+              </a:spcBef>
+              <a:defRPr i="1" sz="2400"/>
+            </a:lvl4pPr>
+            <a:lvl5pPr marL="2111375" indent="-333375" algn="ctr">
+              <a:spcBef>
+                <a:spcPts val="0"/>
+              </a:spcBef>
+              <a:defRPr i="1" sz="2400"/>
+            </a:lvl5pPr>
           </a:lstStyle>
           <a:p>
-            <a:r>
-              <a:t>–Johnny Appleseed</a:t>
+            <a:pPr/>
+            <a:r>
+              <a:t>Body Level One</a:t>
+            </a:r>
+          </a:p>
+          <a:p>
+            <a:pPr lvl="1"/>
+            <a:r>
+              <a:t>Body Level Two</a:t>
+            </a:r>
+          </a:p>
+          <a:p>
+            <a:pPr lvl="2"/>
+            <a:r>
+              <a:t>Body Level Three</a:t>
+            </a:r>
+          </a:p>
+          <a:p>
+            <a:pPr lvl="3"/>
+            <a:r>
+              <a:t>Body Level Four</a:t>
+            </a:r>
+          </a:p>
+          <a:p>
+            <a:pPr lvl="4"/>
+            <a:r>
+              <a:t>Body Level Five</a:t>
             </a:r>
           </a:p>
         </p:txBody>
@@ -770,54 +783,44 @@
       <p:sp>
         <p:nvSpPr>
           <p:cNvPr id="94" name="“Type a quote here.”"/>
-          <p:cNvSpPr txBox="1">
-            <a:spLocks noGrp="1"/>
-          </p:cNvSpPr>
+          <p:cNvSpPr txBox="1"/>
           <p:nvPr>
-            <p:ph type="body" sz="quarter" idx="14"/>
+            <p:ph type="body" sz="quarter" idx="13"/>
           </p:nvPr>
         </p:nvSpPr>
         <p:spPr>
           <a:xfrm>
             <a:off x="1270000" y="4267112"/>
-            <a:ext cx="10464800" cy="609776"/>
+            <a:ext cx="10464800" cy="609777"/>
           </a:xfrm>
           <a:prstGeom prst="rect">
             <a:avLst/>
           </a:prstGeom>
         </p:spPr>
         <p:txBody>
-          <a:bodyPr>
-            <a:spAutoFit/>
-          </a:bodyPr>
-          <a:lstStyle>
-            <a:lvl1pPr marL="0" indent="0" algn="ctr">
+          <a:bodyPr/>
+          <a:lstStyle/>
+          <a:p>
+            <a:pPr marL="0" indent="0" algn="ctr" defTabSz="572516">
               <a:spcBef>
                 <a:spcPts val="0"/>
               </a:spcBef>
               <a:buSzTx/>
               <a:buNone/>
-              <a:defRPr sz="3400">
-                <a:latin typeface="+mn-lt"/>
-                <a:ea typeface="+mn-ea"/>
-                <a:cs typeface="+mn-cs"/>
+              <a:defRPr sz="3332">
+                <a:latin typeface="Helvetica Neue Medium"/>
+                <a:ea typeface="Helvetica Neue Medium"/>
+                <a:cs typeface="Helvetica Neue Medium"/>
                 <a:sym typeface="Helvetica Neue Medium"/>
               </a:defRPr>
-            </a:lvl1pPr>
-          </a:lstStyle>
-          <a:p>
-            <a:r>
-              <a:t>“Type a quote here.” </a:t>
-            </a:r>
+            </a:pPr>
           </a:p>
         </p:txBody>
       </p:sp>
       <p:sp>
         <p:nvSpPr>
           <p:cNvPr id="95" name="Slide Number"/>
-          <p:cNvSpPr txBox="1">
-            <a:spLocks noGrp="1"/>
-          </p:cNvSpPr>
+          <p:cNvSpPr txBox="1"/>
           <p:nvPr>
             <p:ph type="sldNum" sz="quarter" idx="2"/>
           </p:nvPr>
@@ -831,10 +834,8 @@
           <a:bodyPr/>
           <a:lstStyle/>
           <a:p>
-            <a:fld id="{86CB4B4D-7CA3-9044-876B-883B54F8677D}" type="slidenum">
-              <a:t>‹#›</a:t>
-            </a:fld>
-            <a:endParaRPr/>
+            <a:pPr/>
+            <a:fld id="{86CB4B4D-7CA3-9044-876B-883B54F8677D}" type="slidenum"/>
           </a:p>
         </p:txBody>
       </p:sp>
@@ -843,12 +844,12 @@
   <p:clrMapOvr>
     <a:masterClrMapping/>
   </p:clrMapOvr>
-  <p:transition spd="med"/>
+  <p:transition xmlns:p14="http://schemas.microsoft.com/office/powerpoint/2010/main" spd="med" advClick="1"/>
 </p:sldLayout>
 </file>
 
 <file path=ppt/slideLayouts/slideLayout11.xml><?xml version="1.0" encoding="utf-8"?>
-<p:sldLayout xmlns:a="http://schemas.openxmlformats.org/drawingml/2006/main" xmlns:r="http://schemas.openxmlformats.org/officeDocument/2006/relationships" xmlns:p="http://schemas.openxmlformats.org/presentationml/2006/main" type="tx">
+<p:sldLayout xmlns:a="http://schemas.openxmlformats.org/drawingml/2006/main" xmlns:r="http://schemas.openxmlformats.org/officeDocument/2006/relationships" xmlns:p="http://schemas.openxmlformats.org/presentationml/2006/main" xmlns:m="http://schemas.openxmlformats.org/officeDocument/2006/math" xmlns:a14="http://schemas.microsoft.com/office/drawing/2010/main" type="tx" showMasterSp="1" showMasterPhAnim="1">
   <p:cSld name="Photo">
     <p:spTree>
       <p:nvGrpSpPr>
@@ -867,9 +868,7 @@
       <p:sp>
         <p:nvSpPr>
           <p:cNvPr id="102" name="Image"/>
-          <p:cNvSpPr>
-            <a:spLocks noGrp="1"/>
-          </p:cNvSpPr>
+          <p:cNvSpPr/>
           <p:nvPr>
             <p:ph type="pic" idx="13"/>
           </p:nvPr>
@@ -889,16 +888,14 @@
           </a:bodyPr>
           <a:lstStyle/>
           <a:p>
-            <a:endParaRPr/>
+            <a:pPr/>
           </a:p>
         </p:txBody>
       </p:sp>
       <p:sp>
         <p:nvSpPr>
           <p:cNvPr id="103" name="Slide Number"/>
-          <p:cNvSpPr txBox="1">
-            <a:spLocks noGrp="1"/>
-          </p:cNvSpPr>
+          <p:cNvSpPr txBox="1"/>
           <p:nvPr>
             <p:ph type="sldNum" sz="quarter" idx="2"/>
           </p:nvPr>
@@ -912,10 +909,8 @@
           <a:bodyPr/>
           <a:lstStyle/>
           <a:p>
-            <a:fld id="{86CB4B4D-7CA3-9044-876B-883B54F8677D}" type="slidenum">
-              <a:t>‹#›</a:t>
-            </a:fld>
-            <a:endParaRPr/>
+            <a:pPr/>
+            <a:fld id="{86CB4B4D-7CA3-9044-876B-883B54F8677D}" type="slidenum"/>
           </a:p>
         </p:txBody>
       </p:sp>
@@ -924,12 +919,12 @@
   <p:clrMapOvr>
     <a:masterClrMapping/>
   </p:clrMapOvr>
-  <p:transition spd="med"/>
+  <p:transition xmlns:p14="http://schemas.microsoft.com/office/powerpoint/2010/main" spd="med" advClick="1"/>
 </p:sldLayout>
 </file>
 
 <file path=ppt/slideLayouts/slideLayout12.xml><?xml version="1.0" encoding="utf-8"?>
-<p:sldLayout xmlns:a="http://schemas.openxmlformats.org/drawingml/2006/main" xmlns:r="http://schemas.openxmlformats.org/officeDocument/2006/relationships" xmlns:p="http://schemas.openxmlformats.org/presentationml/2006/main" type="tx">
+<p:sldLayout xmlns:a="http://schemas.openxmlformats.org/drawingml/2006/main" xmlns:r="http://schemas.openxmlformats.org/officeDocument/2006/relationships" xmlns:p="http://schemas.openxmlformats.org/presentationml/2006/main" xmlns:m="http://schemas.openxmlformats.org/officeDocument/2006/math" xmlns:a14="http://schemas.microsoft.com/office/drawing/2010/main" type="tx" showMasterSp="1" showMasterPhAnim="1">
   <p:cSld name="Blank">
     <p:spTree>
       <p:nvGrpSpPr>
@@ -948,9 +943,7 @@
       <p:sp>
         <p:nvSpPr>
           <p:cNvPr id="110" name="Slide Number"/>
-          <p:cNvSpPr txBox="1">
-            <a:spLocks noGrp="1"/>
-          </p:cNvSpPr>
+          <p:cNvSpPr txBox="1"/>
           <p:nvPr>
             <p:ph type="sldNum" sz="quarter" idx="2"/>
           </p:nvPr>
@@ -964,10 +957,8 @@
           <a:bodyPr/>
           <a:lstStyle/>
           <a:p>
-            <a:fld id="{86CB4B4D-7CA3-9044-876B-883B54F8677D}" type="slidenum">
-              <a:t>‹#›</a:t>
-            </a:fld>
-            <a:endParaRPr/>
+            <a:pPr/>
+            <a:fld id="{86CB4B4D-7CA3-9044-876B-883B54F8677D}" type="slidenum"/>
           </a:p>
         </p:txBody>
       </p:sp>
@@ -976,12 +967,12 @@
   <p:clrMapOvr>
     <a:masterClrMapping/>
   </p:clrMapOvr>
-  <p:transition spd="med"/>
+  <p:transition xmlns:p14="http://schemas.microsoft.com/office/powerpoint/2010/main" spd="med" advClick="1"/>
 </p:sldLayout>
 </file>
 
 <file path=ppt/slideLayouts/slideLayout2.xml><?xml version="1.0" encoding="utf-8"?>
-<p:sldLayout xmlns:a="http://schemas.openxmlformats.org/drawingml/2006/main" xmlns:r="http://schemas.openxmlformats.org/officeDocument/2006/relationships" xmlns:p="http://schemas.openxmlformats.org/presentationml/2006/main" type="tx">
+<p:sldLayout xmlns:a="http://schemas.openxmlformats.org/drawingml/2006/main" xmlns:r="http://schemas.openxmlformats.org/officeDocument/2006/relationships" xmlns:p="http://schemas.openxmlformats.org/presentationml/2006/main" xmlns:m="http://schemas.openxmlformats.org/officeDocument/2006/math" xmlns:a14="http://schemas.microsoft.com/office/drawing/2010/main" type="tx" showMasterSp="1" showMasterPhAnim="1">
   <p:cSld name="Photo - Horizontal">
     <p:spTree>
       <p:nvGrpSpPr>
@@ -1000,9 +991,7 @@
       <p:sp>
         <p:nvSpPr>
           <p:cNvPr id="20" name="Image"/>
-          <p:cNvSpPr>
-            <a:spLocks noGrp="1"/>
-          </p:cNvSpPr>
+          <p:cNvSpPr/>
           <p:nvPr>
             <p:ph type="pic" idx="13"/>
           </p:nvPr>
@@ -1022,16 +1011,14 @@
           </a:bodyPr>
           <a:lstStyle/>
           <a:p>
-            <a:endParaRPr/>
+            <a:pPr/>
           </a:p>
         </p:txBody>
       </p:sp>
       <p:sp>
         <p:nvSpPr>
           <p:cNvPr id="21" name="Title Text"/>
-          <p:cNvSpPr txBox="1">
-            <a:spLocks noGrp="1"/>
-          </p:cNvSpPr>
+          <p:cNvSpPr txBox="1"/>
           <p:nvPr>
             <p:ph type="title"/>
           </p:nvPr>
@@ -1049,6 +1036,7 @@
           <a:bodyPr anchor="b"/>
           <a:lstStyle/>
           <a:p>
+            <a:pPr/>
             <a:r>
               <a:t>Title Text</a:t>
             </a:r>
@@ -1058,9 +1046,7 @@
       <p:sp>
         <p:nvSpPr>
           <p:cNvPr id="22" name="Body Level One…"/>
-          <p:cNvSpPr txBox="1">
-            <a:spLocks noGrp="1"/>
-          </p:cNvSpPr>
+          <p:cNvSpPr txBox="1"/>
           <p:nvPr>
             <p:ph type="body" sz="quarter" idx="1"/>
           </p:nvPr>
@@ -1119,6 +1105,7 @@
             </a:lvl5pPr>
           </a:lstStyle>
           <a:p>
+            <a:pPr/>
             <a:r>
               <a:t>Body Level One</a:t>
             </a:r>
@@ -1152,9 +1139,7 @@
       <p:sp>
         <p:nvSpPr>
           <p:cNvPr id="23" name="Slide Number"/>
-          <p:cNvSpPr txBox="1">
-            <a:spLocks noGrp="1"/>
-          </p:cNvSpPr>
+          <p:cNvSpPr txBox="1"/>
           <p:nvPr>
             <p:ph type="sldNum" sz="quarter" idx="2"/>
           </p:nvPr>
@@ -1168,10 +1153,8 @@
           <a:bodyPr/>
           <a:lstStyle/>
           <a:p>
-            <a:fld id="{86CB4B4D-7CA3-9044-876B-883B54F8677D}" type="slidenum">
-              <a:t>‹#›</a:t>
-            </a:fld>
-            <a:endParaRPr/>
+            <a:pPr/>
+            <a:fld id="{86CB4B4D-7CA3-9044-876B-883B54F8677D}" type="slidenum"/>
           </a:p>
         </p:txBody>
       </p:sp>
@@ -1180,12 +1163,12 @@
   <p:clrMapOvr>
     <a:masterClrMapping/>
   </p:clrMapOvr>
-  <p:transition spd="med"/>
+  <p:transition xmlns:p14="http://schemas.microsoft.com/office/powerpoint/2010/main" spd="med" advClick="1"/>
 </p:sldLayout>
 </file>
 
 <file path=ppt/slideLayouts/slideLayout3.xml><?xml version="1.0" encoding="utf-8"?>
-<p:sldLayout xmlns:a="http://schemas.openxmlformats.org/drawingml/2006/main" xmlns:r="http://schemas.openxmlformats.org/officeDocument/2006/relationships" xmlns:p="http://schemas.openxmlformats.org/presentationml/2006/main" type="tx">
+<p:sldLayout xmlns:a="http://schemas.openxmlformats.org/drawingml/2006/main" xmlns:r="http://schemas.openxmlformats.org/officeDocument/2006/relationships" xmlns:p="http://schemas.openxmlformats.org/presentationml/2006/main" xmlns:m="http://schemas.openxmlformats.org/officeDocument/2006/math" xmlns:a14="http://schemas.microsoft.com/office/drawing/2010/main" type="tx" showMasterSp="1" showMasterPhAnim="1">
   <p:cSld name="Title - Center">
     <p:spTree>
       <p:nvGrpSpPr>
@@ -1204,9 +1187,7 @@
       <p:sp>
         <p:nvSpPr>
           <p:cNvPr id="30" name="Title Text"/>
-          <p:cNvSpPr txBox="1">
-            <a:spLocks noGrp="1"/>
-          </p:cNvSpPr>
+          <p:cNvSpPr txBox="1"/>
           <p:nvPr>
             <p:ph type="title"/>
           </p:nvPr>
@@ -1224,6 +1205,7 @@
           <a:bodyPr/>
           <a:lstStyle/>
           <a:p>
+            <a:pPr/>
             <a:r>
               <a:t>Title Text</a:t>
             </a:r>
@@ -1233,9 +1215,7 @@
       <p:sp>
         <p:nvSpPr>
           <p:cNvPr id="31" name="Slide Number"/>
-          <p:cNvSpPr txBox="1">
-            <a:spLocks noGrp="1"/>
-          </p:cNvSpPr>
+          <p:cNvSpPr txBox="1"/>
           <p:nvPr>
             <p:ph type="sldNum" sz="quarter" idx="2"/>
           </p:nvPr>
@@ -1249,10 +1229,8 @@
           <a:bodyPr/>
           <a:lstStyle/>
           <a:p>
-            <a:fld id="{86CB4B4D-7CA3-9044-876B-883B54F8677D}" type="slidenum">
-              <a:t>‹#›</a:t>
-            </a:fld>
-            <a:endParaRPr/>
+            <a:pPr/>
+            <a:fld id="{86CB4B4D-7CA3-9044-876B-883B54F8677D}" type="slidenum"/>
           </a:p>
         </p:txBody>
       </p:sp>
@@ -1261,12 +1239,12 @@
   <p:clrMapOvr>
     <a:masterClrMapping/>
   </p:clrMapOvr>
-  <p:transition spd="med"/>
+  <p:transition xmlns:p14="http://schemas.microsoft.com/office/powerpoint/2010/main" spd="med" advClick="1"/>
 </p:sldLayout>
 </file>
 
 <file path=ppt/slideLayouts/slideLayout4.xml><?xml version="1.0" encoding="utf-8"?>
-<p:sldLayout xmlns:a="http://schemas.openxmlformats.org/drawingml/2006/main" xmlns:r="http://schemas.openxmlformats.org/officeDocument/2006/relationships" xmlns:p="http://schemas.openxmlformats.org/presentationml/2006/main" type="tx">
+<p:sldLayout xmlns:a="http://schemas.openxmlformats.org/drawingml/2006/main" xmlns:r="http://schemas.openxmlformats.org/officeDocument/2006/relationships" xmlns:p="http://schemas.openxmlformats.org/presentationml/2006/main" xmlns:m="http://schemas.openxmlformats.org/officeDocument/2006/math" xmlns:a14="http://schemas.microsoft.com/office/drawing/2010/main" type="tx" showMasterSp="1" showMasterPhAnim="1">
   <p:cSld name="Photo - Vertical">
     <p:spTree>
       <p:nvGrpSpPr>
@@ -1285,9 +1263,7 @@
       <p:sp>
         <p:nvSpPr>
           <p:cNvPr id="38" name="Image"/>
-          <p:cNvSpPr>
-            <a:spLocks noGrp="1"/>
-          </p:cNvSpPr>
+          <p:cNvSpPr/>
           <p:nvPr>
             <p:ph type="pic" sz="half" idx="13"/>
           </p:nvPr>
@@ -1307,16 +1283,14 @@
           </a:bodyPr>
           <a:lstStyle/>
           <a:p>
-            <a:endParaRPr/>
+            <a:pPr/>
           </a:p>
         </p:txBody>
       </p:sp>
       <p:sp>
         <p:nvSpPr>
           <p:cNvPr id="39" name="Title Text"/>
-          <p:cNvSpPr txBox="1">
-            <a:spLocks noGrp="1"/>
-          </p:cNvSpPr>
+          <p:cNvSpPr txBox="1"/>
           <p:nvPr>
             <p:ph type="title"/>
           </p:nvPr>
@@ -1338,6 +1312,7 @@
             </a:lvl1pPr>
           </a:lstStyle>
           <a:p>
+            <a:pPr/>
             <a:r>
               <a:t>Title Text</a:t>
             </a:r>
@@ -1347,9 +1322,7 @@
       <p:sp>
         <p:nvSpPr>
           <p:cNvPr id="40" name="Body Level One…"/>
-          <p:cNvSpPr txBox="1">
-            <a:spLocks noGrp="1"/>
-          </p:cNvSpPr>
+          <p:cNvSpPr txBox="1"/>
           <p:nvPr>
             <p:ph type="body" sz="quarter" idx="1"/>
           </p:nvPr>
@@ -1408,6 +1381,7 @@
             </a:lvl5pPr>
           </a:lstStyle>
           <a:p>
+            <a:pPr/>
             <a:r>
               <a:t>Body Level One</a:t>
             </a:r>
@@ -1441,9 +1415,7 @@
       <p:sp>
         <p:nvSpPr>
           <p:cNvPr id="41" name="Slide Number"/>
-          <p:cNvSpPr txBox="1">
-            <a:spLocks noGrp="1"/>
-          </p:cNvSpPr>
+          <p:cNvSpPr txBox="1"/>
           <p:nvPr>
             <p:ph type="sldNum" sz="quarter" idx="2"/>
           </p:nvPr>
@@ -1457,10 +1429,8 @@
           <a:bodyPr/>
           <a:lstStyle/>
           <a:p>
-            <a:fld id="{86CB4B4D-7CA3-9044-876B-883B54F8677D}" type="slidenum">
-              <a:t>‹#›</a:t>
-            </a:fld>
-            <a:endParaRPr/>
+            <a:pPr/>
+            <a:fld id="{86CB4B4D-7CA3-9044-876B-883B54F8677D}" type="slidenum"/>
           </a:p>
         </p:txBody>
       </p:sp>
@@ -1469,12 +1439,12 @@
   <p:clrMapOvr>
     <a:masterClrMapping/>
   </p:clrMapOvr>
-  <p:transition spd="med"/>
+  <p:transition xmlns:p14="http://schemas.microsoft.com/office/powerpoint/2010/main" spd="med" advClick="1"/>
 </p:sldLayout>
 </file>
 
 <file path=ppt/slideLayouts/slideLayout5.xml><?xml version="1.0" encoding="utf-8"?>
-<p:sldLayout xmlns:a="http://schemas.openxmlformats.org/drawingml/2006/main" xmlns:r="http://schemas.openxmlformats.org/officeDocument/2006/relationships" xmlns:p="http://schemas.openxmlformats.org/presentationml/2006/main" type="tx">
+<p:sldLayout xmlns:a="http://schemas.openxmlformats.org/drawingml/2006/main" xmlns:r="http://schemas.openxmlformats.org/officeDocument/2006/relationships" xmlns:p="http://schemas.openxmlformats.org/presentationml/2006/main" xmlns:m="http://schemas.openxmlformats.org/officeDocument/2006/math" xmlns:a14="http://schemas.microsoft.com/office/drawing/2010/main" type="tx" showMasterSp="1" showMasterPhAnim="1">
   <p:cSld name="Title - Top">
     <p:spTree>
       <p:nvGrpSpPr>
@@ -1493,9 +1463,7 @@
       <p:sp>
         <p:nvSpPr>
           <p:cNvPr id="48" name="Title Text"/>
-          <p:cNvSpPr txBox="1">
-            <a:spLocks noGrp="1"/>
-          </p:cNvSpPr>
+          <p:cNvSpPr txBox="1"/>
           <p:nvPr>
             <p:ph type="title"/>
           </p:nvPr>
@@ -1509,6 +1477,7 @@
           <a:bodyPr/>
           <a:lstStyle/>
           <a:p>
+            <a:pPr/>
             <a:r>
               <a:t>Title Text</a:t>
             </a:r>
@@ -1518,9 +1487,7 @@
       <p:sp>
         <p:nvSpPr>
           <p:cNvPr id="49" name="Slide Number"/>
-          <p:cNvSpPr txBox="1">
-            <a:spLocks noGrp="1"/>
-          </p:cNvSpPr>
+          <p:cNvSpPr txBox="1"/>
           <p:nvPr>
             <p:ph type="sldNum" sz="quarter" idx="2"/>
           </p:nvPr>
@@ -1534,10 +1501,8 @@
           <a:bodyPr/>
           <a:lstStyle/>
           <a:p>
-            <a:fld id="{86CB4B4D-7CA3-9044-876B-883B54F8677D}" type="slidenum">
-              <a:t>‹#›</a:t>
-            </a:fld>
-            <a:endParaRPr/>
+            <a:pPr/>
+            <a:fld id="{86CB4B4D-7CA3-9044-876B-883B54F8677D}" type="slidenum"/>
           </a:p>
         </p:txBody>
       </p:sp>
@@ -1546,12 +1511,12 @@
   <p:clrMapOvr>
     <a:masterClrMapping/>
   </p:clrMapOvr>
-  <p:transition spd="med"/>
+  <p:transition xmlns:p14="http://schemas.microsoft.com/office/powerpoint/2010/main" spd="med" advClick="1"/>
 </p:sldLayout>
 </file>
 
 <file path=ppt/slideLayouts/slideLayout6.xml><?xml version="1.0" encoding="utf-8"?>
-<p:sldLayout xmlns:a="http://schemas.openxmlformats.org/drawingml/2006/main" xmlns:r="http://schemas.openxmlformats.org/officeDocument/2006/relationships" xmlns:p="http://schemas.openxmlformats.org/presentationml/2006/main" type="tx">
+<p:sldLayout xmlns:a="http://schemas.openxmlformats.org/drawingml/2006/main" xmlns:r="http://schemas.openxmlformats.org/officeDocument/2006/relationships" xmlns:p="http://schemas.openxmlformats.org/presentationml/2006/main" xmlns:m="http://schemas.openxmlformats.org/officeDocument/2006/math" xmlns:a14="http://schemas.microsoft.com/office/drawing/2010/main" type="tx" showMasterSp="1" showMasterPhAnim="1">
   <p:cSld name="Title &amp; Bullets">
     <p:spTree>
       <p:nvGrpSpPr>
@@ -1570,9 +1535,7 @@
       <p:sp>
         <p:nvSpPr>
           <p:cNvPr id="56" name="Title Text"/>
-          <p:cNvSpPr txBox="1">
-            <a:spLocks noGrp="1"/>
-          </p:cNvSpPr>
+          <p:cNvSpPr txBox="1"/>
           <p:nvPr>
             <p:ph type="title"/>
           </p:nvPr>
@@ -1586,6 +1549,7 @@
           <a:bodyPr/>
           <a:lstStyle/>
           <a:p>
+            <a:pPr/>
             <a:r>
               <a:t>Title Text</a:t>
             </a:r>
@@ -1595,9 +1559,7 @@
       <p:sp>
         <p:nvSpPr>
           <p:cNvPr id="57" name="Body Level One…"/>
-          <p:cNvSpPr txBox="1">
-            <a:spLocks noGrp="1"/>
-          </p:cNvSpPr>
+          <p:cNvSpPr txBox="1"/>
           <p:nvPr>
             <p:ph type="body" idx="1"/>
           </p:nvPr>
@@ -1611,6 +1573,7 @@
           <a:bodyPr/>
           <a:lstStyle/>
           <a:p>
+            <a:pPr/>
             <a:r>
               <a:t>Body Level One</a:t>
             </a:r>
@@ -1644,9 +1607,7 @@
       <p:sp>
         <p:nvSpPr>
           <p:cNvPr id="58" name="Slide Number"/>
-          <p:cNvSpPr txBox="1">
-            <a:spLocks noGrp="1"/>
-          </p:cNvSpPr>
+          <p:cNvSpPr txBox="1"/>
           <p:nvPr>
             <p:ph type="sldNum" sz="quarter" idx="2"/>
           </p:nvPr>
@@ -1660,10 +1621,8 @@
           <a:bodyPr/>
           <a:lstStyle/>
           <a:p>
-            <a:fld id="{86CB4B4D-7CA3-9044-876B-883B54F8677D}" type="slidenum">
-              <a:t>‹#›</a:t>
-            </a:fld>
-            <a:endParaRPr/>
+            <a:pPr/>
+            <a:fld id="{86CB4B4D-7CA3-9044-876B-883B54F8677D}" type="slidenum"/>
           </a:p>
         </p:txBody>
       </p:sp>
@@ -1672,12 +1631,12 @@
   <p:clrMapOvr>
     <a:masterClrMapping/>
   </p:clrMapOvr>
-  <p:transition spd="med"/>
+  <p:transition xmlns:p14="http://schemas.microsoft.com/office/powerpoint/2010/main" spd="med" advClick="1"/>
 </p:sldLayout>
 </file>
 
 <file path=ppt/slideLayouts/slideLayout7.xml><?xml version="1.0" encoding="utf-8"?>
-<p:sldLayout xmlns:a="http://schemas.openxmlformats.org/drawingml/2006/main" xmlns:r="http://schemas.openxmlformats.org/officeDocument/2006/relationships" xmlns:p="http://schemas.openxmlformats.org/presentationml/2006/main" type="tx">
+<p:sldLayout xmlns:a="http://schemas.openxmlformats.org/drawingml/2006/main" xmlns:r="http://schemas.openxmlformats.org/officeDocument/2006/relationships" xmlns:p="http://schemas.openxmlformats.org/presentationml/2006/main" xmlns:m="http://schemas.openxmlformats.org/officeDocument/2006/math" xmlns:a14="http://schemas.microsoft.com/office/drawing/2010/main" type="tx" showMasterSp="1" showMasterPhAnim="1">
   <p:cSld name="Title, Bullets &amp; Photo">
     <p:spTree>
       <p:nvGrpSpPr>
@@ -1696,9 +1655,7 @@
       <p:sp>
         <p:nvSpPr>
           <p:cNvPr id="65" name="Image"/>
-          <p:cNvSpPr>
-            <a:spLocks noGrp="1"/>
-          </p:cNvSpPr>
+          <p:cNvSpPr/>
           <p:nvPr>
             <p:ph type="pic" sz="half" idx="13"/>
           </p:nvPr>
@@ -1718,16 +1675,14 @@
           </a:bodyPr>
           <a:lstStyle/>
           <a:p>
-            <a:endParaRPr/>
+            <a:pPr/>
           </a:p>
         </p:txBody>
       </p:sp>
       <p:sp>
         <p:nvSpPr>
           <p:cNvPr id="66" name="Title Text"/>
-          <p:cNvSpPr txBox="1">
-            <a:spLocks noGrp="1"/>
-          </p:cNvSpPr>
+          <p:cNvSpPr txBox="1"/>
           <p:nvPr>
             <p:ph type="title"/>
           </p:nvPr>
@@ -1741,6 +1696,7 @@
           <a:bodyPr/>
           <a:lstStyle/>
           <a:p>
+            <a:pPr/>
             <a:r>
               <a:t>Title Text</a:t>
             </a:r>
@@ -1750,9 +1706,7 @@
       <p:sp>
         <p:nvSpPr>
           <p:cNvPr id="67" name="Body Level One…"/>
-          <p:cNvSpPr txBox="1">
-            <a:spLocks noGrp="1"/>
-          </p:cNvSpPr>
+          <p:cNvSpPr txBox="1"/>
           <p:nvPr>
             <p:ph type="body" sz="half" idx="1"/>
           </p:nvPr>
@@ -1801,6 +1755,7 @@
             </a:lvl5pPr>
           </a:lstStyle>
           <a:p>
+            <a:pPr/>
             <a:r>
               <a:t>Body Level One</a:t>
             </a:r>
@@ -1834,9 +1789,7 @@
       <p:sp>
         <p:nvSpPr>
           <p:cNvPr id="68" name="Slide Number"/>
-          <p:cNvSpPr txBox="1">
-            <a:spLocks noGrp="1"/>
-          </p:cNvSpPr>
+          <p:cNvSpPr txBox="1"/>
           <p:nvPr>
             <p:ph type="sldNum" sz="quarter" idx="2"/>
           </p:nvPr>
@@ -1863,10 +1816,8 @@
             </a:lvl1pPr>
           </a:lstStyle>
           <a:p>
-            <a:fld id="{86CB4B4D-7CA3-9044-876B-883B54F8677D}" type="slidenum">
-              <a:t>‹#›</a:t>
-            </a:fld>
-            <a:endParaRPr/>
+            <a:pPr/>
+            <a:fld id="{86CB4B4D-7CA3-9044-876B-883B54F8677D}" type="slidenum"/>
           </a:p>
         </p:txBody>
       </p:sp>
@@ -1875,12 +1826,12 @@
   <p:clrMapOvr>
     <a:masterClrMapping/>
   </p:clrMapOvr>
-  <p:transition spd="med"/>
+  <p:transition xmlns:p14="http://schemas.microsoft.com/office/powerpoint/2010/main" spd="med" advClick="1"/>
 </p:sldLayout>
 </file>
 
 <file path=ppt/slideLayouts/slideLayout8.xml><?xml version="1.0" encoding="utf-8"?>
-<p:sldLayout xmlns:a="http://schemas.openxmlformats.org/drawingml/2006/main" xmlns:r="http://schemas.openxmlformats.org/officeDocument/2006/relationships" xmlns:p="http://schemas.openxmlformats.org/presentationml/2006/main" type="tx">
+<p:sldLayout xmlns:a="http://schemas.openxmlformats.org/drawingml/2006/main" xmlns:r="http://schemas.openxmlformats.org/officeDocument/2006/relationships" xmlns:p="http://schemas.openxmlformats.org/presentationml/2006/main" xmlns:m="http://schemas.openxmlformats.org/officeDocument/2006/math" xmlns:a14="http://schemas.microsoft.com/office/drawing/2010/main" type="tx" showMasterSp="1" showMasterPhAnim="1">
   <p:cSld name="Bullets">
     <p:spTree>
       <p:nvGrpSpPr>
@@ -1899,9 +1850,7 @@
       <p:sp>
         <p:nvSpPr>
           <p:cNvPr id="75" name="Body Level One…"/>
-          <p:cNvSpPr txBox="1">
-            <a:spLocks noGrp="1"/>
-          </p:cNvSpPr>
+          <p:cNvSpPr txBox="1"/>
           <p:nvPr>
             <p:ph type="body" idx="1"/>
           </p:nvPr>
@@ -1919,6 +1868,7 @@
           <a:bodyPr/>
           <a:lstStyle/>
           <a:p>
+            <a:pPr/>
             <a:r>
               <a:t>Body Level One</a:t>
             </a:r>
@@ -1952,9 +1902,7 @@
       <p:sp>
         <p:nvSpPr>
           <p:cNvPr id="76" name="Slide Number"/>
-          <p:cNvSpPr txBox="1">
-            <a:spLocks noGrp="1"/>
-          </p:cNvSpPr>
+          <p:cNvSpPr txBox="1"/>
           <p:nvPr>
             <p:ph type="sldNum" sz="quarter" idx="2"/>
           </p:nvPr>
@@ -1968,10 +1916,8 @@
           <a:bodyPr/>
           <a:lstStyle/>
           <a:p>
-            <a:fld id="{86CB4B4D-7CA3-9044-876B-883B54F8677D}" type="slidenum">
-              <a:t>‹#›</a:t>
-            </a:fld>
-            <a:endParaRPr/>
+            <a:pPr/>
+            <a:fld id="{86CB4B4D-7CA3-9044-876B-883B54F8677D}" type="slidenum"/>
           </a:p>
         </p:txBody>
       </p:sp>
@@ -1980,12 +1926,12 @@
   <p:clrMapOvr>
     <a:masterClrMapping/>
   </p:clrMapOvr>
-  <p:transition spd="med"/>
+  <p:transition xmlns:p14="http://schemas.microsoft.com/office/powerpoint/2010/main" spd="med" advClick="1"/>
 </p:sldLayout>
 </file>
 
 <file path=ppt/slideLayouts/slideLayout9.xml><?xml version="1.0" encoding="utf-8"?>
-<p:sldLayout xmlns:a="http://schemas.openxmlformats.org/drawingml/2006/main" xmlns:r="http://schemas.openxmlformats.org/officeDocument/2006/relationships" xmlns:p="http://schemas.openxmlformats.org/presentationml/2006/main" type="tx">
+<p:sldLayout xmlns:a="http://schemas.openxmlformats.org/drawingml/2006/main" xmlns:r="http://schemas.openxmlformats.org/officeDocument/2006/relationships" xmlns:p="http://schemas.openxmlformats.org/presentationml/2006/main" xmlns:m="http://schemas.openxmlformats.org/officeDocument/2006/math" xmlns:a14="http://schemas.microsoft.com/office/drawing/2010/main" type="tx" showMasterSp="1" showMasterPhAnim="1">
   <p:cSld name="Photo - 3 Up">
     <p:spTree>
       <p:nvGrpSpPr>
@@ -2004,9 +1950,7 @@
       <p:sp>
         <p:nvSpPr>
           <p:cNvPr id="83" name="Image"/>
-          <p:cNvSpPr>
-            <a:spLocks noGrp="1"/>
-          </p:cNvSpPr>
+          <p:cNvSpPr/>
           <p:nvPr>
             <p:ph type="pic" sz="quarter" idx="13"/>
           </p:nvPr>
@@ -2026,16 +1970,14 @@
           </a:bodyPr>
           <a:lstStyle/>
           <a:p>
-            <a:endParaRPr/>
+            <a:pPr/>
           </a:p>
         </p:txBody>
       </p:sp>
       <p:sp>
         <p:nvSpPr>
           <p:cNvPr id="84" name="Image"/>
-          <p:cNvSpPr>
-            <a:spLocks noGrp="1"/>
-          </p:cNvSpPr>
+          <p:cNvSpPr/>
           <p:nvPr>
             <p:ph type="pic" sz="quarter" idx="14"/>
           </p:nvPr>
@@ -2055,16 +1997,14 @@
           </a:bodyPr>
           <a:lstStyle/>
           <a:p>
-            <a:endParaRPr/>
+            <a:pPr/>
           </a:p>
         </p:txBody>
       </p:sp>
       <p:sp>
         <p:nvSpPr>
           <p:cNvPr id="85" name="Image"/>
-          <p:cNvSpPr>
-            <a:spLocks noGrp="1"/>
-          </p:cNvSpPr>
+          <p:cNvSpPr/>
           <p:nvPr>
             <p:ph type="pic" sz="half" idx="15"/>
           </p:nvPr>
@@ -2084,16 +2024,14 @@
           </a:bodyPr>
           <a:lstStyle/>
           <a:p>
-            <a:endParaRPr/>
+            <a:pPr/>
           </a:p>
         </p:txBody>
       </p:sp>
       <p:sp>
         <p:nvSpPr>
           <p:cNvPr id="86" name="Slide Number"/>
-          <p:cNvSpPr txBox="1">
-            <a:spLocks noGrp="1"/>
-          </p:cNvSpPr>
+          <p:cNvSpPr txBox="1"/>
           <p:nvPr>
             <p:ph type="sldNum" sz="quarter" idx="2"/>
           </p:nvPr>
@@ -2107,10 +2045,8 @@
           <a:bodyPr/>
           <a:lstStyle/>
           <a:p>
-            <a:fld id="{86CB4B4D-7CA3-9044-876B-883B54F8677D}" type="slidenum">
-              <a:t>‹#›</a:t>
-            </a:fld>
-            <a:endParaRPr/>
+            <a:pPr/>
+            <a:fld id="{86CB4B4D-7CA3-9044-876B-883B54F8677D}" type="slidenum"/>
           </a:p>
         </p:txBody>
       </p:sp>
@@ -2119,19 +2055,18 @@
   <p:clrMapOvr>
     <a:masterClrMapping/>
   </p:clrMapOvr>
-  <p:transition spd="med"/>
+  <p:transition xmlns:p14="http://schemas.microsoft.com/office/powerpoint/2010/main" spd="med" advClick="1"/>
 </p:sldLayout>
 </file>
 
 <file path=ppt/slideMasters/slideMaster1.xml><?xml version="1.0" encoding="utf-8"?>
-<p:sldMaster xmlns:a="http://schemas.openxmlformats.org/drawingml/2006/main" xmlns:r="http://schemas.openxmlformats.org/officeDocument/2006/relationships" xmlns:p="http://schemas.openxmlformats.org/presentationml/2006/main">
+<p:sldMaster xmlns:a="http://schemas.openxmlformats.org/drawingml/2006/main" xmlns:r="http://schemas.openxmlformats.org/officeDocument/2006/relationships" xmlns:p="http://schemas.openxmlformats.org/presentationml/2006/main" xmlns:m="http://schemas.openxmlformats.org/officeDocument/2006/math" xmlns:a14="http://schemas.microsoft.com/office/drawing/2010/main">
   <p:cSld>
     <p:bg>
       <p:bgPr>
         <a:solidFill>
           <a:srgbClr val="FFFFFF"/>
         </a:solidFill>
-        <a:effectLst/>
       </p:bgPr>
     </p:bg>
     <p:spTree>
@@ -2151,9 +2086,7 @@
       <p:sp>
         <p:nvSpPr>
           <p:cNvPr id="2" name="Title Text"/>
-          <p:cNvSpPr txBox="1">
-            <a:spLocks noGrp="1"/>
-          </p:cNvSpPr>
+          <p:cNvSpPr txBox="1"/>
           <p:nvPr>
             <p:ph type="title"/>
           </p:nvPr>
@@ -2171,16 +2104,17 @@
           </a:ln>
           <a:extLst>
             <a:ext uri="{C572A759-6A51-4108-AA02-DFA0A04FC94B}">
-              <ma14:wrappingTextBoxFlag xmlns:ma14="http://schemas.microsoft.com/office/mac/drawingml/2011/main" xmlns="" val="1"/>
+              <ma14:wrappingTextBoxFlag xmlns:ma14="http://schemas.microsoft.com/office/mac/drawingml/2011/main" val="1"/>
             </a:ext>
           </a:extLst>
         </p:spPr>
         <p:txBody>
           <a:bodyPr lIns="50800" tIns="50800" rIns="50800" bIns="50800" anchor="ctr">
-            <a:normAutofit/>
+            <a:normAutofit fontScale="100000" lnSpcReduction="0"/>
           </a:bodyPr>
           <a:lstStyle/>
           <a:p>
+            <a:pPr/>
             <a:r>
               <a:t>Title Text</a:t>
             </a:r>
@@ -2190,9 +2124,7 @@
       <p:sp>
         <p:nvSpPr>
           <p:cNvPr id="3" name="Body Level One…"/>
-          <p:cNvSpPr txBox="1">
-            <a:spLocks noGrp="1"/>
-          </p:cNvSpPr>
+          <p:cNvSpPr txBox="1"/>
           <p:nvPr>
             <p:ph type="body" idx="1"/>
           </p:nvPr>
@@ -2210,16 +2142,17 @@
           </a:ln>
           <a:extLst>
             <a:ext uri="{C572A759-6A51-4108-AA02-DFA0A04FC94B}">
-              <ma14:wrappingTextBoxFlag xmlns:ma14="http://schemas.microsoft.com/office/mac/drawingml/2011/main" xmlns="" val="1"/>
+              <ma14:wrappingTextBoxFlag xmlns:ma14="http://schemas.microsoft.com/office/mac/drawingml/2011/main" val="1"/>
             </a:ext>
           </a:extLst>
         </p:spPr>
         <p:txBody>
           <a:bodyPr lIns="50800" tIns="50800" rIns="50800" bIns="50800" anchor="ctr">
-            <a:normAutofit/>
+            <a:normAutofit fontScale="100000" lnSpcReduction="0"/>
           </a:bodyPr>
           <a:lstStyle/>
           <a:p>
+            <a:pPr/>
             <a:r>
               <a:t>Body Level One</a:t>
             </a:r>
@@ -2253,9 +2186,7 @@
       <p:sp>
         <p:nvSpPr>
           <p:cNvPr id="4" name="Slide Number"/>
-          <p:cNvSpPr txBox="1">
-            <a:spLocks noGrp="1"/>
-          </p:cNvSpPr>
+          <p:cNvSpPr txBox="1"/>
           <p:nvPr>
             <p:ph type="sldNum" sz="quarter" idx="2"/>
           </p:nvPr>
@@ -2278,7 +2209,7 @@
           </a:bodyPr>
           <a:lstStyle>
             <a:lvl1pPr>
-              <a:defRPr sz="1600" b="0">
+              <a:defRPr sz="1600">
                 <a:latin typeface="Helvetica Neue Light"/>
                 <a:ea typeface="Helvetica Neue Light"/>
                 <a:cs typeface="Helvetica Neue Light"/>
@@ -2287,10 +2218,8 @@
             </a:lvl1pPr>
           </a:lstStyle>
           <a:p>
-            <a:fld id="{86CB4B4D-7CA3-9044-876B-883B54F8677D}" type="slidenum">
-              <a:t>‹#›</a:t>
-            </a:fld>
-            <a:endParaRPr/>
+            <a:pPr/>
+            <a:fld id="{86CB4B4D-7CA3-9044-876B-883B54F8677D}" type="slidenum"/>
           </a:p>
         </p:txBody>
       </p:sp>
@@ -2298,20 +2227,20 @@
   </p:cSld>
   <p:clrMap bg1="lt1" tx1="dk1" bg2="lt2" tx2="dk2" accent1="accent1" accent2="accent2" accent3="accent3" accent4="accent4" accent5="accent5" accent6="accent6" hlink="hlink" folHlink="folHlink"/>
   <p:sldLayoutIdLst>
-    <p:sldLayoutId id="2147483649" r:id="rId1"/>
-    <p:sldLayoutId id="2147483650" r:id="rId2"/>
-    <p:sldLayoutId id="2147483651" r:id="rId3"/>
-    <p:sldLayoutId id="2147483652" r:id="rId4"/>
-    <p:sldLayoutId id="2147483653" r:id="rId5"/>
-    <p:sldLayoutId id="2147483654" r:id="rId6"/>
-    <p:sldLayoutId id="2147483655" r:id="rId7"/>
-    <p:sldLayoutId id="2147483656" r:id="rId8"/>
-    <p:sldLayoutId id="2147483657" r:id="rId9"/>
-    <p:sldLayoutId id="2147483658" r:id="rId10"/>
-    <p:sldLayoutId id="2147483659" r:id="rId11"/>
-    <p:sldLayoutId id="2147483660" r:id="rId12"/>
+    <p:sldLayoutId id="2147483649" r:id="rId2"/>
+    <p:sldLayoutId id="2147483650" r:id="rId3"/>
+    <p:sldLayoutId id="2147483651" r:id="rId4"/>
+    <p:sldLayoutId id="2147483652" r:id="rId5"/>
+    <p:sldLayoutId id="2147483653" r:id="rId6"/>
+    <p:sldLayoutId id="2147483654" r:id="rId7"/>
+    <p:sldLayoutId id="2147483655" r:id="rId8"/>
+    <p:sldLayoutId id="2147483656" r:id="rId9"/>
+    <p:sldLayoutId id="2147483657" r:id="rId10"/>
+    <p:sldLayoutId id="2147483658" r:id="rId11"/>
+    <p:sldLayoutId id="2147483659" r:id="rId12"/>
+    <p:sldLayoutId id="2147483660" r:id="rId13"/>
   </p:sldLayoutIdLst>
-  <p:transition spd="med"/>
+  <p:transition xmlns:p14="http://schemas.microsoft.com/office/powerpoint/2010/main" spd="med" advClick="1"/>
   <p:txStyles>
     <p:titleStyle>
       <a:lvl1pPr marL="0" marR="0" indent="0" algn="ctr" defTabSz="584200" rtl="0" latinLnBrk="0">
@@ -2329,7 +2258,7 @@
         <a:buFontTx/>
         <a:buNone/>
         <a:tabLst/>
-        <a:defRPr sz="8000" b="0" i="0" u="none" strike="noStrike" cap="none" spc="0" baseline="0">
+        <a:defRPr b="0" baseline="0" cap="none" i="0" spc="0" strike="noStrike" sz="8000" u="none">
           <a:ln>
             <a:noFill/>
           </a:ln>
@@ -2337,9 +2266,9 @@
             <a:srgbClr val="000000"/>
           </a:solidFill>
           <a:uFillTx/>
-          <a:latin typeface="+mn-lt"/>
-          <a:ea typeface="+mn-ea"/>
-          <a:cs typeface="+mn-cs"/>
+          <a:latin typeface="Helvetica Neue Medium"/>
+          <a:ea typeface="Helvetica Neue Medium"/>
+          <a:cs typeface="Helvetica Neue Medium"/>
           <a:sym typeface="Helvetica Neue Medium"/>
         </a:defRPr>
       </a:lvl1pPr>
@@ -2358,7 +2287,7 @@
         <a:buFontTx/>
         <a:buNone/>
         <a:tabLst/>
-        <a:defRPr sz="8000" b="0" i="0" u="none" strike="noStrike" cap="none" spc="0" baseline="0">
+        <a:defRPr b="0" baseline="0" cap="none" i="0" spc="0" strike="noStrike" sz="8000" u="none">
           <a:ln>
             <a:noFill/>
           </a:ln>
@@ -2366,9 +2295,9 @@
             <a:srgbClr val="000000"/>
           </a:solidFill>
           <a:uFillTx/>
-          <a:latin typeface="+mn-lt"/>
-          <a:ea typeface="+mn-ea"/>
-          <a:cs typeface="+mn-cs"/>
+          <a:latin typeface="Helvetica Neue Medium"/>
+          <a:ea typeface="Helvetica Neue Medium"/>
+          <a:cs typeface="Helvetica Neue Medium"/>
           <a:sym typeface="Helvetica Neue Medium"/>
         </a:defRPr>
       </a:lvl2pPr>
@@ -2387,7 +2316,7 @@
         <a:buFontTx/>
         <a:buNone/>
         <a:tabLst/>
-        <a:defRPr sz="8000" b="0" i="0" u="none" strike="noStrike" cap="none" spc="0" baseline="0">
+        <a:defRPr b="0" baseline="0" cap="none" i="0" spc="0" strike="noStrike" sz="8000" u="none">
           <a:ln>
             <a:noFill/>
           </a:ln>
@@ -2395,9 +2324,9 @@
             <a:srgbClr val="000000"/>
           </a:solidFill>
           <a:uFillTx/>
-          <a:latin typeface="+mn-lt"/>
-          <a:ea typeface="+mn-ea"/>
-          <a:cs typeface="+mn-cs"/>
+          <a:latin typeface="Helvetica Neue Medium"/>
+          <a:ea typeface="Helvetica Neue Medium"/>
+          <a:cs typeface="Helvetica Neue Medium"/>
           <a:sym typeface="Helvetica Neue Medium"/>
         </a:defRPr>
       </a:lvl3pPr>
@@ -2416,7 +2345,7 @@
         <a:buFontTx/>
         <a:buNone/>
         <a:tabLst/>
-        <a:defRPr sz="8000" b="0" i="0" u="none" strike="noStrike" cap="none" spc="0" baseline="0">
+        <a:defRPr b="0" baseline="0" cap="none" i="0" spc="0" strike="noStrike" sz="8000" u="none">
           <a:ln>
             <a:noFill/>
           </a:ln>
@@ -2424,9 +2353,9 @@
             <a:srgbClr val="000000"/>
           </a:solidFill>
           <a:uFillTx/>
-          <a:latin typeface="+mn-lt"/>
-          <a:ea typeface="+mn-ea"/>
-          <a:cs typeface="+mn-cs"/>
+          <a:latin typeface="Helvetica Neue Medium"/>
+          <a:ea typeface="Helvetica Neue Medium"/>
+          <a:cs typeface="Helvetica Neue Medium"/>
           <a:sym typeface="Helvetica Neue Medium"/>
         </a:defRPr>
       </a:lvl4pPr>
@@ -2445,7 +2374,7 @@
         <a:buFontTx/>
         <a:buNone/>
         <a:tabLst/>
-        <a:defRPr sz="8000" b="0" i="0" u="none" strike="noStrike" cap="none" spc="0" baseline="0">
+        <a:defRPr b="0" baseline="0" cap="none" i="0" spc="0" strike="noStrike" sz="8000" u="none">
           <a:ln>
             <a:noFill/>
           </a:ln>
@@ -2453,9 +2382,9 @@
             <a:srgbClr val="000000"/>
           </a:solidFill>
           <a:uFillTx/>
-          <a:latin typeface="+mn-lt"/>
-          <a:ea typeface="+mn-ea"/>
-          <a:cs typeface="+mn-cs"/>
+          <a:latin typeface="Helvetica Neue Medium"/>
+          <a:ea typeface="Helvetica Neue Medium"/>
+          <a:cs typeface="Helvetica Neue Medium"/>
           <a:sym typeface="Helvetica Neue Medium"/>
         </a:defRPr>
       </a:lvl5pPr>
@@ -2474,7 +2403,7 @@
         <a:buFontTx/>
         <a:buNone/>
         <a:tabLst/>
-        <a:defRPr sz="8000" b="0" i="0" u="none" strike="noStrike" cap="none" spc="0" baseline="0">
+        <a:defRPr b="0" baseline="0" cap="none" i="0" spc="0" strike="noStrike" sz="8000" u="none">
           <a:ln>
             <a:noFill/>
           </a:ln>
@@ -2482,9 +2411,9 @@
             <a:srgbClr val="000000"/>
           </a:solidFill>
           <a:uFillTx/>
-          <a:latin typeface="+mn-lt"/>
-          <a:ea typeface="+mn-ea"/>
-          <a:cs typeface="+mn-cs"/>
+          <a:latin typeface="Helvetica Neue Medium"/>
+          <a:ea typeface="Helvetica Neue Medium"/>
+          <a:cs typeface="Helvetica Neue Medium"/>
           <a:sym typeface="Helvetica Neue Medium"/>
         </a:defRPr>
       </a:lvl6pPr>
@@ -2503,7 +2432,7 @@
         <a:buFontTx/>
         <a:buNone/>
         <a:tabLst/>
-        <a:defRPr sz="8000" b="0" i="0" u="none" strike="noStrike" cap="none" spc="0" baseline="0">
+        <a:defRPr b="0" baseline="0" cap="none" i="0" spc="0" strike="noStrike" sz="8000" u="none">
           <a:ln>
             <a:noFill/>
           </a:ln>
@@ -2511,9 +2440,9 @@
             <a:srgbClr val="000000"/>
           </a:solidFill>
           <a:uFillTx/>
-          <a:latin typeface="+mn-lt"/>
-          <a:ea typeface="+mn-ea"/>
-          <a:cs typeface="+mn-cs"/>
+          <a:latin typeface="Helvetica Neue Medium"/>
+          <a:ea typeface="Helvetica Neue Medium"/>
+          <a:cs typeface="Helvetica Neue Medium"/>
           <a:sym typeface="Helvetica Neue Medium"/>
         </a:defRPr>
       </a:lvl7pPr>
@@ -2532,7 +2461,7 @@
         <a:buFontTx/>
         <a:buNone/>
         <a:tabLst/>
-        <a:defRPr sz="8000" b="0" i="0" u="none" strike="noStrike" cap="none" spc="0" baseline="0">
+        <a:defRPr b="0" baseline="0" cap="none" i="0" spc="0" strike="noStrike" sz="8000" u="none">
           <a:ln>
             <a:noFill/>
           </a:ln>
@@ -2540,9 +2469,9 @@
             <a:srgbClr val="000000"/>
           </a:solidFill>
           <a:uFillTx/>
-          <a:latin typeface="+mn-lt"/>
-          <a:ea typeface="+mn-ea"/>
-          <a:cs typeface="+mn-cs"/>
+          <a:latin typeface="Helvetica Neue Medium"/>
+          <a:ea typeface="Helvetica Neue Medium"/>
+          <a:cs typeface="Helvetica Neue Medium"/>
           <a:sym typeface="Helvetica Neue Medium"/>
         </a:defRPr>
       </a:lvl8pPr>
@@ -2561,7 +2490,7 @@
         <a:buFontTx/>
         <a:buNone/>
         <a:tabLst/>
-        <a:defRPr sz="8000" b="0" i="0" u="none" strike="noStrike" cap="none" spc="0" baseline="0">
+        <a:defRPr b="0" baseline="0" cap="none" i="0" spc="0" strike="noStrike" sz="8000" u="none">
           <a:ln>
             <a:noFill/>
           </a:ln>
@@ -2569,9 +2498,9 @@
             <a:srgbClr val="000000"/>
           </a:solidFill>
           <a:uFillTx/>
-          <a:latin typeface="+mn-lt"/>
-          <a:ea typeface="+mn-ea"/>
-          <a:cs typeface="+mn-cs"/>
+          <a:latin typeface="Helvetica Neue Medium"/>
+          <a:ea typeface="Helvetica Neue Medium"/>
+          <a:cs typeface="Helvetica Neue Medium"/>
           <a:sym typeface="Helvetica Neue Medium"/>
         </a:defRPr>
       </a:lvl9pPr>
@@ -2592,7 +2521,7 @@
         <a:buFontTx/>
         <a:buChar char="•"/>
         <a:tabLst/>
-        <a:defRPr sz="3200" b="0" i="0" u="none" strike="noStrike" cap="none" spc="0" baseline="0">
+        <a:defRPr b="0" baseline="0" cap="none" i="0" spc="0" strike="noStrike" sz="3200" u="none">
           <a:ln>
             <a:noFill/>
           </a:ln>
@@ -2600,9 +2529,9 @@
             <a:srgbClr val="000000"/>
           </a:solidFill>
           <a:uFillTx/>
-          <a:latin typeface="Helvetica Neue"/>
-          <a:ea typeface="Helvetica Neue"/>
-          <a:cs typeface="Helvetica Neue"/>
+          <a:latin typeface="+mn-lt"/>
+          <a:ea typeface="+mn-ea"/>
+          <a:cs typeface="+mn-cs"/>
           <a:sym typeface="Helvetica Neue"/>
         </a:defRPr>
       </a:lvl1pPr>
@@ -2621,7 +2550,7 @@
         <a:buFontTx/>
         <a:buChar char="•"/>
         <a:tabLst/>
-        <a:defRPr sz="3200" b="0" i="0" u="none" strike="noStrike" cap="none" spc="0" baseline="0">
+        <a:defRPr b="0" baseline="0" cap="none" i="0" spc="0" strike="noStrike" sz="3200" u="none">
           <a:ln>
             <a:noFill/>
           </a:ln>
@@ -2629,9 +2558,9 @@
             <a:srgbClr val="000000"/>
           </a:solidFill>
           <a:uFillTx/>
-          <a:latin typeface="Helvetica Neue"/>
-          <a:ea typeface="Helvetica Neue"/>
-          <a:cs typeface="Helvetica Neue"/>
+          <a:latin typeface="+mn-lt"/>
+          <a:ea typeface="+mn-ea"/>
+          <a:cs typeface="+mn-cs"/>
           <a:sym typeface="Helvetica Neue"/>
         </a:defRPr>
       </a:lvl2pPr>
@@ -2650,7 +2579,7 @@
         <a:buFontTx/>
         <a:buChar char="•"/>
         <a:tabLst/>
-        <a:defRPr sz="3200" b="0" i="0" u="none" strike="noStrike" cap="none" spc="0" baseline="0">
+        <a:defRPr b="0" baseline="0" cap="none" i="0" spc="0" strike="noStrike" sz="3200" u="none">
           <a:ln>
             <a:noFill/>
           </a:ln>
@@ -2658,9 +2587,9 @@
             <a:srgbClr val="000000"/>
           </a:solidFill>
           <a:uFillTx/>
-          <a:latin typeface="Helvetica Neue"/>
-          <a:ea typeface="Helvetica Neue"/>
-          <a:cs typeface="Helvetica Neue"/>
+          <a:latin typeface="+mn-lt"/>
+          <a:ea typeface="+mn-ea"/>
+          <a:cs typeface="+mn-cs"/>
           <a:sym typeface="Helvetica Neue"/>
         </a:defRPr>
       </a:lvl3pPr>
@@ -2679,7 +2608,7 @@
         <a:buFontTx/>
         <a:buChar char="•"/>
         <a:tabLst/>
-        <a:defRPr sz="3200" b="0" i="0" u="none" strike="noStrike" cap="none" spc="0" baseline="0">
+        <a:defRPr b="0" baseline="0" cap="none" i="0" spc="0" strike="noStrike" sz="3200" u="none">
           <a:ln>
             <a:noFill/>
           </a:ln>
@@ -2687,9 +2616,9 @@
             <a:srgbClr val="000000"/>
           </a:solidFill>
           <a:uFillTx/>
-          <a:latin typeface="Helvetica Neue"/>
-          <a:ea typeface="Helvetica Neue"/>
-          <a:cs typeface="Helvetica Neue"/>
+          <a:latin typeface="+mn-lt"/>
+          <a:ea typeface="+mn-ea"/>
+          <a:cs typeface="+mn-cs"/>
           <a:sym typeface="Helvetica Neue"/>
         </a:defRPr>
       </a:lvl4pPr>
@@ -2708,7 +2637,7 @@
         <a:buFontTx/>
         <a:buChar char="•"/>
         <a:tabLst/>
-        <a:defRPr sz="3200" b="0" i="0" u="none" strike="noStrike" cap="none" spc="0" baseline="0">
+        <a:defRPr b="0" baseline="0" cap="none" i="0" spc="0" strike="noStrike" sz="3200" u="none">
           <a:ln>
             <a:noFill/>
           </a:ln>
@@ -2716,9 +2645,9 @@
             <a:srgbClr val="000000"/>
           </a:solidFill>
           <a:uFillTx/>
-          <a:latin typeface="Helvetica Neue"/>
-          <a:ea typeface="Helvetica Neue"/>
-          <a:cs typeface="Helvetica Neue"/>
+          <a:latin typeface="+mn-lt"/>
+          <a:ea typeface="+mn-ea"/>
+          <a:cs typeface="+mn-cs"/>
           <a:sym typeface="Helvetica Neue"/>
         </a:defRPr>
       </a:lvl5pPr>
@@ -2737,7 +2666,7 @@
         <a:buFontTx/>
         <a:buChar char="•"/>
         <a:tabLst/>
-        <a:defRPr sz="3200" b="0" i="0" u="none" strike="noStrike" cap="none" spc="0" baseline="0">
+        <a:defRPr b="0" baseline="0" cap="none" i="0" spc="0" strike="noStrike" sz="3200" u="none">
           <a:ln>
             <a:noFill/>
           </a:ln>
@@ -2745,9 +2674,9 @@
             <a:srgbClr val="000000"/>
           </a:solidFill>
           <a:uFillTx/>
-          <a:latin typeface="Helvetica Neue"/>
-          <a:ea typeface="Helvetica Neue"/>
-          <a:cs typeface="Helvetica Neue"/>
+          <a:latin typeface="+mn-lt"/>
+          <a:ea typeface="+mn-ea"/>
+          <a:cs typeface="+mn-cs"/>
           <a:sym typeface="Helvetica Neue"/>
         </a:defRPr>
       </a:lvl6pPr>
@@ -2766,7 +2695,7 @@
         <a:buFontTx/>
         <a:buChar char="•"/>
         <a:tabLst/>
-        <a:defRPr sz="3200" b="0" i="0" u="none" strike="noStrike" cap="none" spc="0" baseline="0">
+        <a:defRPr b="0" baseline="0" cap="none" i="0" spc="0" strike="noStrike" sz="3200" u="none">
           <a:ln>
             <a:noFill/>
           </a:ln>
@@ -2774,9 +2703,9 @@
             <a:srgbClr val="000000"/>
           </a:solidFill>
           <a:uFillTx/>
-          <a:latin typeface="Helvetica Neue"/>
-          <a:ea typeface="Helvetica Neue"/>
-          <a:cs typeface="Helvetica Neue"/>
+          <a:latin typeface="+mn-lt"/>
+          <a:ea typeface="+mn-ea"/>
+          <a:cs typeface="+mn-cs"/>
           <a:sym typeface="Helvetica Neue"/>
         </a:defRPr>
       </a:lvl7pPr>
@@ -2795,7 +2724,7 @@
         <a:buFontTx/>
         <a:buChar char="•"/>
         <a:tabLst/>
-        <a:defRPr sz="3200" b="0" i="0" u="none" strike="noStrike" cap="none" spc="0" baseline="0">
+        <a:defRPr b="0" baseline="0" cap="none" i="0" spc="0" strike="noStrike" sz="3200" u="none">
           <a:ln>
             <a:noFill/>
           </a:ln>
@@ -2803,9 +2732,9 @@
             <a:srgbClr val="000000"/>
           </a:solidFill>
           <a:uFillTx/>
-          <a:latin typeface="Helvetica Neue"/>
-          <a:ea typeface="Helvetica Neue"/>
-          <a:cs typeface="Helvetica Neue"/>
+          <a:latin typeface="+mn-lt"/>
+          <a:ea typeface="+mn-ea"/>
+          <a:cs typeface="+mn-cs"/>
           <a:sym typeface="Helvetica Neue"/>
         </a:defRPr>
       </a:lvl8pPr>
@@ -2824,7 +2753,7 @@
         <a:buFontTx/>
         <a:buChar char="•"/>
         <a:tabLst/>
-        <a:defRPr sz="3200" b="0" i="0" u="none" strike="noStrike" cap="none" spc="0" baseline="0">
+        <a:defRPr b="0" baseline="0" cap="none" i="0" spc="0" strike="noStrike" sz="3200" u="none">
           <a:ln>
             <a:noFill/>
           </a:ln>
@@ -2832,15 +2761,15 @@
             <a:srgbClr val="000000"/>
           </a:solidFill>
           <a:uFillTx/>
-          <a:latin typeface="Helvetica Neue"/>
-          <a:ea typeface="Helvetica Neue"/>
-          <a:cs typeface="Helvetica Neue"/>
+          <a:latin typeface="+mn-lt"/>
+          <a:ea typeface="+mn-ea"/>
+          <a:cs typeface="+mn-cs"/>
           <a:sym typeface="Helvetica Neue"/>
         </a:defRPr>
       </a:lvl9pPr>
     </p:bodyStyle>
     <p:otherStyle>
-      <a:lvl1pPr marL="0" marR="0" indent="0" algn="ctr" defTabSz="584200" latinLnBrk="0">
+      <a:lvl1pPr marL="0" marR="0" indent="0" algn="ctr" defTabSz="584200" rtl="0" latinLnBrk="0">
         <a:lnSpc>
           <a:spcPct val="100000"/>
         </a:lnSpc>
@@ -2855,7 +2784,7 @@
         <a:buFontTx/>
         <a:buNone/>
         <a:tabLst/>
-        <a:defRPr sz="1600" b="0" i="0" u="none" strike="noStrike" cap="none" spc="0" baseline="0">
+        <a:defRPr b="0" baseline="0" cap="none" i="0" spc="0" strike="noStrike" sz="1600" u="none">
           <a:ln>
             <a:noFill/>
           </a:ln>
@@ -2869,7 +2798,7 @@
           <a:sym typeface="Helvetica Neue Light"/>
         </a:defRPr>
       </a:lvl1pPr>
-      <a:lvl2pPr marL="0" marR="0" indent="228600" algn="ctr" defTabSz="584200" latinLnBrk="0">
+      <a:lvl2pPr marL="0" marR="0" indent="0" algn="ctr" defTabSz="584200" rtl="0" latinLnBrk="0">
         <a:lnSpc>
           <a:spcPct val="100000"/>
         </a:lnSpc>
@@ -2884,7 +2813,7 @@
         <a:buFontTx/>
         <a:buNone/>
         <a:tabLst/>
-        <a:defRPr sz="1600" b="0" i="0" u="none" strike="noStrike" cap="none" spc="0" baseline="0">
+        <a:defRPr b="0" baseline="0" cap="none" i="0" spc="0" strike="noStrike" sz="1600" u="none">
           <a:ln>
             <a:noFill/>
           </a:ln>
@@ -2898,7 +2827,7 @@
           <a:sym typeface="Helvetica Neue Light"/>
         </a:defRPr>
       </a:lvl2pPr>
-      <a:lvl3pPr marL="0" marR="0" indent="457200" algn="ctr" defTabSz="584200" latinLnBrk="0">
+      <a:lvl3pPr marL="0" marR="0" indent="0" algn="ctr" defTabSz="584200" rtl="0" latinLnBrk="0">
         <a:lnSpc>
           <a:spcPct val="100000"/>
         </a:lnSpc>
@@ -2913,7 +2842,7 @@
         <a:buFontTx/>
         <a:buNone/>
         <a:tabLst/>
-        <a:defRPr sz="1600" b="0" i="0" u="none" strike="noStrike" cap="none" spc="0" baseline="0">
+        <a:defRPr b="0" baseline="0" cap="none" i="0" spc="0" strike="noStrike" sz="1600" u="none">
           <a:ln>
             <a:noFill/>
           </a:ln>
@@ -2927,7 +2856,7 @@
           <a:sym typeface="Helvetica Neue Light"/>
         </a:defRPr>
       </a:lvl3pPr>
-      <a:lvl4pPr marL="0" marR="0" indent="685800" algn="ctr" defTabSz="584200" latinLnBrk="0">
+      <a:lvl4pPr marL="0" marR="0" indent="0" algn="ctr" defTabSz="584200" rtl="0" latinLnBrk="0">
         <a:lnSpc>
           <a:spcPct val="100000"/>
         </a:lnSpc>
@@ -2942,7 +2871,7 @@
         <a:buFontTx/>
         <a:buNone/>
         <a:tabLst/>
-        <a:defRPr sz="1600" b="0" i="0" u="none" strike="noStrike" cap="none" spc="0" baseline="0">
+        <a:defRPr b="0" baseline="0" cap="none" i="0" spc="0" strike="noStrike" sz="1600" u="none">
           <a:ln>
             <a:noFill/>
           </a:ln>
@@ -2956,7 +2885,7 @@
           <a:sym typeface="Helvetica Neue Light"/>
         </a:defRPr>
       </a:lvl4pPr>
-      <a:lvl5pPr marL="0" marR="0" indent="914400" algn="ctr" defTabSz="584200" latinLnBrk="0">
+      <a:lvl5pPr marL="0" marR="0" indent="0" algn="ctr" defTabSz="584200" rtl="0" latinLnBrk="0">
         <a:lnSpc>
           <a:spcPct val="100000"/>
         </a:lnSpc>
@@ -2971,7 +2900,7 @@
         <a:buFontTx/>
         <a:buNone/>
         <a:tabLst/>
-        <a:defRPr sz="1600" b="0" i="0" u="none" strike="noStrike" cap="none" spc="0" baseline="0">
+        <a:defRPr b="0" baseline="0" cap="none" i="0" spc="0" strike="noStrike" sz="1600" u="none">
           <a:ln>
             <a:noFill/>
           </a:ln>
@@ -2985,7 +2914,7 @@
           <a:sym typeface="Helvetica Neue Light"/>
         </a:defRPr>
       </a:lvl5pPr>
-      <a:lvl6pPr marL="0" marR="0" indent="1143000" algn="ctr" defTabSz="584200" latinLnBrk="0">
+      <a:lvl6pPr marL="0" marR="0" indent="0" algn="ctr" defTabSz="584200" rtl="0" latinLnBrk="0">
         <a:lnSpc>
           <a:spcPct val="100000"/>
         </a:lnSpc>
@@ -3000,7 +2929,7 @@
         <a:buFontTx/>
         <a:buNone/>
         <a:tabLst/>
-        <a:defRPr sz="1600" b="0" i="0" u="none" strike="noStrike" cap="none" spc="0" baseline="0">
+        <a:defRPr b="0" baseline="0" cap="none" i="0" spc="0" strike="noStrike" sz="1600" u="none">
           <a:ln>
             <a:noFill/>
           </a:ln>
@@ -3014,7 +2943,7 @@
           <a:sym typeface="Helvetica Neue Light"/>
         </a:defRPr>
       </a:lvl6pPr>
-      <a:lvl7pPr marL="0" marR="0" indent="1371600" algn="ctr" defTabSz="584200" latinLnBrk="0">
+      <a:lvl7pPr marL="0" marR="0" indent="0" algn="ctr" defTabSz="584200" rtl="0" latinLnBrk="0">
         <a:lnSpc>
           <a:spcPct val="100000"/>
         </a:lnSpc>
@@ -3029,7 +2958,7 @@
         <a:buFontTx/>
         <a:buNone/>
         <a:tabLst/>
-        <a:defRPr sz="1600" b="0" i="0" u="none" strike="noStrike" cap="none" spc="0" baseline="0">
+        <a:defRPr b="0" baseline="0" cap="none" i="0" spc="0" strike="noStrike" sz="1600" u="none">
           <a:ln>
             <a:noFill/>
           </a:ln>
@@ -3043,7 +2972,7 @@
           <a:sym typeface="Helvetica Neue Light"/>
         </a:defRPr>
       </a:lvl7pPr>
-      <a:lvl8pPr marL="0" marR="0" indent="1600200" algn="ctr" defTabSz="584200" latinLnBrk="0">
+      <a:lvl8pPr marL="0" marR="0" indent="0" algn="ctr" defTabSz="584200" rtl="0" latinLnBrk="0">
         <a:lnSpc>
           <a:spcPct val="100000"/>
         </a:lnSpc>
@@ -3058,7 +2987,7 @@
         <a:buFontTx/>
         <a:buNone/>
         <a:tabLst/>
-        <a:defRPr sz="1600" b="0" i="0" u="none" strike="noStrike" cap="none" spc="0" baseline="0">
+        <a:defRPr b="0" baseline="0" cap="none" i="0" spc="0" strike="noStrike" sz="1600" u="none">
           <a:ln>
             <a:noFill/>
           </a:ln>
@@ -3072,7 +3001,7 @@
           <a:sym typeface="Helvetica Neue Light"/>
         </a:defRPr>
       </a:lvl8pPr>
-      <a:lvl9pPr marL="0" marR="0" indent="1828800" algn="ctr" defTabSz="584200" latinLnBrk="0">
+      <a:lvl9pPr marL="0" marR="0" indent="0" algn="ctr" defTabSz="584200" rtl="0" latinLnBrk="0">
         <a:lnSpc>
           <a:spcPct val="100000"/>
         </a:lnSpc>
@@ -3087,7 +3016,7 @@
         <a:buFontTx/>
         <a:buNone/>
         <a:tabLst/>
-        <a:defRPr sz="1600" b="0" i="0" u="none" strike="noStrike" cap="none" spc="0" baseline="0">
+        <a:defRPr b="0" baseline="0" cap="none" i="0" spc="0" strike="noStrike" sz="1600" u="none">
           <a:ln>
             <a:noFill/>
           </a:ln>
@@ -3107,7 +3036,7 @@
 </file>
 
 <file path=ppt/slides/slide1.xml><?xml version="1.0" encoding="utf-8"?>
-<p:sld xmlns:a="http://schemas.openxmlformats.org/drawingml/2006/main" xmlns:r="http://schemas.openxmlformats.org/officeDocument/2006/relationships" xmlns:p="http://schemas.openxmlformats.org/presentationml/2006/main">
+<p:sld xmlns:a="http://schemas.openxmlformats.org/drawingml/2006/main" xmlns:r="http://schemas.openxmlformats.org/officeDocument/2006/relationships" xmlns:p="http://schemas.openxmlformats.org/presentationml/2006/main" xmlns:m="http://schemas.openxmlformats.org/officeDocument/2006/math" xmlns:a14="http://schemas.microsoft.com/office/drawing/2010/main" showMasterSp="1" showMasterPhAnim="1">
   <p:cSld>
     <p:spTree>
       <p:nvGrpSpPr>
@@ -3126,9 +3055,7 @@
       <p:sp>
         <p:nvSpPr>
           <p:cNvPr id="119" name="Statistical Analysis of Advanced Encryption Standard"/>
-          <p:cNvSpPr txBox="1">
-            <a:spLocks noGrp="1"/>
-          </p:cNvSpPr>
+          <p:cNvSpPr txBox="1"/>
           <p:nvPr>
             <p:ph type="ctrTitle"/>
           </p:nvPr>
@@ -3142,10 +3069,11 @@
           <a:bodyPr/>
           <a:lstStyle>
             <a:lvl1pPr defTabSz="502412">
-              <a:defRPr sz="6880"/>
+              <a:defRPr sz="6800"/>
             </a:lvl1pPr>
           </a:lstStyle>
           <a:p>
+            <a:pPr/>
             <a:r>
               <a:t>Statistical Analysis of Advanced Encryption Standard</a:t>
             </a:r>
@@ -3155,9 +3083,7 @@
       <p:sp>
         <p:nvSpPr>
           <p:cNvPr id="120" name="David Josephs,…"/>
-          <p:cNvSpPr txBox="1">
-            <a:spLocks noGrp="1"/>
-          </p:cNvSpPr>
+          <p:cNvSpPr txBox="1"/>
           <p:nvPr>
             <p:ph type="subTitle" sz="quarter" idx="1"/>
           </p:nvPr>
@@ -3168,13 +3094,14 @@
           </a:prstGeom>
         </p:spPr>
         <p:txBody>
-          <a:bodyPr>
-            <a:normAutofit lnSpcReduction="10000"/>
-          </a:bodyPr>
+          <a:bodyPr/>
           <a:lstStyle/>
           <a:p>
             <a:pPr defTabSz="268731">
-              <a:defRPr sz="1702"/>
+              <a:lnSpc>
+                <a:spcPct val="90000"/>
+              </a:lnSpc>
+              <a:defRPr sz="1700"/>
             </a:pPr>
             <a:r>
               <a:t>David Josephs,</a:t>
@@ -3182,7 +3109,10 @@
           </a:p>
           <a:p>
             <a:pPr defTabSz="268731">
-              <a:defRPr sz="1702"/>
+              <a:lnSpc>
+                <a:spcPct val="90000"/>
+              </a:lnSpc>
+              <a:defRPr sz="1700"/>
             </a:pPr>
             <a:r>
               <a:t> Hannah Kosinovsky,</a:t>
@@ -3190,7 +3120,10 @@
           </a:p>
           <a:p>
             <a:pPr defTabSz="268731">
-              <a:defRPr sz="1702"/>
+              <a:lnSpc>
+                <a:spcPct val="90000"/>
+              </a:lnSpc>
+              <a:defRPr sz="1700"/>
             </a:pPr>
             <a:r>
               <a:t> Carson Drake, </a:t>
@@ -3198,7 +3131,10 @@
           </a:p>
           <a:p>
             <a:pPr defTabSz="268731">
-              <a:defRPr sz="1702"/>
+              <a:lnSpc>
+                <a:spcPct val="90000"/>
+              </a:lnSpc>
+              <a:defRPr sz="1700"/>
             </a:pPr>
             <a:r>
               <a:t>Volodymyr Orlov</a:t>
@@ -3211,12 +3147,12 @@
   <p:clrMapOvr>
     <a:masterClrMapping/>
   </p:clrMapOvr>
-  <p:transition spd="med"/>
+  <p:transition xmlns:p14="http://schemas.microsoft.com/office/powerpoint/2010/main" spd="med" advClick="1"/>
 </p:sld>
 </file>
 
 <file path=ppt/slides/slide10.xml><?xml version="1.0" encoding="utf-8"?>
-<p:sld xmlns:a="http://schemas.openxmlformats.org/drawingml/2006/main" xmlns:r="http://schemas.openxmlformats.org/officeDocument/2006/relationships" xmlns:p="http://schemas.openxmlformats.org/presentationml/2006/main">
+<p:sld xmlns:a="http://schemas.openxmlformats.org/drawingml/2006/main" xmlns:r="http://schemas.openxmlformats.org/officeDocument/2006/relationships" xmlns:p="http://schemas.openxmlformats.org/presentationml/2006/main" xmlns:m="http://schemas.openxmlformats.org/officeDocument/2006/math" xmlns:a14="http://schemas.microsoft.com/office/drawing/2010/main" showMasterSp="1" showMasterPhAnim="1">
   <p:cSld>
     <p:spTree>
       <p:nvGrpSpPr>
@@ -3235,9 +3171,7 @@
       <p:sp>
         <p:nvSpPr>
           <p:cNvPr id="149" name="Q&amp;A"/>
-          <p:cNvSpPr txBox="1">
-            <a:spLocks noGrp="1"/>
-          </p:cNvSpPr>
+          <p:cNvSpPr txBox="1"/>
           <p:nvPr>
             <p:ph type="body" idx="1"/>
           </p:nvPr>
@@ -3261,14 +3195,15 @@
               <a:buSzTx/>
               <a:buNone/>
               <a:defRPr sz="8000">
-                <a:latin typeface="+mn-lt"/>
-                <a:ea typeface="+mn-ea"/>
-                <a:cs typeface="+mn-cs"/>
+                <a:latin typeface="Helvetica Neue Medium"/>
+                <a:ea typeface="Helvetica Neue Medium"/>
+                <a:cs typeface="Helvetica Neue Medium"/>
                 <a:sym typeface="Helvetica Neue Medium"/>
               </a:defRPr>
             </a:lvl1pPr>
           </a:lstStyle>
           <a:p>
+            <a:pPr/>
             <a:r>
               <a:t>Q&amp;A</a:t>
             </a:r>
@@ -3280,12 +3215,12 @@
   <p:clrMapOvr>
     <a:masterClrMapping/>
   </p:clrMapOvr>
-  <p:transition spd="med"/>
+  <p:transition xmlns:p14="http://schemas.microsoft.com/office/powerpoint/2010/main" spd="med" advClick="1"/>
 </p:sld>
 </file>
 
 <file path=ppt/slides/slide2.xml><?xml version="1.0" encoding="utf-8"?>
-<p:sld xmlns:a="http://schemas.openxmlformats.org/drawingml/2006/main" xmlns:r="http://schemas.openxmlformats.org/officeDocument/2006/relationships" xmlns:p="http://schemas.openxmlformats.org/presentationml/2006/main">
+<p:sld xmlns:a="http://schemas.openxmlformats.org/drawingml/2006/main" xmlns:r="http://schemas.openxmlformats.org/officeDocument/2006/relationships" xmlns:p="http://schemas.openxmlformats.org/presentationml/2006/main" xmlns:m="http://schemas.openxmlformats.org/officeDocument/2006/math" xmlns:a14="http://schemas.microsoft.com/office/drawing/2010/main" showMasterSp="1" showMasterPhAnim="1">
   <p:cSld>
     <p:spTree>
       <p:nvGrpSpPr>
@@ -3304,9 +3239,7 @@
       <p:sp>
         <p:nvSpPr>
           <p:cNvPr id="122" name="Introduction"/>
-          <p:cNvSpPr txBox="1">
-            <a:spLocks noGrp="1"/>
-          </p:cNvSpPr>
+          <p:cNvSpPr txBox="1"/>
           <p:nvPr>
             <p:ph type="title"/>
           </p:nvPr>
@@ -3324,6 +3257,7 @@
             </a:lvl1pPr>
           </a:lstStyle>
           <a:p>
+            <a:pPr/>
             <a:r>
               <a:t>Introduction</a:t>
             </a:r>
@@ -3333,9 +3267,7 @@
       <p:sp>
         <p:nvSpPr>
           <p:cNvPr id="123" name="Thought 1…"/>
-          <p:cNvSpPr txBox="1">
-            <a:spLocks noGrp="1"/>
-          </p:cNvSpPr>
+          <p:cNvSpPr txBox="1"/>
           <p:nvPr>
             <p:ph type="body" idx="1"/>
           </p:nvPr>
@@ -3349,11 +3281,10 @@
           <a:bodyPr/>
           <a:lstStyle/>
           <a:p>
-            <a:r>
-              <a:rPr lang="en-US" dirty="0"/>
+            <a:pPr/>
+            <a:r>
               <a:t>[ABSTRACT]</a:t>
             </a:r>
-            <a:endParaRPr dirty="0"/>
           </a:p>
         </p:txBody>
       </p:sp>
@@ -3362,12 +3293,12 @@
   <p:clrMapOvr>
     <a:masterClrMapping/>
   </p:clrMapOvr>
-  <p:transition spd="med"/>
+  <p:transition xmlns:p14="http://schemas.microsoft.com/office/powerpoint/2010/main" spd="med" advClick="1"/>
 </p:sld>
 </file>
 
 <file path=ppt/slides/slide3.xml><?xml version="1.0" encoding="utf-8"?>
-<p:sld xmlns:a="http://schemas.openxmlformats.org/drawingml/2006/main" xmlns:r="http://schemas.openxmlformats.org/officeDocument/2006/relationships" xmlns:p="http://schemas.openxmlformats.org/presentationml/2006/main">
+<p:sld xmlns:a="http://schemas.openxmlformats.org/drawingml/2006/main" xmlns:r="http://schemas.openxmlformats.org/officeDocument/2006/relationships" xmlns:p="http://schemas.openxmlformats.org/presentationml/2006/main" xmlns:m="http://schemas.openxmlformats.org/officeDocument/2006/math" xmlns:a14="http://schemas.microsoft.com/office/drawing/2010/main" showMasterSp="1" showMasterPhAnim="1">
   <p:cSld>
     <p:spTree>
       <p:nvGrpSpPr>
@@ -3386,9 +3317,7 @@
       <p:sp>
         <p:nvSpPr>
           <p:cNvPr id="125" name="Components layout"/>
-          <p:cNvSpPr txBox="1">
-            <a:spLocks noGrp="1"/>
-          </p:cNvSpPr>
+          <p:cNvSpPr txBox="1"/>
           <p:nvPr>
             <p:ph type="title"/>
           </p:nvPr>
@@ -3406,6 +3335,7 @@
             </a:lvl1pPr>
           </a:lstStyle>
           <a:p>
+            <a:pPr/>
             <a:r>
               <a:t>Components layout</a:t>
             </a:r>
@@ -3446,12 +3376,12 @@
   <p:clrMapOvr>
     <a:masterClrMapping/>
   </p:clrMapOvr>
-  <p:transition spd="med"/>
+  <p:transition xmlns:p14="http://schemas.microsoft.com/office/powerpoint/2010/main" spd="med" advClick="1"/>
 </p:sld>
 </file>
 
 <file path=ppt/slides/slide4.xml><?xml version="1.0" encoding="utf-8"?>
-<p:sld xmlns:a="http://schemas.openxmlformats.org/drawingml/2006/main" xmlns:r="http://schemas.openxmlformats.org/officeDocument/2006/relationships" xmlns:p="http://schemas.openxmlformats.org/presentationml/2006/main">
+<p:sld xmlns:a="http://schemas.openxmlformats.org/drawingml/2006/main" xmlns:r="http://schemas.openxmlformats.org/officeDocument/2006/relationships" xmlns:p="http://schemas.openxmlformats.org/presentationml/2006/main" xmlns:m="http://schemas.openxmlformats.org/officeDocument/2006/math" xmlns:a14="http://schemas.microsoft.com/office/drawing/2010/main" showMasterSp="1" showMasterPhAnim="1">
   <p:cSld>
     <p:spTree>
       <p:nvGrpSpPr>
@@ -3469,24 +3399,16 @@
       </p:grpSpPr>
       <p:sp>
         <p:nvSpPr>
-          <p:cNvPr id="4" name="Plaintext Generator">
-            <a:extLst>
-              <a:ext uri="{FF2B5EF4-FFF2-40B4-BE49-F238E27FC236}">
-                <a16:creationId xmlns:a16="http://schemas.microsoft.com/office/drawing/2014/main" id="{6FE9D019-C0D5-A041-BD06-479A326C5378}"/>
-              </a:ext>
-            </a:extLst>
-          </p:cNvPr>
-          <p:cNvSpPr txBox="1">
-            <a:spLocks noGrp="1"/>
-          </p:cNvSpPr>
+          <p:cNvPr id="128" name="Plaintext Generator"/>
+          <p:cNvSpPr txBox="1"/>
           <p:nvPr>
             <p:ph type="title"/>
           </p:nvPr>
         </p:nvSpPr>
         <p:spPr>
           <a:xfrm>
-            <a:off x="965200" y="444500"/>
-            <a:ext cx="7003852" cy="2159000"/>
+            <a:off x="965199" y="444500"/>
+            <a:ext cx="7003854" cy="2159000"/>
           </a:xfrm>
           <a:prstGeom prst="rect">
             <a:avLst/>
@@ -3500,33 +3422,23 @@
               <a:defRPr sz="6000"/>
             </a:pPr>
             <a:r>
-              <a:rPr lang="en-US" dirty="0"/>
               <a:t>Ciphertext Generation</a:t>
             </a:r>
-            <a:endParaRPr dirty="0"/>
           </a:p>
         </p:txBody>
       </p:sp>
       <p:sp>
         <p:nvSpPr>
-          <p:cNvPr id="5" name="Thought 1…">
-            <a:extLst>
-              <a:ext uri="{FF2B5EF4-FFF2-40B4-BE49-F238E27FC236}">
-                <a16:creationId xmlns:a16="http://schemas.microsoft.com/office/drawing/2014/main" id="{F9C5A510-F10C-F44F-9905-7EB2083676D0}"/>
-              </a:ext>
-            </a:extLst>
-          </p:cNvPr>
-          <p:cNvSpPr txBox="1">
-            <a:spLocks noGrp="1"/>
-          </p:cNvSpPr>
+          <p:cNvPr id="129" name="Thought 1…"/>
+          <p:cNvSpPr txBox="1"/>
           <p:nvPr>
             <p:ph type="body" idx="1"/>
           </p:nvPr>
         </p:nvSpPr>
         <p:spPr>
           <a:xfrm>
-            <a:off x="742081" y="2982962"/>
-            <a:ext cx="11520638" cy="5894338"/>
+            <a:off x="742081" y="2982961"/>
+            <a:ext cx="11520638" cy="5894340"/>
           </a:xfrm>
           <a:prstGeom prst="rect">
             <a:avLst/>
@@ -3536,42 +3448,34 @@
           <a:bodyPr/>
           <a:lstStyle/>
           <a:p>
-            <a:r>
-              <a:rPr lang="en-US" dirty="0"/>
+            <a:pPr/>
+            <a:r>
               <a:t>Low Density Plaintext</a:t>
             </a:r>
           </a:p>
           <a:p>
-            <a:r>
-              <a:rPr lang="en-US" dirty="0"/>
+            <a:pPr/>
+            <a:r>
               <a:t>Low Density 128-bit Keys</a:t>
             </a:r>
-            <a:endParaRPr dirty="0"/>
-          </a:p>
-          <a:p>
-            <a:r>
-              <a:rPr lang="en-US" dirty="0"/>
+          </a:p>
+          <a:p>
+            <a:pPr/>
+            <a:r>
               <a:t>High Density Plaintext</a:t>
             </a:r>
           </a:p>
           <a:p>
-            <a:r>
-              <a:rPr lang="en-US" dirty="0"/>
+            <a:pPr/>
+            <a:r>
               <a:t>High Density 128-bit Keys</a:t>
             </a:r>
-            <a:endParaRPr dirty="0"/>
           </a:p>
         </p:txBody>
       </p:sp>
       <p:pic>
         <p:nvPicPr>
-          <p:cNvPr id="6" name="HighLevelSchema (2).png" descr="HighLevelSchema (2).png">
-            <a:extLst>
-              <a:ext uri="{FF2B5EF4-FFF2-40B4-BE49-F238E27FC236}">
-                <a16:creationId xmlns:a16="http://schemas.microsoft.com/office/drawing/2014/main" id="{E8B7543A-363E-9F4E-A9B2-1C4CFE019416}"/>
-              </a:ext>
-            </a:extLst>
-          </p:cNvPr>
+          <p:cNvPr id="130" name="HighLevelSchema (2).png" descr="HighLevelSchema (2).png"/>
           <p:cNvPicPr>
             <a:picLocks noChangeAspect="1"/>
           </p:cNvPicPr>
@@ -3599,21 +3503,16 @@
         </p:spPr>
       </p:pic>
     </p:spTree>
-    <p:extLst>
-      <p:ext uri="{BB962C8B-B14F-4D97-AF65-F5344CB8AC3E}">
-        <p14:creationId xmlns:p14="http://schemas.microsoft.com/office/powerpoint/2010/main" val="3184249575"/>
-      </p:ext>
-    </p:extLst>
   </p:cSld>
   <p:clrMapOvr>
     <a:masterClrMapping/>
   </p:clrMapOvr>
-  <p:transition spd="med"/>
+  <p:transition xmlns:p14="http://schemas.microsoft.com/office/powerpoint/2010/main" spd="med" advClick="1"/>
 </p:sld>
 </file>
 
 <file path=ppt/slides/slide5.xml><?xml version="1.0" encoding="utf-8"?>
-<p:sld xmlns:a="http://schemas.openxmlformats.org/drawingml/2006/main" xmlns:r="http://schemas.openxmlformats.org/officeDocument/2006/relationships" xmlns:p="http://schemas.openxmlformats.org/presentationml/2006/main">
+<p:sld xmlns:a="http://schemas.openxmlformats.org/drawingml/2006/main" xmlns:r="http://schemas.openxmlformats.org/officeDocument/2006/relationships" xmlns:p="http://schemas.openxmlformats.org/presentationml/2006/main" xmlns:m="http://schemas.openxmlformats.org/officeDocument/2006/math" xmlns:a14="http://schemas.microsoft.com/office/drawing/2010/main" showMasterSp="1" showMasterPhAnim="1">
   <p:cSld>
     <p:spTree>
       <p:nvGrpSpPr>
@@ -3648,7 +3547,7 @@
         <p:spPr>
           <a:xfrm>
             <a:off x="8013700" y="291256"/>
-            <a:ext cx="4445000" cy="3333751"/>
+            <a:ext cx="4445000" cy="3333752"/>
           </a:xfrm>
           <a:prstGeom prst="rect">
             <a:avLst/>
@@ -3661,17 +3560,15 @@
       <p:sp>
         <p:nvSpPr>
           <p:cNvPr id="133" name="NIST Statistical Test Suite"/>
-          <p:cNvSpPr txBox="1">
-            <a:spLocks noGrp="1"/>
-          </p:cNvSpPr>
+          <p:cNvSpPr txBox="1"/>
           <p:nvPr>
             <p:ph type="title"/>
           </p:nvPr>
         </p:nvSpPr>
         <p:spPr>
           <a:xfrm>
-            <a:off x="965200" y="444500"/>
-            <a:ext cx="7003852" cy="2159000"/>
+            <a:off x="965199" y="444500"/>
+            <a:ext cx="7003854" cy="2159000"/>
           </a:xfrm>
           <a:prstGeom prst="rect">
             <a:avLst/>
@@ -3685,6 +3582,7 @@
             </a:lvl1pPr>
           </a:lstStyle>
           <a:p>
+            <a:pPr/>
             <a:r>
               <a:t>NIST Statistical Test Suite</a:t>
             </a:r>
@@ -3694,17 +3592,15 @@
       <p:sp>
         <p:nvSpPr>
           <p:cNvPr id="134" name="Comes with 15 tests…"/>
-          <p:cNvSpPr txBox="1">
-            <a:spLocks noGrp="1"/>
-          </p:cNvSpPr>
+          <p:cNvSpPr txBox="1"/>
           <p:nvPr>
             <p:ph type="body" idx="1"/>
           </p:nvPr>
         </p:nvSpPr>
         <p:spPr>
           <a:xfrm>
-            <a:off x="742081" y="2982962"/>
-            <a:ext cx="11520638" cy="5894338"/>
+            <a:off x="742081" y="2982961"/>
+            <a:ext cx="11520638" cy="5894340"/>
           </a:xfrm>
           <a:prstGeom prst="rect">
             <a:avLst/>
@@ -3714,11 +3610,13 @@
           <a:bodyPr/>
           <a:lstStyle/>
           <a:p>
+            <a:pPr/>
             <a:r>
               <a:t>Comes with 15 tests</a:t>
             </a:r>
           </a:p>
           <a:p>
+            <a:pPr/>
             <a:r>
               <a:t>These tests produce a real number between 0 and 1, the p-value, which shows the probability of finding the observed, or more extreme, results with respect to certain randomness</a:t>
             </a:r>
@@ -3730,12 +3628,12 @@
   <p:clrMapOvr>
     <a:masterClrMapping/>
   </p:clrMapOvr>
-  <p:transition spd="med"/>
+  <p:transition xmlns:p14="http://schemas.microsoft.com/office/powerpoint/2010/main" spd="med" advClick="1"/>
 </p:sld>
 </file>
 
 <file path=ppt/slides/slide6.xml><?xml version="1.0" encoding="utf-8"?>
-<p:sld xmlns:a="http://schemas.openxmlformats.org/drawingml/2006/main" xmlns:r="http://schemas.openxmlformats.org/officeDocument/2006/relationships" xmlns:p="http://schemas.openxmlformats.org/presentationml/2006/main">
+<p:sld xmlns:a="http://schemas.openxmlformats.org/drawingml/2006/main" xmlns:r="http://schemas.openxmlformats.org/officeDocument/2006/relationships" xmlns:p="http://schemas.openxmlformats.org/presentationml/2006/main" xmlns:m="http://schemas.openxmlformats.org/officeDocument/2006/math" xmlns:a14="http://schemas.microsoft.com/office/drawing/2010/main" showMasterSp="1" showMasterPhAnim="1">
   <p:cSld>
     <p:spTree>
       <p:nvGrpSpPr>
@@ -3753,10 +3651,8 @@
       </p:grpSpPr>
       <p:sp>
         <p:nvSpPr>
-          <p:cNvPr id="140" name="NIST Tests"/>
-          <p:cNvSpPr txBox="1">
-            <a:spLocks noGrp="1"/>
-          </p:cNvSpPr>
+          <p:cNvPr id="136" name="NIST Tests"/>
+          <p:cNvSpPr txBox="1"/>
           <p:nvPr>
             <p:ph type="title"/>
           </p:nvPr>
@@ -3774,8 +3670,8 @@
             </a:lvl1pPr>
           </a:lstStyle>
           <a:p>
-            <a:r>
-              <a:rPr dirty="0"/>
+            <a:pPr/>
+            <a:r>
               <a:t>NIST Tests</a:t>
             </a:r>
           </a:p>
@@ -3783,35 +3679,23 @@
       </p:sp>
       <p:graphicFrame>
         <p:nvGraphicFramePr>
-          <p:cNvPr id="141" name="Table"/>
+          <p:cNvPr id="137" name="Table"/>
           <p:cNvGraphicFramePr/>
           <p:nvPr/>
         </p:nvGraphicFramePr>
         <p:xfrm>
           <a:off x="1287090" y="2597150"/>
-          <a:ext cx="10430618" cy="6286500"/>
+          <a:ext cx="10430619" cy="6286500"/>
         </p:xfrm>
-        <a:graphic>
+        <a:graphic xmlns:a="http://schemas.openxmlformats.org/drawingml/2006/main">
           <a:graphicData uri="http://schemas.openxmlformats.org/drawingml/2006/table">
             <a:tbl>
-              <a:tblPr>
+              <a:tblPr firstCol="0" firstRow="0" lastCol="0" lastRow="0" bandCol="0" bandRow="0" rtl="0">
                 <a:tableStyleId>{4C3C2611-4C71-4FC5-86AE-919BDF0F9419}</a:tableStyleId>
               </a:tblPr>
               <a:tblGrid>
-                <a:gridCol w="5215309">
-                  <a:extLst>
-                    <a:ext uri="{9D8B030D-6E8A-4147-A177-3AD203B41FA5}">
-                      <a16:colId xmlns:a16="http://schemas.microsoft.com/office/drawing/2014/main" val="20000"/>
-                    </a:ext>
-                  </a:extLst>
-                </a:gridCol>
-                <a:gridCol w="5215309">
-                  <a:extLst>
-                    <a:ext uri="{9D8B030D-6E8A-4147-A177-3AD203B41FA5}">
-                      <a16:colId xmlns:a16="http://schemas.microsoft.com/office/drawing/2014/main" val="20001"/>
-                    </a:ext>
-                  </a:extLst>
-                </a:gridCol>
+                <a:gridCol w="5215309"/>
+                <a:gridCol w="5215309"/>
               </a:tblGrid>
               <a:tr h="1047750">
                 <a:tc>
@@ -3824,13 +3708,13 @@
                       </a:pPr>
                       <a:r>
                         <a:rPr sz="2500">
-                          <a:sym typeface="Helvetica Neue"/>
+                          <a:sym typeface="Helvetica Neue Medium"/>
                         </a:rPr>
                         <a:t>Two Frequency Tests</a:t>
                       </a:r>
                     </a:p>
                   </a:txBody>
-                  <a:tcPr marL="50800" marR="50800" marT="50800" marB="50800" anchor="ctr" horzOverflow="overflow"/>
+                  <a:tcPr marL="50800" marR="50800" marT="50800" marB="50800" anchor="ctr" anchorCtr="0" horzOverflow="overflow"/>
                 </a:tc>
                 <a:tc>
                   <a:txBody>
@@ -3842,148 +3726,14 @@
                       </a:pPr>
                       <a:r>
                         <a:rPr sz="2500">
-                          <a:sym typeface="Helvetica Neue"/>
+                          <a:sym typeface="Helvetica Neue Medium"/>
                         </a:rPr>
                         <a:t>Maurer’s ”Universal Statistical” test</a:t>
                       </a:r>
                     </a:p>
                   </a:txBody>
-                  <a:tcPr marL="50800" marR="50800" marT="50800" marB="50800" anchor="ctr" horzOverflow="overflow"/>
+                  <a:tcPr marL="50800" marR="50800" marT="50800" marB="50800" anchor="ctr" anchorCtr="0" horzOverflow="overflow"/>
                 </a:tc>
-                <a:extLst>
-                  <a:ext uri="{0D108BD9-81ED-4DB2-BD59-A6C34878D82A}">
-                    <a16:rowId xmlns:a16="http://schemas.microsoft.com/office/drawing/2014/main" val="10000"/>
-                  </a:ext>
-                </a:extLst>
-              </a:tr>
-              <a:tr h="1047750">
-                <a:tc>
-                  <a:txBody>
-                    <a:bodyPr/>
-                    <a:lstStyle/>
-                    <a:p>
-                      <a:pPr defTabSz="914400">
-                        <a:defRPr sz="1800"/>
-                      </a:pPr>
-                      <a:r>
-                        <a:rPr sz="2500" dirty="0">
-                          <a:sym typeface="Helvetica Neue"/>
-                        </a:rPr>
-                        <a:t>Two runs test</a:t>
-                      </a:r>
-                    </a:p>
-                  </a:txBody>
-                  <a:tcPr marL="50800" marR="50800" marT="50800" marB="50800" anchor="ctr" horzOverflow="overflow"/>
-                </a:tc>
-                <a:tc>
-                  <a:txBody>
-                    <a:bodyPr/>
-                    <a:lstStyle/>
-                    <a:p>
-                      <a:pPr defTabSz="914400">
-                        <a:defRPr sz="1800"/>
-                      </a:pPr>
-                      <a:r>
-                        <a:rPr sz="2500">
-                          <a:sym typeface="Helvetica Neue"/>
-                        </a:rPr>
-                        <a:t>Linear complexity test</a:t>
-                      </a:r>
-                    </a:p>
-                  </a:txBody>
-                  <a:tcPr marL="50800" marR="50800" marT="50800" marB="50800" anchor="ctr" horzOverflow="overflow"/>
-                </a:tc>
-                <a:extLst>
-                  <a:ext uri="{0D108BD9-81ED-4DB2-BD59-A6C34878D82A}">
-                    <a16:rowId xmlns:a16="http://schemas.microsoft.com/office/drawing/2014/main" val="10001"/>
-                  </a:ext>
-                </a:extLst>
-              </a:tr>
-              <a:tr h="1047750">
-                <a:tc>
-                  <a:txBody>
-                    <a:bodyPr/>
-                    <a:lstStyle/>
-                    <a:p>
-                      <a:pPr defTabSz="914400">
-                        <a:defRPr sz="1800"/>
-                      </a:pPr>
-                      <a:r>
-                        <a:rPr sz="2500" dirty="0">
-                          <a:sym typeface="Helvetica Neue"/>
-                        </a:rPr>
-                        <a:t>Binary matrix rank test</a:t>
-                      </a:r>
-                    </a:p>
-                  </a:txBody>
-                  <a:tcPr marL="50800" marR="50800" marT="50800" marB="50800" anchor="ctr" horzOverflow="overflow"/>
-                </a:tc>
-                <a:tc>
-                  <a:txBody>
-                    <a:bodyPr/>
-                    <a:lstStyle/>
-                    <a:p>
-                      <a:pPr defTabSz="914400">
-                        <a:defRPr sz="1800"/>
-                      </a:pPr>
-                      <a:r>
-                        <a:rPr sz="2500">
-                          <a:sym typeface="Helvetica Neue"/>
-                        </a:rPr>
-                        <a:t>Serial test</a:t>
-                      </a:r>
-                    </a:p>
-                  </a:txBody>
-                  <a:tcPr marL="50800" marR="50800" marT="50800" marB="50800" anchor="ctr" horzOverflow="overflow"/>
-                </a:tc>
-                <a:extLst>
-                  <a:ext uri="{0D108BD9-81ED-4DB2-BD59-A6C34878D82A}">
-                    <a16:rowId xmlns:a16="http://schemas.microsoft.com/office/drawing/2014/main" val="10002"/>
-                  </a:ext>
-                </a:extLst>
-              </a:tr>
-              <a:tr h="1047750">
-                <a:tc>
-                  <a:txBody>
-                    <a:bodyPr/>
-                    <a:lstStyle/>
-                    <a:p>
-                      <a:pPr defTabSz="914400">
-                        <a:defRPr sz="1800"/>
-                      </a:pPr>
-                      <a:r>
-                        <a:rPr sz="2500" dirty="0">
-                          <a:sym typeface="Helvetica Neue"/>
-                        </a:rPr>
-                        <a:t>Discrete Fourier transform test</a:t>
-                      </a:r>
-                    </a:p>
-                  </a:txBody>
-                  <a:tcPr marL="50800" marR="50800" marT="50800" marB="50800" anchor="ctr" horzOverflow="overflow"/>
-                </a:tc>
-                <a:tc>
-                  <a:txBody>
-                    <a:bodyPr/>
-                    <a:lstStyle/>
-                    <a:p>
-                      <a:pPr defTabSz="914400">
-                        <a:defRPr sz="1800"/>
-                      </a:pPr>
-                      <a:r>
-                        <a:rPr sz="2500">
-                          <a:sym typeface="Helvetica Neue"/>
-                        </a:rPr>
-                        <a:t>Approximate entropy test</a:t>
-                      </a:r>
-                    </a:p>
-                  </a:txBody>
-                  <a:tcPr marL="50800" marR="50800" marT="50800" marB="50800" anchor="ctr" horzOverflow="overflow"/>
-                </a:tc>
-                <a:extLst>
-                  <a:ext uri="{0D108BD9-81ED-4DB2-BD59-A6C34878D82A}">
-                    <a16:rowId xmlns:a16="http://schemas.microsoft.com/office/drawing/2014/main" val="10003"/>
-                  </a:ext>
-                </a:extLst>
               </a:tr>
               <a:tr h="1047750">
                 <a:tc>
@@ -3996,13 +3746,13 @@
                       </a:pPr>
                       <a:r>
                         <a:rPr sz="2500">
-                          <a:sym typeface="Helvetica Neue"/>
+                          <a:sym typeface="Helvetica Neue Medium"/>
                         </a:rPr>
-                        <a:t>Overlapping and non-overlapping template matching tests</a:t>
+                        <a:t>Two runs test</a:t>
                       </a:r>
                     </a:p>
                   </a:txBody>
-                  <a:tcPr marL="50800" marR="50800" marT="50800" marB="50800" anchor="ctr" horzOverflow="overflow"/>
+                  <a:tcPr marL="50800" marR="50800" marT="50800" marB="50800" anchor="ctr" anchorCtr="0" horzOverflow="overflow"/>
                 </a:tc>
                 <a:tc>
                   <a:txBody>
@@ -4014,19 +3764,14 @@
                       </a:pPr>
                       <a:r>
                         <a:rPr sz="2500">
-                          <a:sym typeface="Helvetica Neue"/>
+                          <a:sym typeface="Helvetica Neue Medium"/>
                         </a:rPr>
-                        <a:t>Cumulative sums test</a:t>
+                        <a:t>Linear complexity test</a:t>
                       </a:r>
                     </a:p>
                   </a:txBody>
-                  <a:tcPr marL="50800" marR="50800" marT="50800" marB="50800" anchor="ctr" horzOverflow="overflow"/>
+                  <a:tcPr marL="50800" marR="50800" marT="50800" marB="50800" anchor="ctr" anchorCtr="0" horzOverflow="overflow"/>
                 </a:tc>
-                <a:extLst>
-                  <a:ext uri="{0D108BD9-81ED-4DB2-BD59-A6C34878D82A}">
-                    <a16:rowId xmlns:a16="http://schemas.microsoft.com/office/drawing/2014/main" val="10004"/>
-                  </a:ext>
-                </a:extLst>
               </a:tr>
               <a:tr h="1047750">
                 <a:tc>
@@ -4039,13 +3784,13 @@
                       </a:pPr>
                       <a:r>
                         <a:rPr sz="2500">
-                          <a:sym typeface="Helvetica Neue"/>
+                          <a:sym typeface="Helvetica Neue Medium"/>
                         </a:rPr>
-                        <a:t>Random excursions tests</a:t>
+                        <a:t>Binary matrix rank test</a:t>
                       </a:r>
                     </a:p>
                   </a:txBody>
-                  <a:tcPr marL="50800" marR="50800" marT="50800" marB="50800" anchor="ctr" horzOverflow="overflow"/>
+                  <a:tcPr marL="50800" marR="50800" marT="50800" marB="50800" anchor="ctr" anchorCtr="0" horzOverflow="overflow"/>
                 </a:tc>
                 <a:tc>
                   <a:txBody>
@@ -4056,41 +3801,145 @@
                         <a:defRPr sz="1800"/>
                       </a:pPr>
                       <a:r>
-                        <a:rPr sz="2500" dirty="0">
-                          <a:sym typeface="Helvetica Neue"/>
+                        <a:rPr sz="2500">
+                          <a:sym typeface="Helvetica Neue Medium"/>
+                        </a:rPr>
+                        <a:t>Serial test</a:t>
+                      </a:r>
+                    </a:p>
+                  </a:txBody>
+                  <a:tcPr marL="50800" marR="50800" marT="50800" marB="50800" anchor="ctr" anchorCtr="0" horzOverflow="overflow"/>
+                </a:tc>
+              </a:tr>
+              <a:tr h="1047750">
+                <a:tc>
+                  <a:txBody>
+                    <a:bodyPr/>
+                    <a:lstStyle/>
+                    <a:p>
+                      <a:pPr defTabSz="914400">
+                        <a:defRPr sz="1800"/>
+                      </a:pPr>
+                      <a:r>
+                        <a:rPr sz="2500">
+                          <a:sym typeface="Helvetica Neue Medium"/>
+                        </a:rPr>
+                        <a:t>Discrete Fourier transform test</a:t>
+                      </a:r>
+                    </a:p>
+                  </a:txBody>
+                  <a:tcPr marL="50800" marR="50800" marT="50800" marB="50800" anchor="ctr" anchorCtr="0" horzOverflow="overflow"/>
+                </a:tc>
+                <a:tc>
+                  <a:txBody>
+                    <a:bodyPr/>
+                    <a:lstStyle/>
+                    <a:p>
+                      <a:pPr defTabSz="914400">
+                        <a:defRPr sz="1800"/>
+                      </a:pPr>
+                      <a:r>
+                        <a:rPr sz="2500">
+                          <a:sym typeface="Helvetica Neue Medium"/>
+                        </a:rPr>
+                        <a:t>Approximate entropy test</a:t>
+                      </a:r>
+                    </a:p>
+                  </a:txBody>
+                  <a:tcPr marL="50800" marR="50800" marT="50800" marB="50800" anchor="ctr" anchorCtr="0" horzOverflow="overflow"/>
+                </a:tc>
+              </a:tr>
+              <a:tr h="1047750">
+                <a:tc>
+                  <a:txBody>
+                    <a:bodyPr/>
+                    <a:lstStyle/>
+                    <a:p>
+                      <a:pPr defTabSz="914400">
+                        <a:defRPr sz="1800"/>
+                      </a:pPr>
+                      <a:r>
+                        <a:rPr sz="2500">
+                          <a:sym typeface="Helvetica Neue Medium"/>
+                        </a:rPr>
+                        <a:t>Overlapping and non-overlapping template matching tests</a:t>
+                      </a:r>
+                    </a:p>
+                  </a:txBody>
+                  <a:tcPr marL="50800" marR="50800" marT="50800" marB="50800" anchor="ctr" anchorCtr="0" horzOverflow="overflow"/>
+                </a:tc>
+                <a:tc>
+                  <a:txBody>
+                    <a:bodyPr/>
+                    <a:lstStyle/>
+                    <a:p>
+                      <a:pPr defTabSz="914400">
+                        <a:defRPr sz="1800"/>
+                      </a:pPr>
+                      <a:r>
+                        <a:rPr sz="2500">
+                          <a:sym typeface="Helvetica Neue Medium"/>
+                        </a:rPr>
+                        <a:t>Cumulative sums test</a:t>
+                      </a:r>
+                    </a:p>
+                  </a:txBody>
+                  <a:tcPr marL="50800" marR="50800" marT="50800" marB="50800" anchor="ctr" anchorCtr="0" horzOverflow="overflow"/>
+                </a:tc>
+              </a:tr>
+              <a:tr h="1047750">
+                <a:tc>
+                  <a:txBody>
+                    <a:bodyPr/>
+                    <a:lstStyle/>
+                    <a:p>
+                      <a:pPr defTabSz="914400">
+                        <a:defRPr sz="1800"/>
+                      </a:pPr>
+                      <a:r>
+                        <a:rPr sz="2500">
+                          <a:sym typeface="Helvetica Neue Medium"/>
+                        </a:rPr>
+                        <a:t>Random excursions tests</a:t>
+                      </a:r>
+                    </a:p>
+                  </a:txBody>
+                  <a:tcPr marL="50800" marR="50800" marT="50800" marB="50800" anchor="ctr" anchorCtr="0" horzOverflow="overflow"/>
+                </a:tc>
+                <a:tc>
+                  <a:txBody>
+                    <a:bodyPr/>
+                    <a:lstStyle/>
+                    <a:p>
+                      <a:pPr defTabSz="914400">
+                        <a:defRPr sz="1800"/>
+                      </a:pPr>
+                      <a:r>
+                        <a:rPr sz="2500">
+                          <a:sym typeface="Helvetica Neue Medium"/>
                         </a:rPr>
                         <a:t>Random excursions variant tests</a:t>
                       </a:r>
                     </a:p>
                   </a:txBody>
-                  <a:tcPr marL="50800" marR="50800" marT="50800" marB="50800" anchor="ctr" horzOverflow="overflow"/>
+                  <a:tcPr marL="50800" marR="50800" marT="50800" marB="50800" anchor="ctr" anchorCtr="0" horzOverflow="overflow"/>
                 </a:tc>
-                <a:extLst>
-                  <a:ext uri="{0D108BD9-81ED-4DB2-BD59-A6C34878D82A}">
-                    <a16:rowId xmlns:a16="http://schemas.microsoft.com/office/drawing/2014/main" val="10005"/>
-                  </a:ext>
-                </a:extLst>
               </a:tr>
             </a:tbl>
           </a:graphicData>
         </a:graphic>
       </p:graphicFrame>
     </p:spTree>
-    <p:extLst>
-      <p:ext uri="{BB962C8B-B14F-4D97-AF65-F5344CB8AC3E}">
-        <p14:creationId xmlns:p14="http://schemas.microsoft.com/office/powerpoint/2010/main" val="197586483"/>
-      </p:ext>
-    </p:extLst>
   </p:cSld>
   <p:clrMapOvr>
     <a:masterClrMapping/>
   </p:clrMapOvr>
-  <p:transition spd="med"/>
+  <p:transition xmlns:p14="http://schemas.microsoft.com/office/powerpoint/2010/main" spd="med" advClick="1"/>
 </p:sld>
 </file>
 
 <file path=ppt/slides/slide7.xml><?xml version="1.0" encoding="utf-8"?>
-<p:sld xmlns:a="http://schemas.openxmlformats.org/drawingml/2006/main" xmlns:r="http://schemas.openxmlformats.org/officeDocument/2006/relationships" xmlns:p="http://schemas.openxmlformats.org/presentationml/2006/main">
+<p:sld xmlns:a="http://schemas.openxmlformats.org/drawingml/2006/main" xmlns:r="http://schemas.openxmlformats.org/officeDocument/2006/relationships" xmlns:p="http://schemas.openxmlformats.org/presentationml/2006/main" xmlns:m="http://schemas.openxmlformats.org/officeDocument/2006/math" xmlns:a14="http://schemas.microsoft.com/office/drawing/2010/main" showMasterSp="1" showMasterPhAnim="1">
   <p:cSld>
     <p:spTree>
       <p:nvGrpSpPr>
@@ -4108,18 +3957,16 @@
       </p:grpSpPr>
       <p:sp>
         <p:nvSpPr>
-          <p:cNvPr id="136" name="Diehard Statistical Test Suite"/>
-          <p:cNvSpPr txBox="1">
-            <a:spLocks noGrp="1"/>
-          </p:cNvSpPr>
+          <p:cNvPr id="139" name="Diehard Statistical Test Suite"/>
+          <p:cNvSpPr txBox="1"/>
           <p:nvPr>
             <p:ph type="title"/>
           </p:nvPr>
         </p:nvSpPr>
         <p:spPr>
           <a:xfrm>
-            <a:off x="965200" y="444500"/>
-            <a:ext cx="7003852" cy="2159000"/>
+            <a:off x="965199" y="444500"/>
+            <a:ext cx="7003854" cy="2159000"/>
           </a:xfrm>
           <a:prstGeom prst="rect">
             <a:avLst/>
@@ -4133,6 +3980,7 @@
             </a:lvl1pPr>
           </a:lstStyle>
           <a:p>
+            <a:pPr/>
             <a:r>
               <a:t>Diehard Statistical Test Suite</a:t>
             </a:r>
@@ -4141,18 +3989,16 @@
       </p:sp>
       <p:sp>
         <p:nvSpPr>
-          <p:cNvPr id="137" name="Thought 1…"/>
-          <p:cNvSpPr txBox="1">
-            <a:spLocks noGrp="1"/>
-          </p:cNvSpPr>
+          <p:cNvPr id="140" name="Thought 1…"/>
+          <p:cNvSpPr txBox="1"/>
           <p:nvPr>
             <p:ph type="body" idx="1"/>
           </p:nvPr>
         </p:nvSpPr>
         <p:spPr>
           <a:xfrm>
-            <a:off x="742081" y="2982962"/>
-            <a:ext cx="11520638" cy="5894338"/>
+            <a:off x="742081" y="2982961"/>
+            <a:ext cx="11520638" cy="5894340"/>
           </a:xfrm>
           <a:prstGeom prst="rect">
             <a:avLst/>
@@ -4162,44 +4008,40 @@
           <a:bodyPr/>
           <a:lstStyle/>
           <a:p>
-            <a:r>
-              <a:rPr lang="en-US" dirty="0"/>
+            <a:pPr/>
+            <a:r>
               <a:t>Comes with 11 types of statistical tests for randomness with several possible variations. </a:t>
             </a:r>
           </a:p>
           <a:p>
             <a:pPr lvl="1"/>
             <a:r>
-              <a:rPr lang="en-US" dirty="0"/>
               <a:t>We ran 19 total Diehard tests</a:t>
             </a:r>
           </a:p>
           <a:p>
-            <a:r>
-              <a:rPr lang="en-US" dirty="0"/>
+            <a:pPr/>
+            <a:r>
               <a:t>The output of the tests is a p-value between 0 and 1</a:t>
             </a:r>
-            <a:endParaRPr dirty="0"/>
-          </a:p>
-          <a:p>
-            <a:r>
-              <a:rPr lang="en-US" dirty="0"/>
+          </a:p>
+          <a:p>
+            <a:pPr/>
+            <a:r>
               <a:t>A bit stream will “fail” the test at alpha =  .05 level if </a:t>
             </a:r>
             <a:r>
-              <a:rPr lang="en-US" i="1" dirty="0"/>
+              <a:rPr i="1"/>
               <a:t>p</a:t>
             </a:r>
             <a:r>
-              <a:rPr lang="en-US" dirty="0"/>
               <a:t> &lt; 0.025 or </a:t>
             </a:r>
             <a:r>
-              <a:rPr lang="en-US" i="1" dirty="0"/>
+              <a:rPr i="1"/>
               <a:t>p</a:t>
             </a:r>
             <a:r>
-              <a:rPr lang="en-US" dirty="0"/>
               <a:t> &gt; 0.975 </a:t>
             </a:r>
           </a:p>
@@ -4207,7 +4049,7 @@
       </p:sp>
       <p:pic>
         <p:nvPicPr>
-          <p:cNvPr id="138" name="HighLevelSchema (4).png" descr="HighLevelSchema (4).png"/>
+          <p:cNvPr id="141" name="HighLevelSchema (4).png" descr="HighLevelSchema (4).png"/>
           <p:cNvPicPr>
             <a:picLocks noChangeAspect="1"/>
           </p:cNvPicPr>
@@ -4239,12 +4081,12 @@
   <p:clrMapOvr>
     <a:masterClrMapping/>
   </p:clrMapOvr>
-  <p:transition spd="med"/>
+  <p:transition xmlns:p14="http://schemas.microsoft.com/office/powerpoint/2010/main" spd="med" advClick="1"/>
 </p:sld>
 </file>
 
 <file path=ppt/slides/slide8.xml><?xml version="1.0" encoding="utf-8"?>
-<p:sld xmlns:a="http://schemas.openxmlformats.org/drawingml/2006/main" xmlns:r="http://schemas.openxmlformats.org/officeDocument/2006/relationships" xmlns:p="http://schemas.openxmlformats.org/presentationml/2006/main">
+<p:sld xmlns:a="http://schemas.openxmlformats.org/drawingml/2006/main" xmlns:r="http://schemas.openxmlformats.org/officeDocument/2006/relationships" xmlns:p="http://schemas.openxmlformats.org/presentationml/2006/main" xmlns:m="http://schemas.openxmlformats.org/officeDocument/2006/math" xmlns:a14="http://schemas.microsoft.com/office/drawing/2010/main" showMasterSp="1" showMasterPhAnim="1">
   <p:cSld>
     <p:spTree>
       <p:nvGrpSpPr>
@@ -4262,10 +4104,8 @@
       </p:grpSpPr>
       <p:sp>
         <p:nvSpPr>
-          <p:cNvPr id="140" name="NIST Tests"/>
-          <p:cNvSpPr txBox="1">
-            <a:spLocks noGrp="1"/>
-          </p:cNvSpPr>
+          <p:cNvPr id="143" name="NIST Tests"/>
+          <p:cNvSpPr txBox="1"/>
           <p:nvPr>
             <p:ph type="title"/>
           </p:nvPr>
@@ -4283,54 +4123,32 @@
             </a:lvl1pPr>
           </a:lstStyle>
           <a:p>
-            <a:r>
-              <a:rPr lang="en-US" dirty="0"/>
-              <a:t>Diehard </a:t>
-            </a:r>
-            <a:r>
-              <a:rPr dirty="0"/>
-              <a:t>Tests</a:t>
+            <a:pPr/>
+            <a:r>
+              <a:t>Diehard Tests</a:t>
             </a:r>
           </a:p>
         </p:txBody>
       </p:sp>
       <p:graphicFrame>
         <p:nvGraphicFramePr>
-          <p:cNvPr id="141" name="Table"/>
+          <p:cNvPr id="144" name="Table"/>
           <p:cNvGraphicFramePr/>
-          <p:nvPr>
-            <p:extLst>
-              <p:ext uri="{D42A27DB-BD31-4B8C-83A1-F6EECF244321}">
-                <p14:modId xmlns:p14="http://schemas.microsoft.com/office/powerpoint/2010/main" val="14945791"/>
-              </p:ext>
-            </p:extLst>
-          </p:nvPr>
+          <p:nvPr/>
         </p:nvGraphicFramePr>
         <p:xfrm>
           <a:off x="1287090" y="2597150"/>
-          <a:ext cx="10430618" cy="6286500"/>
+          <a:ext cx="10430619" cy="6286500"/>
         </p:xfrm>
-        <a:graphic>
+        <a:graphic xmlns:a="http://schemas.openxmlformats.org/drawingml/2006/main">
           <a:graphicData uri="http://schemas.openxmlformats.org/drawingml/2006/table">
             <a:tbl>
-              <a:tblPr>
+              <a:tblPr firstCol="0" firstRow="0" lastCol="0" lastRow="0" bandCol="0" bandRow="0" rtl="0">
                 <a:tableStyleId>{4C3C2611-4C71-4FC5-86AE-919BDF0F9419}</a:tableStyleId>
               </a:tblPr>
               <a:tblGrid>
-                <a:gridCol w="5215309">
-                  <a:extLst>
-                    <a:ext uri="{9D8B030D-6E8A-4147-A177-3AD203B41FA5}">
-                      <a16:colId xmlns:a16="http://schemas.microsoft.com/office/drawing/2014/main" val="20000"/>
-                    </a:ext>
-                  </a:extLst>
-                </a:gridCol>
-                <a:gridCol w="5215309">
-                  <a:extLst>
-                    <a:ext uri="{9D8B030D-6E8A-4147-A177-3AD203B41FA5}">
-                      <a16:colId xmlns:a16="http://schemas.microsoft.com/office/drawing/2014/main" val="20001"/>
-                    </a:ext>
-                  </a:extLst>
-                </a:gridCol>
+                <a:gridCol w="5215309"/>
+                <a:gridCol w="5215309"/>
               </a:tblGrid>
               <a:tr h="1047750">
                 <a:tc>
@@ -4342,29 +4160,14 @@
                         <a:defRPr sz="1800"/>
                       </a:pPr>
                       <a:r>
-                        <a:rPr lang="en-US" sz="2500" dirty="0">
-                          <a:sym typeface="Helvetica Neue"/>
+                        <a:rPr sz="2500">
+                          <a:sym typeface="Helvetica Neue Medium"/>
                         </a:rPr>
-                        <a:t>The “Birthday </a:t>
+                        <a:t>The “Birthday spacings” Test </a:t>
                       </a:r>
-                      <a:r>
-                        <a:rPr lang="en-US" sz="2500" dirty="0" err="1">
-                          <a:sym typeface="Helvetica Neue"/>
-                        </a:rPr>
-                        <a:t>spacings</a:t>
-                      </a:r>
-                      <a:r>
-                        <a:rPr lang="en-US" sz="2500" dirty="0">
-                          <a:sym typeface="Helvetica Neue"/>
-                        </a:rPr>
-                        <a:t>” Test </a:t>
-                      </a:r>
-                      <a:endParaRPr sz="2500" dirty="0">
-                        <a:sym typeface="Helvetica Neue"/>
-                      </a:endParaRPr>
                     </a:p>
                   </a:txBody>
-                  <a:tcPr marL="50800" marR="50800" marT="50800" marB="50800" anchor="ctr" horzOverflow="overflow"/>
+                  <a:tcPr marL="50800" marR="50800" marT="50800" marB="50800" anchor="ctr" anchorCtr="0" horzOverflow="overflow"/>
                 </a:tc>
                 <a:tc>
                   <a:txBody>
@@ -4375,23 +4178,15 @@
                         <a:defRPr sz="1800"/>
                       </a:pPr>
                       <a:r>
-                        <a:rPr lang="en-US" sz="2500" dirty="0">
-                          <a:sym typeface="Helvetica Neue"/>
+                        <a:rPr sz="2500">
+                          <a:sym typeface="Helvetica Neue Medium"/>
                         </a:rPr>
                         <a:t>The “Random spheres” Test </a:t>
                       </a:r>
-                      <a:endParaRPr sz="2500" dirty="0">
-                        <a:sym typeface="Helvetica Neue"/>
-                      </a:endParaRPr>
                     </a:p>
                   </a:txBody>
-                  <a:tcPr marL="50800" marR="50800" marT="50800" marB="50800" anchor="ctr" horzOverflow="overflow"/>
+                  <a:tcPr marL="50800" marR="50800" marT="50800" marB="50800" anchor="ctr" anchorCtr="0" horzOverflow="overflow"/>
                 </a:tc>
-                <a:extLst>
-                  <a:ext uri="{0D108BD9-81ED-4DB2-BD59-A6C34878D82A}">
-                    <a16:rowId xmlns:a16="http://schemas.microsoft.com/office/drawing/2014/main" val="10000"/>
-                  </a:ext>
-                </a:extLst>
               </a:tr>
               <a:tr h="1047750">
                 <a:tc>
@@ -4403,17 +4198,14 @@
                         <a:defRPr sz="1800"/>
                       </a:pPr>
                       <a:r>
-                        <a:rPr lang="en-US" sz="2500" dirty="0">
-                          <a:sym typeface="Helvetica Neue"/>
+                        <a:rPr sz="2500">
+                          <a:sym typeface="Helvetica Neue Medium"/>
                         </a:rPr>
                         <a:t>The “Overlapping permutations” Test </a:t>
                       </a:r>
-                      <a:endParaRPr sz="2500" dirty="0">
-                        <a:sym typeface="Helvetica Neue"/>
-                      </a:endParaRPr>
                     </a:p>
                   </a:txBody>
-                  <a:tcPr marL="50800" marR="50800" marT="50800" marB="50800" anchor="ctr" horzOverflow="overflow"/>
+                  <a:tcPr marL="50800" marR="50800" marT="50800" marB="50800" anchor="ctr" anchorCtr="0" horzOverflow="overflow"/>
                 </a:tc>
                 <a:tc>
                   <a:txBody>
@@ -4424,23 +4216,15 @@
                         <a:defRPr sz="1800"/>
                       </a:pPr>
                       <a:r>
-                        <a:rPr lang="en-US" sz="2500" dirty="0">
-                          <a:sym typeface="Helvetica Neue"/>
+                        <a:rPr sz="2500">
+                          <a:sym typeface="Helvetica Neue Medium"/>
                         </a:rPr>
                         <a:t>The “squeeze” Test </a:t>
                       </a:r>
-                      <a:endParaRPr sz="2500" dirty="0">
-                        <a:sym typeface="Helvetica Neue"/>
-                      </a:endParaRPr>
                     </a:p>
                   </a:txBody>
-                  <a:tcPr marL="50800" marR="50800" marT="50800" marB="50800" anchor="ctr" horzOverflow="overflow"/>
+                  <a:tcPr marL="50800" marR="50800" marT="50800" marB="50800" anchor="ctr" anchorCtr="0" horzOverflow="overflow"/>
                 </a:tc>
-                <a:extLst>
-                  <a:ext uri="{0D108BD9-81ED-4DB2-BD59-A6C34878D82A}">
-                    <a16:rowId xmlns:a16="http://schemas.microsoft.com/office/drawing/2014/main" val="10001"/>
-                  </a:ext>
-                </a:extLst>
               </a:tr>
               <a:tr h="1047750">
                 <a:tc>
@@ -4452,17 +4236,14 @@
                         <a:defRPr sz="1800"/>
                       </a:pPr>
                       <a:r>
-                        <a:rPr lang="en-US" sz="2500" dirty="0">
-                          <a:sym typeface="Helvetica Neue"/>
+                        <a:rPr sz="2500">
+                          <a:sym typeface="Helvetica Neue Medium"/>
                         </a:rPr>
                         <a:t>The “Ranks of matrices” Test </a:t>
                       </a:r>
-                      <a:endParaRPr sz="2500" dirty="0">
-                        <a:sym typeface="Helvetica Neue"/>
-                      </a:endParaRPr>
                     </a:p>
                   </a:txBody>
-                  <a:tcPr marL="50800" marR="50800" marT="50800" marB="50800" anchor="ctr" horzOverflow="overflow"/>
+                  <a:tcPr marL="50800" marR="50800" marT="50800" marB="50800" anchor="ctr" anchorCtr="0" horzOverflow="overflow"/>
                 </a:tc>
                 <a:tc>
                   <a:txBody>
@@ -4473,23 +4254,15 @@
                         <a:defRPr sz="1800"/>
                       </a:pPr>
                       <a:r>
-                        <a:rPr lang="en-US" sz="2500" dirty="0">
-                          <a:sym typeface="Helvetica Neue"/>
+                        <a:rPr sz="2500">
+                          <a:sym typeface="Helvetica Neue Medium"/>
                         </a:rPr>
                         <a:t>The “Overlapping sums” Test </a:t>
                       </a:r>
-                      <a:endParaRPr sz="2500" dirty="0">
-                        <a:sym typeface="Helvetica Neue"/>
-                      </a:endParaRPr>
                     </a:p>
                   </a:txBody>
-                  <a:tcPr marL="50800" marR="50800" marT="50800" marB="50800" anchor="ctr" horzOverflow="overflow"/>
+                  <a:tcPr marL="50800" marR="50800" marT="50800" marB="50800" anchor="ctr" anchorCtr="0" horzOverflow="overflow"/>
                 </a:tc>
-                <a:extLst>
-                  <a:ext uri="{0D108BD9-81ED-4DB2-BD59-A6C34878D82A}">
-                    <a16:rowId xmlns:a16="http://schemas.microsoft.com/office/drawing/2014/main" val="10002"/>
-                  </a:ext>
-                </a:extLst>
               </a:tr>
               <a:tr h="1047750">
                 <a:tc>
@@ -4501,58 +4274,33 @@
                         <a:defRPr sz="1800"/>
                       </a:pPr>
                       <a:r>
-                        <a:rPr lang="en-US" sz="2500" dirty="0">
-                          <a:sym typeface="Helvetica Neue"/>
+                        <a:rPr sz="2500">
+                          <a:sym typeface="Helvetica Neue Medium"/>
                         </a:rPr>
                         <a:t>The “Monkey” Tests </a:t>
                       </a:r>
-                      <a:endParaRPr sz="2500" dirty="0">
-                        <a:sym typeface="Helvetica Neue"/>
-                      </a:endParaRPr>
                     </a:p>
                   </a:txBody>
-                  <a:tcPr marL="50800" marR="50800" marT="50800" marB="50800" anchor="ctr" horzOverflow="overflow"/>
+                  <a:tcPr marL="50800" marR="50800" marT="50800" marB="50800" anchor="ctr" anchorCtr="0" horzOverflow="overflow"/>
                 </a:tc>
                 <a:tc>
                   <a:txBody>
                     <a:bodyPr/>
                     <a:lstStyle/>
                     <a:p>
-                      <a:pPr marL="0" marR="0" indent="0" algn="ctr" defTabSz="914400" eaLnBrk="1" fontAlgn="auto" latinLnBrk="0" hangingPunct="1">
-                        <a:lnSpc>
-                          <a:spcPct val="100000"/>
-                        </a:lnSpc>
-                        <a:spcBef>
-                          <a:spcPts val="0"/>
-                        </a:spcBef>
-                        <a:spcAft>
-                          <a:spcPts val="0"/>
-                        </a:spcAft>
-                        <a:buClrTx/>
-                        <a:buSzTx/>
-                        <a:buFontTx/>
-                        <a:buNone/>
-                        <a:tabLst/>
+                      <a:pPr defTabSz="914400">
                         <a:defRPr sz="1800"/>
                       </a:pPr>
                       <a:r>
-                        <a:rPr lang="en-US" sz="2500" dirty="0">
-                          <a:sym typeface="Helvetica Neue"/>
+                        <a:rPr sz="2500">
+                          <a:sym typeface="Helvetica Neue Medium"/>
                         </a:rPr>
                         <a:t>  The “Runs” Test </a:t>
                       </a:r>
-                      <a:endParaRPr sz="2500" dirty="0">
-                        <a:sym typeface="Helvetica Neue"/>
-                      </a:endParaRPr>
                     </a:p>
                   </a:txBody>
-                  <a:tcPr marL="50800" marR="50800" marT="50800" marB="50800" anchor="ctr" horzOverflow="overflow"/>
+                  <a:tcPr marL="50800" marR="50800" marT="50800" marB="50800" anchor="ctr" anchorCtr="0" horzOverflow="overflow"/>
                 </a:tc>
-                <a:extLst>
-                  <a:ext uri="{0D108BD9-81ED-4DB2-BD59-A6C34878D82A}">
-                    <a16:rowId xmlns:a16="http://schemas.microsoft.com/office/drawing/2014/main" val="10003"/>
-                  </a:ext>
-                </a:extLst>
               </a:tr>
               <a:tr h="1047750">
                 <a:tc>
@@ -4564,17 +4312,14 @@
                         <a:defRPr sz="1800"/>
                       </a:pPr>
                       <a:r>
-                        <a:rPr lang="en-US" sz="2500" dirty="0">
-                          <a:sym typeface="Helvetica Neue"/>
+                        <a:rPr sz="2500">
+                          <a:sym typeface="Helvetica Neue Medium"/>
                         </a:rPr>
                         <a:t>The “Parking lot” Test </a:t>
                       </a:r>
-                      <a:endParaRPr sz="2500" dirty="0">
-                        <a:sym typeface="Helvetica Neue"/>
-                      </a:endParaRPr>
                     </a:p>
                   </a:txBody>
-                  <a:tcPr marL="50800" marR="50800" marT="50800" marB="50800" anchor="ctr" horzOverflow="overflow"/>
+                  <a:tcPr marL="50800" marR="50800" marT="50800" marB="50800" anchor="ctr" anchorCtr="0" horzOverflow="overflow"/>
                 </a:tc>
                 <a:tc>
                   <a:txBody>
@@ -4585,23 +4330,15 @@
                         <a:defRPr sz="1800"/>
                       </a:pPr>
                       <a:r>
-                        <a:rPr lang="en-US" sz="2500" dirty="0">
-                          <a:sym typeface="Helvetica Neue"/>
+                        <a:rPr sz="2500">
+                          <a:sym typeface="Helvetica Neue Medium"/>
                         </a:rPr>
                         <a:t>The “craps” Test “ </a:t>
                       </a:r>
-                      <a:endParaRPr sz="2500" dirty="0">
-                        <a:sym typeface="Helvetica Neue"/>
-                      </a:endParaRPr>
                     </a:p>
                   </a:txBody>
-                  <a:tcPr marL="50800" marR="50800" marT="50800" marB="50800" anchor="ctr" horzOverflow="overflow"/>
+                  <a:tcPr marL="50800" marR="50800" marT="50800" marB="50800" anchor="ctr" anchorCtr="0" horzOverflow="overflow"/>
                 </a:tc>
-                <a:extLst>
-                  <a:ext uri="{0D108BD9-81ED-4DB2-BD59-A6C34878D82A}">
-                    <a16:rowId xmlns:a16="http://schemas.microsoft.com/office/drawing/2014/main" val="10004"/>
-                  </a:ext>
-                </a:extLst>
               </a:tr>
               <a:tr h="1047750">
                 <a:tc>
@@ -4613,17 +4350,14 @@
                         <a:defRPr sz="1800"/>
                       </a:pPr>
                       <a:r>
-                        <a:rPr lang="en-US" sz="2500" dirty="0">
-                          <a:sym typeface="Helvetica Neue"/>
+                        <a:rPr sz="2500">
+                          <a:sym typeface="Helvetica Neue Medium"/>
                         </a:rPr>
                         <a:t>The “Minimum distance” Test </a:t>
                       </a:r>
-                      <a:endParaRPr sz="2500" dirty="0">
-                        <a:sym typeface="Helvetica Neue"/>
-                      </a:endParaRPr>
                     </a:p>
                   </a:txBody>
-                  <a:tcPr marL="50800" marR="50800" marT="50800" marB="50800" anchor="ctr" horzOverflow="overflow"/>
+                  <a:tcPr marL="50800" marR="50800" marT="50800" marB="50800" anchor="ctr" anchorCtr="0" horzOverflow="overflow"/>
                 </a:tc>
                 <a:tc>
                   <a:txBody>
@@ -4631,20 +4365,14 @@
                     <a:lstStyle/>
                     <a:p>
                       <a:pPr defTabSz="914400">
-                        <a:defRPr sz="1800"/>
+                        <a:defRPr sz="2500">
+                          <a:sym typeface="Helvetica Neue Medium"/>
+                        </a:defRPr>
                       </a:pPr>
-                      <a:endParaRPr sz="2500" dirty="0">
-                        <a:sym typeface="Helvetica Neue"/>
-                      </a:endParaRPr>
                     </a:p>
                   </a:txBody>
-                  <a:tcPr marL="50800" marR="50800" marT="50800" marB="50800" anchor="ctr" horzOverflow="overflow"/>
+                  <a:tcPr marL="50800" marR="50800" marT="50800" marB="50800" anchor="ctr" anchorCtr="0" horzOverflow="overflow"/>
                 </a:tc>
-                <a:extLst>
-                  <a:ext uri="{0D108BD9-81ED-4DB2-BD59-A6C34878D82A}">
-                    <a16:rowId xmlns:a16="http://schemas.microsoft.com/office/drawing/2014/main" val="10005"/>
-                  </a:ext>
-                </a:extLst>
               </a:tr>
             </a:tbl>
           </a:graphicData>
@@ -4655,12 +4383,12 @@
   <p:clrMapOvr>
     <a:masterClrMapping/>
   </p:clrMapOvr>
-  <p:transition spd="med"/>
+  <p:transition xmlns:p14="http://schemas.microsoft.com/office/powerpoint/2010/main" spd="med" advClick="1"/>
 </p:sld>
 </file>
 
 <file path=ppt/slides/slide9.xml><?xml version="1.0" encoding="utf-8"?>
-<p:sld xmlns:a="http://schemas.openxmlformats.org/drawingml/2006/main" xmlns:r="http://schemas.openxmlformats.org/officeDocument/2006/relationships" xmlns:p="http://schemas.openxmlformats.org/presentationml/2006/main">
+<p:sld xmlns:a="http://schemas.openxmlformats.org/drawingml/2006/main" xmlns:r="http://schemas.openxmlformats.org/officeDocument/2006/relationships" xmlns:p="http://schemas.openxmlformats.org/presentationml/2006/main" xmlns:m="http://schemas.openxmlformats.org/officeDocument/2006/math" xmlns:a14="http://schemas.microsoft.com/office/drawing/2010/main" showMasterSp="1" showMasterPhAnim="1">
   <p:cSld>
     <p:spTree>
       <p:nvGrpSpPr>
@@ -4678,10 +4406,8 @@
       </p:grpSpPr>
       <p:sp>
         <p:nvSpPr>
-          <p:cNvPr id="143" name="Demo"/>
-          <p:cNvSpPr txBox="1">
-            <a:spLocks noGrp="1"/>
-          </p:cNvSpPr>
+          <p:cNvPr id="146" name="Demo"/>
+          <p:cNvSpPr txBox="1"/>
           <p:nvPr>
             <p:ph type="title"/>
           </p:nvPr>
@@ -4699,57 +4425,53 @@
             </a:lvl1pPr>
           </a:lstStyle>
           <a:p>
+            <a:pPr/>
             <a:r>
               <a:t>Demo</a:t>
             </a:r>
           </a:p>
         </p:txBody>
       </p:sp>
-      <p:sp>
-        <p:nvSpPr>
-          <p:cNvPr id="144" name="Body"/>
-          <p:cNvSpPr txBox="1">
-            <a:spLocks noGrp="1"/>
-          </p:cNvSpPr>
-          <p:nvPr>
-            <p:ph type="body" idx="1"/>
-          </p:nvPr>
-        </p:nvSpPr>
+      <p:pic>
+        <p:nvPicPr>
+          <p:cNvPr id="147" name="mspaintadventure21.gif" descr="mspaintadventure21.gif"/>
+          <p:cNvPicPr>
+            <a:picLocks noChangeAspect="1"/>
+          </p:cNvPicPr>
+          <p:nvPr/>
+        </p:nvPicPr>
+        <p:blipFill>
+          <a:blip r:embed="rId2">
+            <a:extLst/>
+          </a:blip>
+          <a:stretch>
+            <a:fillRect/>
+          </a:stretch>
+        </p:blipFill>
         <p:spPr>
+          <a:xfrm>
+            <a:off x="2362200" y="1682750"/>
+            <a:ext cx="9931400" cy="6896100"/>
+          </a:xfrm>
           <a:prstGeom prst="rect">
             <a:avLst/>
           </a:prstGeom>
+          <a:ln w="12700">
+            <a:miter lim="400000"/>
+          </a:ln>
         </p:spPr>
-        <p:txBody>
-          <a:bodyPr/>
-          <a:lstStyle/>
-          <a:p>
-            <a:pPr marL="0" indent="0">
-              <a:buNone/>
-            </a:pPr>
-            <a:r>
-              <a:rPr lang="en-US" dirty="0"/>
-              <a:t>David will be presenting </a:t>
-            </a:r>
-            <a:r>
-              <a:rPr lang="en-US"/>
-              <a:t>a demonstration!</a:t>
-            </a:r>
-            <a:endParaRPr dirty="0"/>
-          </a:p>
-        </p:txBody>
-      </p:sp>
+      </p:pic>
     </p:spTree>
   </p:cSld>
   <p:clrMapOvr>
     <a:masterClrMapping/>
   </p:clrMapOvr>
-  <p:transition spd="med"/>
+  <p:transition xmlns:p14="http://schemas.microsoft.com/office/powerpoint/2010/main" spd="med" advClick="1"/>
 </p:sld>
 </file>
 
 <file path=ppt/theme/theme1.xml><?xml version="1.0" encoding="utf-8"?>
-<a:theme xmlns:a="http://schemas.openxmlformats.org/drawingml/2006/main" name="White">
+<a:theme xmlns:a="http://schemas.openxmlformats.org/drawingml/2006/main" xmlns:r="http://schemas.openxmlformats.org/officeDocument/2006/relationships" name="White">
   <a:themeElements>
     <a:clrScheme name="White">
       <a:dk1>
@@ -4759,10 +4481,10 @@
         <a:srgbClr val="FFFFFF"/>
       </a:lt1>
       <a:dk2>
-        <a:srgbClr val="5E5E5E"/>
+        <a:srgbClr val="A7A7A7"/>
       </a:dk2>
       <a:lt2>
-        <a:srgbClr val="D6D5D5"/>
+        <a:srgbClr val="535353"/>
       </a:lt2>
       <a:accent1>
         <a:srgbClr val="00A2FF"/>
@@ -4791,14 +4513,14 @@
     </a:clrScheme>
     <a:fontScheme name="White">
       <a:majorFont>
-        <a:latin typeface="Helvetica Neue Medium"/>
-        <a:ea typeface="Helvetica Neue Medium"/>
-        <a:cs typeface="Helvetica Neue Medium"/>
+        <a:latin typeface="Helvetica"/>
+        <a:ea typeface="Helvetica"/>
+        <a:cs typeface="Helvetica"/>
       </a:majorFont>
       <a:minorFont>
-        <a:latin typeface="Helvetica Neue Medium"/>
-        <a:ea typeface="Helvetica Neue Medium"/>
-        <a:cs typeface="Helvetica Neue Medium"/>
+        <a:latin typeface="Helvetica Neue"/>
+        <a:ea typeface="Helvetica Neue"/>
+        <a:cs typeface="Helvetica Neue"/>
       </a:minorFont>
     </a:fontScheme>
     <a:fmtScheme name="White">
@@ -4939,16 +4661,19 @@
     <a:spDef>
       <a:spPr>
         <a:solidFill>
-          <a:schemeClr val="accent1"/>
+          <a:srgbClr val="FFFFFF"/>
         </a:solidFill>
-        <a:ln w="12700" cap="flat">
-          <a:noFill/>
-          <a:miter lim="400000"/>
+        <a:ln w="25400" cap="flat">
+          <a:solidFill>
+            <a:schemeClr val="accent1"/>
+          </a:solidFill>
+          <a:prstDash val="solid"/>
+          <a:round/>
         </a:ln>
         <a:effectLst/>
         <a:sp3d/>
       </a:spPr>
-      <a:bodyPr rot="0" spcFirstLastPara="1" vertOverflow="overflow" horzOverflow="overflow" vert="horz" wrap="square" lIns="50800" tIns="50800" rIns="50800" bIns="50800" numCol="1" spcCol="38100" rtlCol="0" anchor="ctr">
+      <a:bodyPr rot="0" spcFirstLastPara="1" vertOverflow="overflow" horzOverflow="overflow" vert="horz" wrap="square" lIns="50800" tIns="50800" rIns="50800" bIns="50800" numCol="1" spcCol="38100" rtlCol="0" anchor="ctr" upright="0">
         <a:spAutoFit/>
       </a:bodyPr>
       <a:lstStyle>
@@ -4967,18 +4692,18 @@
           <a:buFontTx/>
           <a:buNone/>
           <a:tabLst/>
-          <a:defRPr kumimoji="0" sz="2200" b="0" i="0" u="none" strike="noStrike" cap="none" spc="0" normalizeH="0" baseline="0">
+          <a:defRPr b="0" baseline="0" cap="none" i="0" spc="0" strike="noStrike" sz="2400" u="none" kumimoji="0" normalizeH="0">
             <a:ln>
               <a:noFill/>
             </a:ln>
             <a:solidFill>
-              <a:srgbClr val="FFFFFF"/>
+              <a:srgbClr val="000000"/>
             </a:solidFill>
             <a:effectLst/>
             <a:uFillTx/>
-            <a:latin typeface="+mn-lt"/>
-            <a:ea typeface="+mn-ea"/>
-            <a:cs typeface="+mn-cs"/>
+            <a:latin typeface="Helvetica Neue Medium"/>
+            <a:ea typeface="Helvetica Neue Medium"/>
+            <a:cs typeface="Helvetica Neue Medium"/>
             <a:sym typeface="Helvetica Neue Medium"/>
           </a:defRPr>
         </a:defPPr>
@@ -4997,7 +4722,7 @@
           <a:buFontTx/>
           <a:buNone/>
           <a:tabLst/>
-          <a:defRPr kumimoji="0" sz="1800" b="0" i="0" u="none" strike="noStrike" cap="none" spc="0" normalizeH="0" baseline="0">
+          <a:defRPr b="0" baseline="0" cap="none" i="0" spc="0" strike="noStrike" sz="1800" u="none" kumimoji="0" normalizeH="0">
             <a:ln>
               <a:noFill/>
             </a:ln>
@@ -5023,7 +4748,7 @@
           <a:buFontTx/>
           <a:buNone/>
           <a:tabLst/>
-          <a:defRPr kumimoji="0" sz="1800" b="0" i="0" u="none" strike="noStrike" cap="none" spc="0" normalizeH="0" baseline="0">
+          <a:defRPr b="0" baseline="0" cap="none" i="0" spc="0" strike="noStrike" sz="1800" u="none" kumimoji="0" normalizeH="0">
             <a:ln>
               <a:noFill/>
             </a:ln>
@@ -5049,7 +4774,7 @@
           <a:buFontTx/>
           <a:buNone/>
           <a:tabLst/>
-          <a:defRPr kumimoji="0" sz="1800" b="0" i="0" u="none" strike="noStrike" cap="none" spc="0" normalizeH="0" baseline="0">
+          <a:defRPr b="0" baseline="0" cap="none" i="0" spc="0" strike="noStrike" sz="1800" u="none" kumimoji="0" normalizeH="0">
             <a:ln>
               <a:noFill/>
             </a:ln>
@@ -5075,7 +4800,7 @@
           <a:buFontTx/>
           <a:buNone/>
           <a:tabLst/>
-          <a:defRPr kumimoji="0" sz="1800" b="0" i="0" u="none" strike="noStrike" cap="none" spc="0" normalizeH="0" baseline="0">
+          <a:defRPr b="0" baseline="0" cap="none" i="0" spc="0" strike="noStrike" sz="1800" u="none" kumimoji="0" normalizeH="0">
             <a:ln>
               <a:noFill/>
             </a:ln>
@@ -5101,7 +4826,7 @@
           <a:buFontTx/>
           <a:buNone/>
           <a:tabLst/>
-          <a:defRPr kumimoji="0" sz="1800" b="0" i="0" u="none" strike="noStrike" cap="none" spc="0" normalizeH="0" baseline="0">
+          <a:defRPr b="0" baseline="0" cap="none" i="0" spc="0" strike="noStrike" sz="1800" u="none" kumimoji="0" normalizeH="0">
             <a:ln>
               <a:noFill/>
             </a:ln>
@@ -5127,7 +4852,7 @@
           <a:buFontTx/>
           <a:buNone/>
           <a:tabLst/>
-          <a:defRPr kumimoji="0" sz="1800" b="0" i="0" u="none" strike="noStrike" cap="none" spc="0" normalizeH="0" baseline="0">
+          <a:defRPr b="0" baseline="0" cap="none" i="0" spc="0" strike="noStrike" sz="1800" u="none" kumimoji="0" normalizeH="0">
             <a:ln>
               <a:noFill/>
             </a:ln>
@@ -5153,7 +4878,7 @@
           <a:buFontTx/>
           <a:buNone/>
           <a:tabLst/>
-          <a:defRPr kumimoji="0" sz="1800" b="0" i="0" u="none" strike="noStrike" cap="none" spc="0" normalizeH="0" baseline="0">
+          <a:defRPr b="0" baseline="0" cap="none" i="0" spc="0" strike="noStrike" sz="1800" u="none" kumimoji="0" normalizeH="0">
             <a:ln>
               <a:noFill/>
             </a:ln>
@@ -5179,7 +4904,7 @@
           <a:buFontTx/>
           <a:buNone/>
           <a:tabLst/>
-          <a:defRPr kumimoji="0" sz="1800" b="0" i="0" u="none" strike="noStrike" cap="none" spc="0" normalizeH="0" baseline="0">
+          <a:defRPr b="0" baseline="0" cap="none" i="0" spc="0" strike="noStrike" sz="1800" u="none" kumimoji="0" normalizeH="0">
             <a:ln>
               <a:noFill/>
             </a:ln>
@@ -5205,7 +4930,7 @@
           <a:buFontTx/>
           <a:buNone/>
           <a:tabLst/>
-          <a:defRPr kumimoji="0" sz="1800" b="0" i="0" u="none" strike="noStrike" cap="none" spc="0" normalizeH="0" baseline="0">
+          <a:defRPr b="0" baseline="0" cap="none" i="0" spc="0" strike="noStrike" sz="1800" u="none" kumimoji="0" normalizeH="0">
             <a:ln>
               <a:noFill/>
             </a:ln>
@@ -5218,15 +4943,9 @@
         </a:lvl9pPr>
       </a:lstStyle>
       <a:style>
-        <a:lnRef idx="0">
-          <a:scrgbClr r="0" g="0" b="0"/>
-        </a:lnRef>
-        <a:fillRef idx="0">
-          <a:scrgbClr r="0" g="0" b="0"/>
-        </a:fillRef>
-        <a:effectRef idx="0">
-          <a:scrgbClr r="0" g="0" b="0"/>
-        </a:effectRef>
+        <a:lnRef idx="0"/>
+        <a:fillRef idx="0"/>
+        <a:effectRef idx="0"/>
         <a:fontRef idx="none"/>
       </a:style>
     </a:spDef>
@@ -5235,15 +4954,15 @@
         <a:noFill/>
         <a:ln w="25400" cap="flat">
           <a:solidFill>
-            <a:srgbClr val="000000"/>
+            <a:schemeClr val="accent1"/>
           </a:solidFill>
           <a:prstDash val="solid"/>
-          <a:miter lim="400000"/>
+          <a:round/>
         </a:ln>
         <a:effectLst/>
         <a:sp3d/>
       </a:spPr>
-      <a:bodyPr rot="0" spcFirstLastPara="1" vertOverflow="overflow" horzOverflow="overflow" vert="horz" wrap="square" lIns="91439" tIns="45719" rIns="91439" bIns="45719" numCol="1" spcCol="38100" rtlCol="0" anchor="t">
+      <a:bodyPr rot="0" spcFirstLastPara="1" vertOverflow="overflow" horzOverflow="overflow" vert="horz" wrap="square" lIns="91439" tIns="45719" rIns="91439" bIns="45719" numCol="1" spcCol="38100" rtlCol="0" anchor="t" upright="0">
         <a:noAutofit/>
       </a:bodyPr>
       <a:lstStyle>
@@ -5262,7 +4981,7 @@
           <a:buFontTx/>
           <a:buNone/>
           <a:tabLst/>
-          <a:defRPr kumimoji="0" sz="1800" b="0" i="0" u="none" strike="noStrike" cap="none" spc="0" normalizeH="0" baseline="0">
+          <a:defRPr b="0" baseline="0" cap="none" i="0" spc="0" strike="noStrike" sz="1800" u="none" kumimoji="0" normalizeH="0">
             <a:ln>
               <a:noFill/>
             </a:ln>
@@ -5288,7 +5007,7 @@
           <a:buFontTx/>
           <a:buNone/>
           <a:tabLst/>
-          <a:defRPr kumimoji="0" sz="1800" b="0" i="0" u="none" strike="noStrike" cap="none" spc="0" normalizeH="0" baseline="0">
+          <a:defRPr b="0" baseline="0" cap="none" i="0" spc="0" strike="noStrike" sz="1800" u="none" kumimoji="0" normalizeH="0">
             <a:ln>
               <a:noFill/>
             </a:ln>
@@ -5314,7 +5033,7 @@
           <a:buFontTx/>
           <a:buNone/>
           <a:tabLst/>
-          <a:defRPr kumimoji="0" sz="1800" b="0" i="0" u="none" strike="noStrike" cap="none" spc="0" normalizeH="0" baseline="0">
+          <a:defRPr b="0" baseline="0" cap="none" i="0" spc="0" strike="noStrike" sz="1800" u="none" kumimoji="0" normalizeH="0">
             <a:ln>
               <a:noFill/>
             </a:ln>
@@ -5340,7 +5059,7 @@
           <a:buFontTx/>
           <a:buNone/>
           <a:tabLst/>
-          <a:defRPr kumimoji="0" sz="1800" b="0" i="0" u="none" strike="noStrike" cap="none" spc="0" normalizeH="0" baseline="0">
+          <a:defRPr b="0" baseline="0" cap="none" i="0" spc="0" strike="noStrike" sz="1800" u="none" kumimoji="0" normalizeH="0">
             <a:ln>
               <a:noFill/>
             </a:ln>
@@ -5366,7 +5085,7 @@
           <a:buFontTx/>
           <a:buNone/>
           <a:tabLst/>
-          <a:defRPr kumimoji="0" sz="1800" b="0" i="0" u="none" strike="noStrike" cap="none" spc="0" normalizeH="0" baseline="0">
+          <a:defRPr b="0" baseline="0" cap="none" i="0" spc="0" strike="noStrike" sz="1800" u="none" kumimoji="0" normalizeH="0">
             <a:ln>
               <a:noFill/>
             </a:ln>
@@ -5392,7 +5111,7 @@
           <a:buFontTx/>
           <a:buNone/>
           <a:tabLst/>
-          <a:defRPr kumimoji="0" sz="1800" b="0" i="0" u="none" strike="noStrike" cap="none" spc="0" normalizeH="0" baseline="0">
+          <a:defRPr b="0" baseline="0" cap="none" i="0" spc="0" strike="noStrike" sz="1800" u="none" kumimoji="0" normalizeH="0">
             <a:ln>
               <a:noFill/>
             </a:ln>
@@ -5418,7 +5137,7 @@
           <a:buFontTx/>
           <a:buNone/>
           <a:tabLst/>
-          <a:defRPr kumimoji="0" sz="1800" b="0" i="0" u="none" strike="noStrike" cap="none" spc="0" normalizeH="0" baseline="0">
+          <a:defRPr b="0" baseline="0" cap="none" i="0" spc="0" strike="noStrike" sz="1800" u="none" kumimoji="0" normalizeH="0">
             <a:ln>
               <a:noFill/>
             </a:ln>
@@ -5444,7 +5163,7 @@
           <a:buFontTx/>
           <a:buNone/>
           <a:tabLst/>
-          <a:defRPr kumimoji="0" sz="1800" b="0" i="0" u="none" strike="noStrike" cap="none" spc="0" normalizeH="0" baseline="0">
+          <a:defRPr b="0" baseline="0" cap="none" i="0" spc="0" strike="noStrike" sz="1800" u="none" kumimoji="0" normalizeH="0">
             <a:ln>
               <a:noFill/>
             </a:ln>
@@ -5470,7 +5189,7 @@
           <a:buFontTx/>
           <a:buNone/>
           <a:tabLst/>
-          <a:defRPr kumimoji="0" sz="1800" b="0" i="0" u="none" strike="noStrike" cap="none" spc="0" normalizeH="0" baseline="0">
+          <a:defRPr b="0" baseline="0" cap="none" i="0" spc="0" strike="noStrike" sz="1800" u="none" kumimoji="0" normalizeH="0">
             <a:ln>
               <a:noFill/>
             </a:ln>
@@ -5496,7 +5215,7 @@
           <a:buFontTx/>
           <a:buNone/>
           <a:tabLst/>
-          <a:defRPr kumimoji="0" sz="1800" b="0" i="0" u="none" strike="noStrike" cap="none" spc="0" normalizeH="0" baseline="0">
+          <a:defRPr b="0" baseline="0" cap="none" i="0" spc="0" strike="noStrike" sz="1800" u="none" kumimoji="0" normalizeH="0">
             <a:ln>
               <a:noFill/>
             </a:ln>
@@ -5509,15 +5228,9 @@
         </a:lvl9pPr>
       </a:lstStyle>
       <a:style>
-        <a:lnRef idx="0">
-          <a:scrgbClr r="0" g="0" b="0"/>
-        </a:lnRef>
-        <a:fillRef idx="0">
-          <a:scrgbClr r="0" g="0" b="0"/>
-        </a:fillRef>
-        <a:effectRef idx="0">
-          <a:scrgbClr r="0" g="0" b="0"/>
-        </a:effectRef>
+        <a:lnRef idx="0"/>
+        <a:fillRef idx="0"/>
+        <a:effectRef idx="0"/>
         <a:fontRef idx="none"/>
       </a:style>
     </a:lnDef>
@@ -5531,7 +5244,7 @@
         <a:effectLst/>
         <a:sp3d/>
       </a:spPr>
-      <a:bodyPr rot="0" spcFirstLastPara="1" vertOverflow="overflow" horzOverflow="overflow" vert="horz" wrap="square" lIns="50800" tIns="50800" rIns="50800" bIns="50800" numCol="1" spcCol="38100" rtlCol="0" anchor="ctr">
+      <a:bodyPr rot="0" spcFirstLastPara="1" vertOverflow="overflow" horzOverflow="overflow" vert="horz" wrap="square" lIns="50800" tIns="50800" rIns="50800" bIns="50800" numCol="1" spcCol="38100" rtlCol="0" anchor="ctr" upright="0">
         <a:spAutoFit/>
       </a:bodyPr>
       <a:lstStyle>
@@ -5550,7 +5263,7 @@
           <a:buFontTx/>
           <a:buNone/>
           <a:tabLst/>
-          <a:defRPr kumimoji="0" sz="2400" b="1" i="0" u="none" strike="noStrike" cap="none" spc="0" normalizeH="0" baseline="0">
+          <a:defRPr b="0" baseline="0" cap="none" i="0" spc="0" strike="noStrike" sz="2400" u="none" kumimoji="0" normalizeH="0">
             <a:ln>
               <a:noFill/>
             </a:ln>
@@ -5559,10 +5272,10 @@
             </a:solidFill>
             <a:effectLst/>
             <a:uFillTx/>
-            <a:latin typeface="Helvetica Neue"/>
-            <a:ea typeface="Helvetica Neue"/>
-            <a:cs typeface="Helvetica Neue"/>
-            <a:sym typeface="Helvetica Neue"/>
+            <a:latin typeface="Helvetica Neue Medium"/>
+            <a:ea typeface="Helvetica Neue Medium"/>
+            <a:cs typeface="Helvetica Neue Medium"/>
+            <a:sym typeface="Helvetica Neue Medium"/>
           </a:defRPr>
         </a:defPPr>
         <a:lvl1pPr marL="0" marR="0" indent="0" algn="l" defTabSz="914400" rtl="0" fontAlgn="auto" latinLnBrk="1" hangingPunct="0">
@@ -5580,7 +5293,7 @@
           <a:buFontTx/>
           <a:buNone/>
           <a:tabLst/>
-          <a:defRPr kumimoji="0" sz="1800" b="0" i="0" u="none" strike="noStrike" cap="none" spc="0" normalizeH="0" baseline="0">
+          <a:defRPr b="0" baseline="0" cap="none" i="0" spc="0" strike="noStrike" sz="1800" u="none" kumimoji="0" normalizeH="0">
             <a:ln>
               <a:noFill/>
             </a:ln>
@@ -5606,7 +5319,7 @@
           <a:buFontTx/>
           <a:buNone/>
           <a:tabLst/>
-          <a:defRPr kumimoji="0" sz="1800" b="0" i="0" u="none" strike="noStrike" cap="none" spc="0" normalizeH="0" baseline="0">
+          <a:defRPr b="0" baseline="0" cap="none" i="0" spc="0" strike="noStrike" sz="1800" u="none" kumimoji="0" normalizeH="0">
             <a:ln>
               <a:noFill/>
             </a:ln>
@@ -5632,7 +5345,7 @@
           <a:buFontTx/>
           <a:buNone/>
           <a:tabLst/>
-          <a:defRPr kumimoji="0" sz="1800" b="0" i="0" u="none" strike="noStrike" cap="none" spc="0" normalizeH="0" baseline="0">
+          <a:defRPr b="0" baseline="0" cap="none" i="0" spc="0" strike="noStrike" sz="1800" u="none" kumimoji="0" normalizeH="0">
             <a:ln>
               <a:noFill/>
             </a:ln>
@@ -5658,7 +5371,7 @@
           <a:buFontTx/>
           <a:buNone/>
           <a:tabLst/>
-          <a:defRPr kumimoji="0" sz="1800" b="0" i="0" u="none" strike="noStrike" cap="none" spc="0" normalizeH="0" baseline="0">
+          <a:defRPr b="0" baseline="0" cap="none" i="0" spc="0" strike="noStrike" sz="1800" u="none" kumimoji="0" normalizeH="0">
             <a:ln>
               <a:noFill/>
             </a:ln>
@@ -5684,7 +5397,7 @@
           <a:buFontTx/>
           <a:buNone/>
           <a:tabLst/>
-          <a:defRPr kumimoji="0" sz="1800" b="0" i="0" u="none" strike="noStrike" cap="none" spc="0" normalizeH="0" baseline="0">
+          <a:defRPr b="0" baseline="0" cap="none" i="0" spc="0" strike="noStrike" sz="1800" u="none" kumimoji="0" normalizeH="0">
             <a:ln>
               <a:noFill/>
             </a:ln>
@@ -5710,7 +5423,7 @@
           <a:buFontTx/>
           <a:buNone/>
           <a:tabLst/>
-          <a:defRPr kumimoji="0" sz="1800" b="0" i="0" u="none" strike="noStrike" cap="none" spc="0" normalizeH="0" baseline="0">
+          <a:defRPr b="0" baseline="0" cap="none" i="0" spc="0" strike="noStrike" sz="1800" u="none" kumimoji="0" normalizeH="0">
             <a:ln>
               <a:noFill/>
             </a:ln>
@@ -5736,7 +5449,7 @@
           <a:buFontTx/>
           <a:buNone/>
           <a:tabLst/>
-          <a:defRPr kumimoji="0" sz="1800" b="0" i="0" u="none" strike="noStrike" cap="none" spc="0" normalizeH="0" baseline="0">
+          <a:defRPr b="0" baseline="0" cap="none" i="0" spc="0" strike="noStrike" sz="1800" u="none" kumimoji="0" normalizeH="0">
             <a:ln>
               <a:noFill/>
             </a:ln>
@@ -5762,7 +5475,7 @@
           <a:buFontTx/>
           <a:buNone/>
           <a:tabLst/>
-          <a:defRPr kumimoji="0" sz="1800" b="0" i="0" u="none" strike="noStrike" cap="none" spc="0" normalizeH="0" baseline="0">
+          <a:defRPr b="0" baseline="0" cap="none" i="0" spc="0" strike="noStrike" sz="1800" u="none" kumimoji="0" normalizeH="0">
             <a:ln>
               <a:noFill/>
             </a:ln>
@@ -5788,7 +5501,7 @@
           <a:buFontTx/>
           <a:buNone/>
           <a:tabLst/>
-          <a:defRPr kumimoji="0" sz="1800" b="0" i="0" u="none" strike="noStrike" cap="none" spc="0" normalizeH="0" baseline="0">
+          <a:defRPr b="0" baseline="0" cap="none" i="0" spc="0" strike="noStrike" sz="1800" u="none" kumimoji="0" normalizeH="0">
             <a:ln>
               <a:noFill/>
             </a:ln>
@@ -5801,25 +5514,18 @@
         </a:lvl9pPr>
       </a:lstStyle>
       <a:style>
-        <a:lnRef idx="0">
-          <a:scrgbClr r="0" g="0" b="0"/>
-        </a:lnRef>
-        <a:fillRef idx="0">
-          <a:scrgbClr r="0" g="0" b="0"/>
-        </a:fillRef>
-        <a:effectRef idx="0">
-          <a:scrgbClr r="0" g="0" b="0"/>
-        </a:effectRef>
+        <a:lnRef idx="0"/>
+        <a:fillRef idx="0"/>
+        <a:effectRef idx="0"/>
         <a:fontRef idx="none"/>
       </a:style>
     </a:txDef>
   </a:objectDefaults>
-  <a:extraClrSchemeLst/>
 </a:theme>
 </file>
 
 <file path=ppt/theme/theme2.xml><?xml version="1.0" encoding="utf-8"?>
-<a:theme xmlns:a="http://schemas.openxmlformats.org/drawingml/2006/main" name="White">
+<a:theme xmlns:a="http://schemas.openxmlformats.org/drawingml/2006/main" xmlns:r="http://schemas.openxmlformats.org/officeDocument/2006/relationships" name="White">
   <a:themeElements>
     <a:clrScheme name="White">
       <a:dk1>
@@ -5829,10 +5535,10 @@
         <a:srgbClr val="FFFFFF"/>
       </a:lt1>
       <a:dk2>
-        <a:srgbClr val="5E5E5E"/>
+        <a:srgbClr val="A7A7A7"/>
       </a:dk2>
       <a:lt2>
-        <a:srgbClr val="D6D5D5"/>
+        <a:srgbClr val="535353"/>
       </a:lt2>
       <a:accent1>
         <a:srgbClr val="00A2FF"/>
@@ -5861,14 +5567,14 @@
     </a:clrScheme>
     <a:fontScheme name="White">
       <a:majorFont>
-        <a:latin typeface="Helvetica Neue Medium"/>
-        <a:ea typeface="Helvetica Neue Medium"/>
-        <a:cs typeface="Helvetica Neue Medium"/>
+        <a:latin typeface="Helvetica"/>
+        <a:ea typeface="Helvetica"/>
+        <a:cs typeface="Helvetica"/>
       </a:majorFont>
       <a:minorFont>
-        <a:latin typeface="Helvetica Neue Medium"/>
-        <a:ea typeface="Helvetica Neue Medium"/>
-        <a:cs typeface="Helvetica Neue Medium"/>
+        <a:latin typeface="Helvetica Neue"/>
+        <a:ea typeface="Helvetica Neue"/>
+        <a:cs typeface="Helvetica Neue"/>
       </a:minorFont>
     </a:fontScheme>
     <a:fmtScheme name="White">
@@ -6009,16 +5715,19 @@
     <a:spDef>
       <a:spPr>
         <a:solidFill>
-          <a:schemeClr val="accent1"/>
+          <a:srgbClr val="FFFFFF"/>
         </a:solidFill>
-        <a:ln w="12700" cap="flat">
-          <a:noFill/>
-          <a:miter lim="400000"/>
+        <a:ln w="25400" cap="flat">
+          <a:solidFill>
+            <a:schemeClr val="accent1"/>
+          </a:solidFill>
+          <a:prstDash val="solid"/>
+          <a:round/>
         </a:ln>
         <a:effectLst/>
         <a:sp3d/>
       </a:spPr>
-      <a:bodyPr rot="0" spcFirstLastPara="1" vertOverflow="overflow" horzOverflow="overflow" vert="horz" wrap="square" lIns="50800" tIns="50800" rIns="50800" bIns="50800" numCol="1" spcCol="38100" rtlCol="0" anchor="ctr">
+      <a:bodyPr rot="0" spcFirstLastPara="1" vertOverflow="overflow" horzOverflow="overflow" vert="horz" wrap="square" lIns="50800" tIns="50800" rIns="50800" bIns="50800" numCol="1" spcCol="38100" rtlCol="0" anchor="ctr" upright="0">
         <a:spAutoFit/>
       </a:bodyPr>
       <a:lstStyle>
@@ -6037,18 +5746,18 @@
           <a:buFontTx/>
           <a:buNone/>
           <a:tabLst/>
-          <a:defRPr kumimoji="0" sz="2200" b="0" i="0" u="none" strike="noStrike" cap="none" spc="0" normalizeH="0" baseline="0">
+          <a:defRPr b="0" baseline="0" cap="none" i="0" spc="0" strike="noStrike" sz="2400" u="none" kumimoji="0" normalizeH="0">
             <a:ln>
               <a:noFill/>
             </a:ln>
             <a:solidFill>
-              <a:srgbClr val="FFFFFF"/>
+              <a:srgbClr val="000000"/>
             </a:solidFill>
             <a:effectLst/>
             <a:uFillTx/>
-            <a:latin typeface="+mn-lt"/>
-            <a:ea typeface="+mn-ea"/>
-            <a:cs typeface="+mn-cs"/>
+            <a:latin typeface="Helvetica Neue Medium"/>
+            <a:ea typeface="Helvetica Neue Medium"/>
+            <a:cs typeface="Helvetica Neue Medium"/>
             <a:sym typeface="Helvetica Neue Medium"/>
           </a:defRPr>
         </a:defPPr>
@@ -6067,7 +5776,7 @@
           <a:buFontTx/>
           <a:buNone/>
           <a:tabLst/>
-          <a:defRPr kumimoji="0" sz="1800" b="0" i="0" u="none" strike="noStrike" cap="none" spc="0" normalizeH="0" baseline="0">
+          <a:defRPr b="0" baseline="0" cap="none" i="0" spc="0" strike="noStrike" sz="1800" u="none" kumimoji="0" normalizeH="0">
             <a:ln>
               <a:noFill/>
             </a:ln>
@@ -6093,7 +5802,7 @@
           <a:buFontTx/>
           <a:buNone/>
           <a:tabLst/>
-          <a:defRPr kumimoji="0" sz="1800" b="0" i="0" u="none" strike="noStrike" cap="none" spc="0" normalizeH="0" baseline="0">
+          <a:defRPr b="0" baseline="0" cap="none" i="0" spc="0" strike="noStrike" sz="1800" u="none" kumimoji="0" normalizeH="0">
             <a:ln>
               <a:noFill/>
             </a:ln>
@@ -6119,7 +5828,7 @@
           <a:buFontTx/>
           <a:buNone/>
           <a:tabLst/>
-          <a:defRPr kumimoji="0" sz="1800" b="0" i="0" u="none" strike="noStrike" cap="none" spc="0" normalizeH="0" baseline="0">
+          <a:defRPr b="0" baseline="0" cap="none" i="0" spc="0" strike="noStrike" sz="1800" u="none" kumimoji="0" normalizeH="0">
             <a:ln>
               <a:noFill/>
             </a:ln>
@@ -6145,7 +5854,7 @@
           <a:buFontTx/>
           <a:buNone/>
           <a:tabLst/>
-          <a:defRPr kumimoji="0" sz="1800" b="0" i="0" u="none" strike="noStrike" cap="none" spc="0" normalizeH="0" baseline="0">
+          <a:defRPr b="0" baseline="0" cap="none" i="0" spc="0" strike="noStrike" sz="1800" u="none" kumimoji="0" normalizeH="0">
             <a:ln>
               <a:noFill/>
             </a:ln>
@@ -6171,7 +5880,7 @@
           <a:buFontTx/>
           <a:buNone/>
           <a:tabLst/>
-          <a:defRPr kumimoji="0" sz="1800" b="0" i="0" u="none" strike="noStrike" cap="none" spc="0" normalizeH="0" baseline="0">
+          <a:defRPr b="0" baseline="0" cap="none" i="0" spc="0" strike="noStrike" sz="1800" u="none" kumimoji="0" normalizeH="0">
             <a:ln>
               <a:noFill/>
             </a:ln>
@@ -6197,7 +5906,7 @@
           <a:buFontTx/>
           <a:buNone/>
           <a:tabLst/>
-          <a:defRPr kumimoji="0" sz="1800" b="0" i="0" u="none" strike="noStrike" cap="none" spc="0" normalizeH="0" baseline="0">
+          <a:defRPr b="0" baseline="0" cap="none" i="0" spc="0" strike="noStrike" sz="1800" u="none" kumimoji="0" normalizeH="0">
             <a:ln>
               <a:noFill/>
             </a:ln>
@@ -6223,7 +5932,7 @@
           <a:buFontTx/>
           <a:buNone/>
           <a:tabLst/>
-          <a:defRPr kumimoji="0" sz="1800" b="0" i="0" u="none" strike="noStrike" cap="none" spc="0" normalizeH="0" baseline="0">
+          <a:defRPr b="0" baseline="0" cap="none" i="0" spc="0" strike="noStrike" sz="1800" u="none" kumimoji="0" normalizeH="0">
             <a:ln>
               <a:noFill/>
             </a:ln>
@@ -6249,7 +5958,7 @@
           <a:buFontTx/>
           <a:buNone/>
           <a:tabLst/>
-          <a:defRPr kumimoji="0" sz="1800" b="0" i="0" u="none" strike="noStrike" cap="none" spc="0" normalizeH="0" baseline="0">
+          <a:defRPr b="0" baseline="0" cap="none" i="0" spc="0" strike="noStrike" sz="1800" u="none" kumimoji="0" normalizeH="0">
             <a:ln>
               <a:noFill/>
             </a:ln>
@@ -6275,7 +5984,7 @@
           <a:buFontTx/>
           <a:buNone/>
           <a:tabLst/>
-          <a:defRPr kumimoji="0" sz="1800" b="0" i="0" u="none" strike="noStrike" cap="none" spc="0" normalizeH="0" baseline="0">
+          <a:defRPr b="0" baseline="0" cap="none" i="0" spc="0" strike="noStrike" sz="1800" u="none" kumimoji="0" normalizeH="0">
             <a:ln>
               <a:noFill/>
             </a:ln>
@@ -6288,15 +5997,9 @@
         </a:lvl9pPr>
       </a:lstStyle>
       <a:style>
-        <a:lnRef idx="0">
-          <a:scrgbClr r="0" g="0" b="0"/>
-        </a:lnRef>
-        <a:fillRef idx="0">
-          <a:scrgbClr r="0" g="0" b="0"/>
-        </a:fillRef>
-        <a:effectRef idx="0">
-          <a:scrgbClr r="0" g="0" b="0"/>
-        </a:effectRef>
+        <a:lnRef idx="0"/>
+        <a:fillRef idx="0"/>
+        <a:effectRef idx="0"/>
         <a:fontRef idx="none"/>
       </a:style>
     </a:spDef>
@@ -6305,15 +6008,15 @@
         <a:noFill/>
         <a:ln w="25400" cap="flat">
           <a:solidFill>
-            <a:srgbClr val="000000"/>
+            <a:schemeClr val="accent1"/>
           </a:solidFill>
           <a:prstDash val="solid"/>
-          <a:miter lim="400000"/>
+          <a:round/>
         </a:ln>
         <a:effectLst/>
         <a:sp3d/>
       </a:spPr>
-      <a:bodyPr rot="0" spcFirstLastPara="1" vertOverflow="overflow" horzOverflow="overflow" vert="horz" wrap="square" lIns="91439" tIns="45719" rIns="91439" bIns="45719" numCol="1" spcCol="38100" rtlCol="0" anchor="t">
+      <a:bodyPr rot="0" spcFirstLastPara="1" vertOverflow="overflow" horzOverflow="overflow" vert="horz" wrap="square" lIns="91439" tIns="45719" rIns="91439" bIns="45719" numCol="1" spcCol="38100" rtlCol="0" anchor="t" upright="0">
         <a:noAutofit/>
       </a:bodyPr>
       <a:lstStyle>
@@ -6332,7 +6035,7 @@
           <a:buFontTx/>
           <a:buNone/>
           <a:tabLst/>
-          <a:defRPr kumimoji="0" sz="1800" b="0" i="0" u="none" strike="noStrike" cap="none" spc="0" normalizeH="0" baseline="0">
+          <a:defRPr b="0" baseline="0" cap="none" i="0" spc="0" strike="noStrike" sz="1800" u="none" kumimoji="0" normalizeH="0">
             <a:ln>
               <a:noFill/>
             </a:ln>
@@ -6358,7 +6061,7 @@
           <a:buFontTx/>
           <a:buNone/>
           <a:tabLst/>
-          <a:defRPr kumimoji="0" sz="1800" b="0" i="0" u="none" strike="noStrike" cap="none" spc="0" normalizeH="0" baseline="0">
+          <a:defRPr b="0" baseline="0" cap="none" i="0" spc="0" strike="noStrike" sz="1800" u="none" kumimoji="0" normalizeH="0">
             <a:ln>
               <a:noFill/>
             </a:ln>
@@ -6384,7 +6087,7 @@
           <a:buFontTx/>
           <a:buNone/>
           <a:tabLst/>
-          <a:defRPr kumimoji="0" sz="1800" b="0" i="0" u="none" strike="noStrike" cap="none" spc="0" normalizeH="0" baseline="0">
+          <a:defRPr b="0" baseline="0" cap="none" i="0" spc="0" strike="noStrike" sz="1800" u="none" kumimoji="0" normalizeH="0">
             <a:ln>
               <a:noFill/>
             </a:ln>
@@ -6410,7 +6113,7 @@
           <a:buFontTx/>
           <a:buNone/>
           <a:tabLst/>
-          <a:defRPr kumimoji="0" sz="1800" b="0" i="0" u="none" strike="noStrike" cap="none" spc="0" normalizeH="0" baseline="0">
+          <a:defRPr b="0" baseline="0" cap="none" i="0" spc="0" strike="noStrike" sz="1800" u="none" kumimoji="0" normalizeH="0">
             <a:ln>
               <a:noFill/>
             </a:ln>
@@ -6436,7 +6139,7 @@
           <a:buFontTx/>
           <a:buNone/>
           <a:tabLst/>
-          <a:defRPr kumimoji="0" sz="1800" b="0" i="0" u="none" strike="noStrike" cap="none" spc="0" normalizeH="0" baseline="0">
+          <a:defRPr b="0" baseline="0" cap="none" i="0" spc="0" strike="noStrike" sz="1800" u="none" kumimoji="0" normalizeH="0">
             <a:ln>
               <a:noFill/>
             </a:ln>
@@ -6462,7 +6165,7 @@
           <a:buFontTx/>
           <a:buNone/>
           <a:tabLst/>
-          <a:defRPr kumimoji="0" sz="1800" b="0" i="0" u="none" strike="noStrike" cap="none" spc="0" normalizeH="0" baseline="0">
+          <a:defRPr b="0" baseline="0" cap="none" i="0" spc="0" strike="noStrike" sz="1800" u="none" kumimoji="0" normalizeH="0">
             <a:ln>
               <a:noFill/>
             </a:ln>
@@ -6488,7 +6191,7 @@
           <a:buFontTx/>
           <a:buNone/>
           <a:tabLst/>
-          <a:defRPr kumimoji="0" sz="1800" b="0" i="0" u="none" strike="noStrike" cap="none" spc="0" normalizeH="0" baseline="0">
+          <a:defRPr b="0" baseline="0" cap="none" i="0" spc="0" strike="noStrike" sz="1800" u="none" kumimoji="0" normalizeH="0">
             <a:ln>
               <a:noFill/>
             </a:ln>
@@ -6514,7 +6217,7 @@
           <a:buFontTx/>
           <a:buNone/>
           <a:tabLst/>
-          <a:defRPr kumimoji="0" sz="1800" b="0" i="0" u="none" strike="noStrike" cap="none" spc="0" normalizeH="0" baseline="0">
+          <a:defRPr b="0" baseline="0" cap="none" i="0" spc="0" strike="noStrike" sz="1800" u="none" kumimoji="0" normalizeH="0">
             <a:ln>
               <a:noFill/>
             </a:ln>
@@ -6540,7 +6243,7 @@
           <a:buFontTx/>
           <a:buNone/>
           <a:tabLst/>
-          <a:defRPr kumimoji="0" sz="1800" b="0" i="0" u="none" strike="noStrike" cap="none" spc="0" normalizeH="0" baseline="0">
+          <a:defRPr b="0" baseline="0" cap="none" i="0" spc="0" strike="noStrike" sz="1800" u="none" kumimoji="0" normalizeH="0">
             <a:ln>
               <a:noFill/>
             </a:ln>
@@ -6566,7 +6269,7 @@
           <a:buFontTx/>
           <a:buNone/>
           <a:tabLst/>
-          <a:defRPr kumimoji="0" sz="1800" b="0" i="0" u="none" strike="noStrike" cap="none" spc="0" normalizeH="0" baseline="0">
+          <a:defRPr b="0" baseline="0" cap="none" i="0" spc="0" strike="noStrike" sz="1800" u="none" kumimoji="0" normalizeH="0">
             <a:ln>
               <a:noFill/>
             </a:ln>
@@ -6579,15 +6282,9 @@
         </a:lvl9pPr>
       </a:lstStyle>
       <a:style>
-        <a:lnRef idx="0">
-          <a:scrgbClr r="0" g="0" b="0"/>
-        </a:lnRef>
-        <a:fillRef idx="0">
-          <a:scrgbClr r="0" g="0" b="0"/>
-        </a:fillRef>
-        <a:effectRef idx="0">
-          <a:scrgbClr r="0" g="0" b="0"/>
-        </a:effectRef>
+        <a:lnRef idx="0"/>
+        <a:fillRef idx="0"/>
+        <a:effectRef idx="0"/>
         <a:fontRef idx="none"/>
       </a:style>
     </a:lnDef>
@@ -6601,7 +6298,7 @@
         <a:effectLst/>
         <a:sp3d/>
       </a:spPr>
-      <a:bodyPr rot="0" spcFirstLastPara="1" vertOverflow="overflow" horzOverflow="overflow" vert="horz" wrap="square" lIns="50800" tIns="50800" rIns="50800" bIns="50800" numCol="1" spcCol="38100" rtlCol="0" anchor="ctr">
+      <a:bodyPr rot="0" spcFirstLastPara="1" vertOverflow="overflow" horzOverflow="overflow" vert="horz" wrap="square" lIns="50800" tIns="50800" rIns="50800" bIns="50800" numCol="1" spcCol="38100" rtlCol="0" anchor="ctr" upright="0">
         <a:spAutoFit/>
       </a:bodyPr>
       <a:lstStyle>
@@ -6620,7 +6317,7 @@
           <a:buFontTx/>
           <a:buNone/>
           <a:tabLst/>
-          <a:defRPr kumimoji="0" sz="2400" b="1" i="0" u="none" strike="noStrike" cap="none" spc="0" normalizeH="0" baseline="0">
+          <a:defRPr b="0" baseline="0" cap="none" i="0" spc="0" strike="noStrike" sz="2400" u="none" kumimoji="0" normalizeH="0">
             <a:ln>
               <a:noFill/>
             </a:ln>
@@ -6629,10 +6326,10 @@
             </a:solidFill>
             <a:effectLst/>
             <a:uFillTx/>
-            <a:latin typeface="Helvetica Neue"/>
-            <a:ea typeface="Helvetica Neue"/>
-            <a:cs typeface="Helvetica Neue"/>
-            <a:sym typeface="Helvetica Neue"/>
+            <a:latin typeface="Helvetica Neue Medium"/>
+            <a:ea typeface="Helvetica Neue Medium"/>
+            <a:cs typeface="Helvetica Neue Medium"/>
+            <a:sym typeface="Helvetica Neue Medium"/>
           </a:defRPr>
         </a:defPPr>
         <a:lvl1pPr marL="0" marR="0" indent="0" algn="l" defTabSz="914400" rtl="0" fontAlgn="auto" latinLnBrk="1" hangingPunct="0">
@@ -6650,7 +6347,7 @@
           <a:buFontTx/>
           <a:buNone/>
           <a:tabLst/>
-          <a:defRPr kumimoji="0" sz="1800" b="0" i="0" u="none" strike="noStrike" cap="none" spc="0" normalizeH="0" baseline="0">
+          <a:defRPr b="0" baseline="0" cap="none" i="0" spc="0" strike="noStrike" sz="1800" u="none" kumimoji="0" normalizeH="0">
             <a:ln>
               <a:noFill/>
             </a:ln>
@@ -6676,7 +6373,7 @@
           <a:buFontTx/>
           <a:buNone/>
           <a:tabLst/>
-          <a:defRPr kumimoji="0" sz="1800" b="0" i="0" u="none" strike="noStrike" cap="none" spc="0" normalizeH="0" baseline="0">
+          <a:defRPr b="0" baseline="0" cap="none" i="0" spc="0" strike="noStrike" sz="1800" u="none" kumimoji="0" normalizeH="0">
             <a:ln>
               <a:noFill/>
             </a:ln>
@@ -6702,7 +6399,7 @@
           <a:buFontTx/>
           <a:buNone/>
           <a:tabLst/>
-          <a:defRPr kumimoji="0" sz="1800" b="0" i="0" u="none" strike="noStrike" cap="none" spc="0" normalizeH="0" baseline="0">
+          <a:defRPr b="0" baseline="0" cap="none" i="0" spc="0" strike="noStrike" sz="1800" u="none" kumimoji="0" normalizeH="0">
             <a:ln>
               <a:noFill/>
             </a:ln>
@@ -6728,7 +6425,7 @@
           <a:buFontTx/>
           <a:buNone/>
           <a:tabLst/>
-          <a:defRPr kumimoji="0" sz="1800" b="0" i="0" u="none" strike="noStrike" cap="none" spc="0" normalizeH="0" baseline="0">
+          <a:defRPr b="0" baseline="0" cap="none" i="0" spc="0" strike="noStrike" sz="1800" u="none" kumimoji="0" normalizeH="0">
             <a:ln>
               <a:noFill/>
             </a:ln>
@@ -6754,7 +6451,7 @@
           <a:buFontTx/>
           <a:buNone/>
           <a:tabLst/>
-          <a:defRPr kumimoji="0" sz="1800" b="0" i="0" u="none" strike="noStrike" cap="none" spc="0" normalizeH="0" baseline="0">
+          <a:defRPr b="0" baseline="0" cap="none" i="0" spc="0" strike="noStrike" sz="1800" u="none" kumimoji="0" normalizeH="0">
             <a:ln>
               <a:noFill/>
             </a:ln>
@@ -6780,7 +6477,7 @@
           <a:buFontTx/>
           <a:buNone/>
           <a:tabLst/>
-          <a:defRPr kumimoji="0" sz="1800" b="0" i="0" u="none" strike="noStrike" cap="none" spc="0" normalizeH="0" baseline="0">
+          <a:defRPr b="0" baseline="0" cap="none" i="0" spc="0" strike="noStrike" sz="1800" u="none" kumimoji="0" normalizeH="0">
             <a:ln>
               <a:noFill/>
             </a:ln>
@@ -6806,7 +6503,7 @@
           <a:buFontTx/>
           <a:buNone/>
           <a:tabLst/>
-          <a:defRPr kumimoji="0" sz="1800" b="0" i="0" u="none" strike="noStrike" cap="none" spc="0" normalizeH="0" baseline="0">
+          <a:defRPr b="0" baseline="0" cap="none" i="0" spc="0" strike="noStrike" sz="1800" u="none" kumimoji="0" normalizeH="0">
             <a:ln>
               <a:noFill/>
             </a:ln>
@@ -6832,7 +6529,7 @@
           <a:buFontTx/>
           <a:buNone/>
           <a:tabLst/>
-          <a:defRPr kumimoji="0" sz="1800" b="0" i="0" u="none" strike="noStrike" cap="none" spc="0" normalizeH="0" baseline="0">
+          <a:defRPr b="0" baseline="0" cap="none" i="0" spc="0" strike="noStrike" sz="1800" u="none" kumimoji="0" normalizeH="0">
             <a:ln>
               <a:noFill/>
             </a:ln>
@@ -6858,7 +6555,7 @@
           <a:buFontTx/>
           <a:buNone/>
           <a:tabLst/>
-          <a:defRPr kumimoji="0" sz="1800" b="0" i="0" u="none" strike="noStrike" cap="none" spc="0" normalizeH="0" baseline="0">
+          <a:defRPr b="0" baseline="0" cap="none" i="0" spc="0" strike="noStrike" sz="1800" u="none" kumimoji="0" normalizeH="0">
             <a:ln>
               <a:noFill/>
             </a:ln>
@@ -6871,19 +6568,12 @@
         </a:lvl9pPr>
       </a:lstStyle>
       <a:style>
-        <a:lnRef idx="0">
-          <a:scrgbClr r="0" g="0" b="0"/>
-        </a:lnRef>
-        <a:fillRef idx="0">
-          <a:scrgbClr r="0" g="0" b="0"/>
-        </a:fillRef>
-        <a:effectRef idx="0">
-          <a:scrgbClr r="0" g="0" b="0"/>
-        </a:effectRef>
+        <a:lnRef idx="0"/>
+        <a:fillRef idx="0"/>
+        <a:effectRef idx="0"/>
         <a:fontRef idx="none"/>
       </a:style>
     </a:txDef>
   </a:objectDefaults>
-  <a:extraClrSchemeLst/>
 </a:theme>
 </file>
</xml_diff>